<commit_message>
add images and start with ev section
</commit_message>
<xml_diff>
--- a/support/support_eflows.pptx
+++ b/support/support_eflows.pptx
@@ -14,13 +14,14 @@
     <p:sldId id="256" r:id="rId8"/>
     <p:sldId id="258" r:id="rId9"/>
     <p:sldId id="257" r:id="rId10"/>
-    <p:sldId id="259" r:id="rId11"/>
-    <p:sldId id="260" r:id="rId12"/>
-    <p:sldId id="261" r:id="rId13"/>
-    <p:sldId id="262" r:id="rId14"/>
-    <p:sldId id="263" r:id="rId15"/>
-    <p:sldId id="264" r:id="rId16"/>
-    <p:sldId id="265" r:id="rId17"/>
+    <p:sldId id="272" r:id="rId11"/>
+    <p:sldId id="259" r:id="rId12"/>
+    <p:sldId id="260" r:id="rId13"/>
+    <p:sldId id="261" r:id="rId14"/>
+    <p:sldId id="262" r:id="rId15"/>
+    <p:sldId id="263" r:id="rId16"/>
+    <p:sldId id="264" r:id="rId17"/>
+    <p:sldId id="265" r:id="rId18"/>
   </p:sldIdLst>
   <p:sldSz cx="12192000" cy="6858000"/>
   <p:notesSz cx="6858000" cy="9144000"/>
@@ -135,7 +136,7 @@
             <p14:sldId id="269"/>
           </p14:sldIdLst>
         </p14:section>
-        <p14:section name="allocate" id="{D785152C-1FEE-4B1C-A119-950820F4891F}">
+        <p14:section name="distribute" id="{D785152C-1FEE-4B1C-A119-950820F4891F}">
           <p14:sldIdLst>
             <p14:sldId id="267"/>
             <p14:sldId id="256"/>
@@ -145,6 +146,7 @@
         <p14:section name="foreshift" id="{105557A5-3F18-491E-9FC9-54BAD336D97D}">
           <p14:sldIdLst>
             <p14:sldId id="257"/>
+            <p14:sldId id="272"/>
             <p14:sldId id="259"/>
             <p14:sldId id="260"/>
             <p14:sldId id="261"/>
@@ -312,7 +314,7 @@
           <a:p>
             <a:fld id="{581C469B-4AAA-4FDE-898A-4F118D9816DE}" type="datetimeFigureOut">
               <a:rPr lang="es-ES" smtClean="0"/>
-              <a:t>04/11/2018</a:t>
+              <a:t>07/11/2018</a:t>
             </a:fld>
             <a:endParaRPr lang="es-ES"/>
           </a:p>
@@ -512,7 +514,7 @@
           <a:p>
             <a:fld id="{581C469B-4AAA-4FDE-898A-4F118D9816DE}" type="datetimeFigureOut">
               <a:rPr lang="es-ES" smtClean="0"/>
-              <a:t>04/11/2018</a:t>
+              <a:t>07/11/2018</a:t>
             </a:fld>
             <a:endParaRPr lang="es-ES"/>
           </a:p>
@@ -722,7 +724,7 @@
           <a:p>
             <a:fld id="{581C469B-4AAA-4FDE-898A-4F118D9816DE}" type="datetimeFigureOut">
               <a:rPr lang="es-ES" smtClean="0"/>
-              <a:t>04/11/2018</a:t>
+              <a:t>07/11/2018</a:t>
             </a:fld>
             <a:endParaRPr lang="es-ES"/>
           </a:p>
@@ -922,7 +924,7 @@
           <a:p>
             <a:fld id="{581C469B-4AAA-4FDE-898A-4F118D9816DE}" type="datetimeFigureOut">
               <a:rPr lang="es-ES" smtClean="0"/>
-              <a:t>04/11/2018</a:t>
+              <a:t>07/11/2018</a:t>
             </a:fld>
             <a:endParaRPr lang="es-ES"/>
           </a:p>
@@ -1198,7 +1200,7 @@
           <a:p>
             <a:fld id="{581C469B-4AAA-4FDE-898A-4F118D9816DE}" type="datetimeFigureOut">
               <a:rPr lang="es-ES" smtClean="0"/>
-              <a:t>04/11/2018</a:t>
+              <a:t>07/11/2018</a:t>
             </a:fld>
             <a:endParaRPr lang="es-ES"/>
           </a:p>
@@ -1466,7 +1468,7 @@
           <a:p>
             <a:fld id="{581C469B-4AAA-4FDE-898A-4F118D9816DE}" type="datetimeFigureOut">
               <a:rPr lang="es-ES" smtClean="0"/>
-              <a:t>04/11/2018</a:t>
+              <a:t>07/11/2018</a:t>
             </a:fld>
             <a:endParaRPr lang="es-ES"/>
           </a:p>
@@ -1881,7 +1883,7 @@
           <a:p>
             <a:fld id="{581C469B-4AAA-4FDE-898A-4F118D9816DE}" type="datetimeFigureOut">
               <a:rPr lang="es-ES" smtClean="0"/>
-              <a:t>04/11/2018</a:t>
+              <a:t>07/11/2018</a:t>
             </a:fld>
             <a:endParaRPr lang="es-ES"/>
           </a:p>
@@ -2023,7 +2025,7 @@
           <a:p>
             <a:fld id="{581C469B-4AAA-4FDE-898A-4F118D9816DE}" type="datetimeFigureOut">
               <a:rPr lang="es-ES" smtClean="0"/>
-              <a:t>04/11/2018</a:t>
+              <a:t>07/11/2018</a:t>
             </a:fld>
             <a:endParaRPr lang="es-ES"/>
           </a:p>
@@ -2136,7 +2138,7 @@
           <a:p>
             <a:fld id="{581C469B-4AAA-4FDE-898A-4F118D9816DE}" type="datetimeFigureOut">
               <a:rPr lang="es-ES" smtClean="0"/>
-              <a:t>04/11/2018</a:t>
+              <a:t>07/11/2018</a:t>
             </a:fld>
             <a:endParaRPr lang="es-ES"/>
           </a:p>
@@ -2449,7 +2451,7 @@
           <a:p>
             <a:fld id="{581C469B-4AAA-4FDE-898A-4F118D9816DE}" type="datetimeFigureOut">
               <a:rPr lang="es-ES" smtClean="0"/>
-              <a:t>04/11/2018</a:t>
+              <a:t>07/11/2018</a:t>
             </a:fld>
             <a:endParaRPr lang="es-ES"/>
           </a:p>
@@ -2738,7 +2740,7 @@
           <a:p>
             <a:fld id="{581C469B-4AAA-4FDE-898A-4F118D9816DE}" type="datetimeFigureOut">
               <a:rPr lang="es-ES" smtClean="0"/>
-              <a:t>04/11/2018</a:t>
+              <a:t>07/11/2018</a:t>
             </a:fld>
             <a:endParaRPr lang="es-ES"/>
           </a:p>
@@ -2981,7 +2983,7 @@
           <a:p>
             <a:fld id="{581C469B-4AAA-4FDE-898A-4F118D9816DE}" type="datetimeFigureOut">
               <a:rPr lang="es-ES" smtClean="0"/>
-              <a:t>04/11/2018</a:t>
+              <a:t>07/11/2018</a:t>
             </a:fld>
             <a:endParaRPr lang="es-ES"/>
           </a:p>
@@ -3732,6 +3734,443 @@
           <a:chExt cx="0" cy="0"/>
         </a:xfrm>
       </p:grpSpPr>
+      <p:pic>
+        <p:nvPicPr>
+          <p:cNvPr id="4" name="Afbeelding 3">
+            <a:extLst>
+              <a:ext uri="{FF2B5EF4-FFF2-40B4-BE49-F238E27FC236}">
+                <a16:creationId xmlns:a16="http://schemas.microsoft.com/office/drawing/2014/main" id="{F520BF02-63DE-4455-A34A-D6E5834BD105}"/>
+              </a:ext>
+            </a:extLst>
+          </p:cNvPr>
+          <p:cNvPicPr>
+            <a:picLocks noChangeAspect="1"/>
+          </p:cNvPicPr>
+          <p:nvPr/>
+        </p:nvPicPr>
+        <p:blipFill>
+          <a:blip r:embed="rId2"/>
+          <a:stretch>
+            <a:fillRect/>
+          </a:stretch>
+        </p:blipFill>
+        <p:spPr>
+          <a:xfrm>
+            <a:off x="7575066" y="3938534"/>
+            <a:ext cx="1605978" cy="2265646"/>
+          </a:xfrm>
+          <a:prstGeom prst="rect">
+            <a:avLst/>
+          </a:prstGeom>
+          <a:ln>
+            <a:noFill/>
+          </a:ln>
+          <a:effectLst>
+            <a:outerShdw blurRad="292100" dist="139700" dir="2700000" algn="tl" rotWithShape="0">
+              <a:srgbClr val="333333">
+                <a:alpha val="65000"/>
+              </a:srgbClr>
+            </a:outerShdw>
+          </a:effectLst>
+        </p:spPr>
+      </p:pic>
+      <p:sp>
+        <p:nvSpPr>
+          <p:cNvPr id="5" name="Rechthoek: afgeronde hoeken 4">
+            <a:extLst>
+              <a:ext uri="{FF2B5EF4-FFF2-40B4-BE49-F238E27FC236}">
+                <a16:creationId xmlns:a16="http://schemas.microsoft.com/office/drawing/2014/main" id="{E3F59D38-F9DB-4070-BC6F-681A4E2E2C15}"/>
+              </a:ext>
+            </a:extLst>
+          </p:cNvPr>
+          <p:cNvSpPr/>
+          <p:nvPr/>
+        </p:nvSpPr>
+        <p:spPr>
+          <a:xfrm>
+            <a:off x="3723089" y="2882432"/>
+            <a:ext cx="690113" cy="2301177"/>
+          </a:xfrm>
+          <a:prstGeom prst="roundRect">
+            <a:avLst/>
+          </a:prstGeom>
+          <a:solidFill>
+            <a:srgbClr val="66A266"/>
+          </a:solidFill>
+          <a:ln w="28575">
+            <a:solidFill>
+              <a:schemeClr val="bg2">
+                <a:lumMod val="50000"/>
+              </a:schemeClr>
+            </a:solidFill>
+          </a:ln>
+        </p:spPr>
+        <p:style>
+          <a:lnRef idx="2">
+            <a:schemeClr val="accent1">
+              <a:shade val="50000"/>
+            </a:schemeClr>
+          </a:lnRef>
+          <a:fillRef idx="1">
+            <a:schemeClr val="accent1"/>
+          </a:fillRef>
+          <a:effectRef idx="0">
+            <a:schemeClr val="accent1"/>
+          </a:effectRef>
+          <a:fontRef idx="minor">
+            <a:schemeClr val="lt1"/>
+          </a:fontRef>
+        </p:style>
+        <p:txBody>
+          <a:bodyPr rtlCol="0" anchor="ctr"/>
+          <a:lstStyle/>
+          <a:p>
+            <a:pPr algn="ctr"/>
+            <a:endParaRPr lang="es-ES"/>
+          </a:p>
+        </p:txBody>
+      </p:sp>
+      <p:sp>
+        <p:nvSpPr>
+          <p:cNvPr id="6" name="Rechthoek 5">
+            <a:extLst>
+              <a:ext uri="{FF2B5EF4-FFF2-40B4-BE49-F238E27FC236}">
+                <a16:creationId xmlns:a16="http://schemas.microsoft.com/office/drawing/2014/main" id="{2594C2BB-3848-4470-84F2-97C732A5A5FA}"/>
+              </a:ext>
+            </a:extLst>
+          </p:cNvPr>
+          <p:cNvSpPr/>
+          <p:nvPr/>
+        </p:nvSpPr>
+        <p:spPr>
+          <a:xfrm>
+            <a:off x="3855751" y="4542729"/>
+            <a:ext cx="428921" cy="399012"/>
+          </a:xfrm>
+          <a:prstGeom prst="rect">
+            <a:avLst/>
+          </a:prstGeom>
+          <a:noFill/>
+          <a:ln>
+            <a:noFill/>
+          </a:ln>
+        </p:spPr>
+        <p:style>
+          <a:lnRef idx="2">
+            <a:schemeClr val="accent1">
+              <a:shade val="50000"/>
+            </a:schemeClr>
+          </a:lnRef>
+          <a:fillRef idx="1">
+            <a:schemeClr val="accent1"/>
+          </a:fillRef>
+          <a:effectRef idx="0">
+            <a:schemeClr val="accent1"/>
+          </a:effectRef>
+          <a:fontRef idx="minor">
+            <a:schemeClr val="lt1"/>
+          </a:fontRef>
+        </p:style>
+        <p:txBody>
+          <a:bodyPr rtlCol="0" anchor="ctr"/>
+          <a:lstStyle/>
+          <a:p>
+            <a:pPr algn="ctr"/>
+            <a:r>
+              <a:rPr lang="es-ES" sz="1600" dirty="0">
+                <a:latin typeface="Consolas" panose="020B0609020204030204" pitchFamily="49" charset="0"/>
+              </a:rPr>
+              <a:t>2h</a:t>
+            </a:r>
+          </a:p>
+        </p:txBody>
+      </p:sp>
+      <p:sp>
+        <p:nvSpPr>
+          <p:cNvPr id="7" name="Tekstballon: rechthoek met afgeronde hoeken 6">
+            <a:extLst>
+              <a:ext uri="{FF2B5EF4-FFF2-40B4-BE49-F238E27FC236}">
+                <a16:creationId xmlns:a16="http://schemas.microsoft.com/office/drawing/2014/main" id="{7D4A070D-167D-43BB-B5C5-ECBD76B01D05}"/>
+              </a:ext>
+            </a:extLst>
+          </p:cNvPr>
+          <p:cNvSpPr/>
+          <p:nvPr/>
+        </p:nvSpPr>
+        <p:spPr>
+          <a:xfrm>
+            <a:off x="2518999" y="5349999"/>
+            <a:ext cx="2536647" cy="756796"/>
+          </a:xfrm>
+          <a:prstGeom prst="wedgeRoundRectCallout">
+            <a:avLst>
+              <a:gd name="adj1" fmla="val -18926"/>
+              <a:gd name="adj2" fmla="val 15001"/>
+              <a:gd name="adj3" fmla="val 16667"/>
+            </a:avLst>
+          </a:prstGeom>
+          <a:solidFill>
+            <a:schemeClr val="bg1">
+              <a:lumMod val="85000"/>
+            </a:schemeClr>
+          </a:solidFill>
+          <a:ln>
+            <a:noFill/>
+          </a:ln>
+        </p:spPr>
+        <p:style>
+          <a:lnRef idx="0">
+            <a:scrgbClr r="0" g="0" b="0"/>
+          </a:lnRef>
+          <a:fillRef idx="0">
+            <a:scrgbClr r="0" g="0" b="0"/>
+          </a:fillRef>
+          <a:effectRef idx="0">
+            <a:scrgbClr r="0" g="0" b="0"/>
+          </a:effectRef>
+          <a:fontRef idx="minor">
+            <a:schemeClr val="dk1"/>
+          </a:fontRef>
+        </p:style>
+        <p:txBody>
+          <a:bodyPr rtlCol="0" anchor="ctr"/>
+          <a:lstStyle/>
+          <a:p>
+            <a:pPr algn="ctr"/>
+            <a:r>
+              <a:rPr lang="en-US" dirty="0">
+                <a:latin typeface="Source Sans Pro" panose="020B0503030403020204" pitchFamily="34" charset="0"/>
+              </a:rPr>
+              <a:t>“I need my car charged as soon as possible” </a:t>
+            </a:r>
+          </a:p>
+        </p:txBody>
+      </p:sp>
+      <p:pic>
+        <p:nvPicPr>
+          <p:cNvPr id="8" name="Graphic 7">
+            <a:extLst>
+              <a:ext uri="{FF2B5EF4-FFF2-40B4-BE49-F238E27FC236}">
+                <a16:creationId xmlns:a16="http://schemas.microsoft.com/office/drawing/2014/main" id="{7CE5CED6-A87B-45A8-92DF-6050111E8A2F}"/>
+              </a:ext>
+            </a:extLst>
+          </p:cNvPr>
+          <p:cNvPicPr>
+            <a:picLocks noChangeAspect="1"/>
+          </p:cNvPicPr>
+          <p:nvPr/>
+        </p:nvPicPr>
+        <p:blipFill>
+          <a:blip r:embed="rId3">
+            <a:extLst>
+              <a:ext uri="{96DAC541-7B7A-43D3-8B79-37D633B846F1}">
+                <asvg:svgBlip xmlns:asvg="http://schemas.microsoft.com/office/drawing/2016/SVG/main" r:embed="rId4"/>
+              </a:ext>
+            </a:extLst>
+          </a:blip>
+          <a:stretch>
+            <a:fillRect/>
+          </a:stretch>
+        </p:blipFill>
+        <p:spPr>
+          <a:xfrm>
+            <a:off x="2586779" y="3785311"/>
+            <a:ext cx="883959" cy="589307"/>
+          </a:xfrm>
+          <a:prstGeom prst="rect">
+            <a:avLst/>
+          </a:prstGeom>
+        </p:spPr>
+      </p:pic>
+      <p:sp>
+        <p:nvSpPr>
+          <p:cNvPr id="9" name="Pijl: omhoog 8">
+            <a:extLst>
+              <a:ext uri="{FF2B5EF4-FFF2-40B4-BE49-F238E27FC236}">
+                <a16:creationId xmlns:a16="http://schemas.microsoft.com/office/drawing/2014/main" id="{358E9332-474A-4852-BA9C-CE4E70F7D2E9}"/>
+              </a:ext>
+            </a:extLst>
+          </p:cNvPr>
+          <p:cNvSpPr/>
+          <p:nvPr/>
+        </p:nvSpPr>
+        <p:spPr>
+          <a:xfrm rot="5400000">
+            <a:off x="6089957" y="4370048"/>
+            <a:ext cx="481002" cy="2664062"/>
+          </a:xfrm>
+          <a:prstGeom prst="upArrow">
+            <a:avLst/>
+          </a:prstGeom>
+          <a:solidFill>
+            <a:schemeClr val="bg1">
+              <a:lumMod val="85000"/>
+            </a:schemeClr>
+          </a:solidFill>
+          <a:ln>
+            <a:noFill/>
+          </a:ln>
+        </p:spPr>
+        <p:style>
+          <a:lnRef idx="0">
+            <a:scrgbClr r="0" g="0" b="0"/>
+          </a:lnRef>
+          <a:fillRef idx="0">
+            <a:scrgbClr r="0" g="0" b="0"/>
+          </a:fillRef>
+          <a:effectRef idx="0">
+            <a:scrgbClr r="0" g="0" b="0"/>
+          </a:effectRef>
+          <a:fontRef idx="minor">
+            <a:schemeClr val="dk1"/>
+          </a:fontRef>
+        </p:style>
+        <p:txBody>
+          <a:bodyPr rot="0" spcFirstLastPara="0" vertOverflow="overflow" horzOverflow="overflow" vert="horz" wrap="square" lIns="91440" tIns="45720" rIns="91440" bIns="45720" numCol="1" spcCol="0" rtlCol="0" fromWordArt="0" anchor="ctr" anchorCtr="0" forceAA="0" compatLnSpc="1">
+            <a:prstTxWarp prst="textNoShape">
+              <a:avLst/>
+            </a:prstTxWarp>
+            <a:noAutofit/>
+          </a:bodyPr>
+          <a:lstStyle/>
+          <a:p>
+            <a:pPr algn="ctr"/>
+            <a:endParaRPr lang="es-ES">
+              <a:solidFill>
+                <a:schemeClr val="dk1"/>
+              </a:solidFill>
+              <a:latin typeface="Myriad Pro" panose="020B0503030403020204" pitchFamily="34" charset="0"/>
+            </a:endParaRPr>
+          </a:p>
+        </p:txBody>
+      </p:sp>
+      <p:pic>
+        <p:nvPicPr>
+          <p:cNvPr id="10" name="Afbeelding 9">
+            <a:extLst>
+              <a:ext uri="{FF2B5EF4-FFF2-40B4-BE49-F238E27FC236}">
+                <a16:creationId xmlns:a16="http://schemas.microsoft.com/office/drawing/2014/main" id="{BAF1FD2E-2E87-4ECD-8438-5A2DA63F44FA}"/>
+              </a:ext>
+            </a:extLst>
+          </p:cNvPr>
+          <p:cNvPicPr>
+            <a:picLocks noChangeAspect="1"/>
+          </p:cNvPicPr>
+          <p:nvPr/>
+        </p:nvPicPr>
+        <p:blipFill>
+          <a:blip r:embed="rId5"/>
+          <a:stretch>
+            <a:fillRect/>
+          </a:stretch>
+        </p:blipFill>
+        <p:spPr>
+          <a:xfrm>
+            <a:off x="5295876" y="2847597"/>
+            <a:ext cx="1753197" cy="3356583"/>
+          </a:xfrm>
+          <a:prstGeom prst="rect">
+            <a:avLst/>
+          </a:prstGeom>
+          <a:ln>
+            <a:noFill/>
+          </a:ln>
+          <a:effectLst>
+            <a:outerShdw blurRad="292100" dist="139700" dir="2700000" algn="tl" rotWithShape="0">
+              <a:srgbClr val="333333">
+                <a:alpha val="65000"/>
+              </a:srgbClr>
+            </a:outerShdw>
+          </a:effectLst>
+        </p:spPr>
+      </p:pic>
+      <p:sp>
+        <p:nvSpPr>
+          <p:cNvPr id="11" name="Tekstballon: rechthoek met afgeronde hoeken 10">
+            <a:extLst>
+              <a:ext uri="{FF2B5EF4-FFF2-40B4-BE49-F238E27FC236}">
+                <a16:creationId xmlns:a16="http://schemas.microsoft.com/office/drawing/2014/main" id="{90285B22-EAF6-4ADB-8970-E7140BCABA7B}"/>
+              </a:ext>
+            </a:extLst>
+          </p:cNvPr>
+          <p:cNvSpPr/>
+          <p:nvPr/>
+        </p:nvSpPr>
+        <p:spPr>
+          <a:xfrm>
+            <a:off x="7441994" y="2717718"/>
+            <a:ext cx="1872122" cy="1000107"/>
+          </a:xfrm>
+          <a:prstGeom prst="wedgeRoundRectCallout">
+            <a:avLst>
+              <a:gd name="adj1" fmla="val -18926"/>
+              <a:gd name="adj2" fmla="val 15001"/>
+              <a:gd name="adj3" fmla="val 16667"/>
+            </a:avLst>
+          </a:prstGeom>
+          <a:noFill/>
+          <a:ln>
+            <a:noFill/>
+          </a:ln>
+        </p:spPr>
+        <p:style>
+          <a:lnRef idx="0">
+            <a:scrgbClr r="0" g="0" b="0"/>
+          </a:lnRef>
+          <a:fillRef idx="0">
+            <a:scrgbClr r="0" g="0" b="0"/>
+          </a:fillRef>
+          <a:effectRef idx="0">
+            <a:scrgbClr r="0" g="0" b="0"/>
+          </a:effectRef>
+          <a:fontRef idx="minor">
+            <a:schemeClr val="dk1"/>
+          </a:fontRef>
+        </p:style>
+        <p:txBody>
+          <a:bodyPr rtlCol="0" anchor="ctr"/>
+          <a:lstStyle/>
+          <a:p>
+            <a:pPr algn="ctr"/>
+            <a:r>
+              <a:rPr lang="en-US" sz="1200" i="1" dirty="0">
+                <a:latin typeface="Source Sans Pro" panose="020B0503030403020204" pitchFamily="34" charset="0"/>
+              </a:rPr>
+              <a:t>The instant demand is limited by the capacity to provide and take energy</a:t>
+            </a:r>
+          </a:p>
+        </p:txBody>
+      </p:sp>
+    </p:spTree>
+    <p:extLst>
+      <p:ext uri="{BB962C8B-B14F-4D97-AF65-F5344CB8AC3E}">
+        <p14:creationId xmlns:p14="http://schemas.microsoft.com/office/powerpoint/2010/main" val="1597661486"/>
+      </p:ext>
+    </p:extLst>
+  </p:cSld>
+  <p:clrMapOvr>
+    <a:masterClrMapping/>
+  </p:clrMapOvr>
+</p:sld>
+</file>
+
+<file path=ppt/slides/slide11.xml><?xml version="1.0" encoding="utf-8"?>
+<p:sld xmlns:a="http://schemas.openxmlformats.org/drawingml/2006/main" xmlns:r="http://schemas.openxmlformats.org/officeDocument/2006/relationships" xmlns:p="http://schemas.openxmlformats.org/presentationml/2006/main">
+  <p:cSld>
+    <p:spTree>
+      <p:nvGrpSpPr>
+        <p:cNvPr id="1" name=""/>
+        <p:cNvGrpSpPr/>
+        <p:nvPr/>
+      </p:nvGrpSpPr>
+      <p:grpSpPr>
+        <a:xfrm>
+          <a:off x="0" y="0"/>
+          <a:ext cx="0" cy="0"/>
+          <a:chOff x="0" y="0"/>
+          <a:chExt cx="0" cy="0"/>
+        </a:xfrm>
+      </p:grpSpPr>
       <p:grpSp>
         <p:nvGrpSpPr>
           <p:cNvPr id="6" name="Groep 5">
@@ -4011,7 +4450,7 @@
 </p:sld>
 </file>
 
-<file path=ppt/slides/slide11.xml><?xml version="1.0" encoding="utf-8"?>
+<file path=ppt/slides/slide12.xml><?xml version="1.0" encoding="utf-8"?>
 <p:sld xmlns:a="http://schemas.openxmlformats.org/drawingml/2006/main" xmlns:r="http://schemas.openxmlformats.org/officeDocument/2006/relationships" xmlns:p="http://schemas.openxmlformats.org/presentationml/2006/main">
   <p:cSld>
     <p:spTree>
@@ -5212,7 +5651,7 @@
 </p:sld>
 </file>
 
-<file path=ppt/slides/slide12.xml><?xml version="1.0" encoding="utf-8"?>
+<file path=ppt/slides/slide13.xml><?xml version="1.0" encoding="utf-8"?>
 <p:sld xmlns:a="http://schemas.openxmlformats.org/drawingml/2006/main" xmlns:r="http://schemas.openxmlformats.org/officeDocument/2006/relationships" xmlns:p="http://schemas.openxmlformats.org/presentationml/2006/main">
   <p:cSld>
     <p:spTree>
@@ -5386,7 +5825,7 @@
 </p:sld>
 </file>
 
-<file path=ppt/slides/slide13.xml><?xml version="1.0" encoding="utf-8"?>
+<file path=ppt/slides/slide14.xml><?xml version="1.0" encoding="utf-8"?>
 <p:sld xmlns:a="http://schemas.openxmlformats.org/drawingml/2006/main" xmlns:r="http://schemas.openxmlformats.org/officeDocument/2006/relationships" xmlns:p="http://schemas.openxmlformats.org/presentationml/2006/main">
   <p:cSld>
     <p:spTree>
@@ -7312,7 +7751,7 @@
 </p:sld>
 </file>
 
-<file path=ppt/slides/slide14.xml><?xml version="1.0" encoding="utf-8"?>
+<file path=ppt/slides/slide15.xml><?xml version="1.0" encoding="utf-8"?>
 <p:sld xmlns:a="http://schemas.openxmlformats.org/drawingml/2006/main" xmlns:r="http://schemas.openxmlformats.org/officeDocument/2006/relationships" xmlns:p="http://schemas.openxmlformats.org/presentationml/2006/main">
   <p:cSld>
     <p:spTree>
@@ -8353,7 +8792,7 @@
 </p:sld>
 </file>
 
-<file path=ppt/slides/slide15.xml><?xml version="1.0" encoding="utf-8"?>
+<file path=ppt/slides/slide16.xml><?xml version="1.0" encoding="utf-8"?>
 <p:sld xmlns:a="http://schemas.openxmlformats.org/drawingml/2006/main" xmlns:r="http://schemas.openxmlformats.org/officeDocument/2006/relationships" xmlns:p="http://schemas.openxmlformats.org/presentationml/2006/main">
   <p:cSld>
     <p:spTree>
@@ -9401,7 +9840,7 @@
 </p:sld>
 </file>
 
-<file path=ppt/slides/slide16.xml><?xml version="1.0" encoding="utf-8"?>
+<file path=ppt/slides/slide17.xml><?xml version="1.0" encoding="utf-8"?>
 <p:sld xmlns:a="http://schemas.openxmlformats.org/drawingml/2006/main" xmlns:r="http://schemas.openxmlformats.org/officeDocument/2006/relationships" xmlns:p="http://schemas.openxmlformats.org/presentationml/2006/main">
   <p:cSld>
     <p:spTree>
@@ -16271,8 +16710,8 @@
           </p:nvSpPr>
           <p:spPr>
             <a:xfrm>
-              <a:off x="6535848" y="2067099"/>
-              <a:ext cx="1025545" cy="2143946"/>
+              <a:off x="6535848" y="2223337"/>
+              <a:ext cx="1025545" cy="1987707"/>
             </a:xfrm>
             <a:prstGeom prst="roundRect">
               <a:avLst/>
@@ -17043,7 +17482,7 @@
         </p:nvSpPr>
         <p:spPr>
           <a:xfrm>
-            <a:off x="7968735" y="1697205"/>
+            <a:off x="7968735" y="1946949"/>
             <a:ext cx="881822" cy="394447"/>
           </a:xfrm>
           <a:custGeom>
@@ -17225,7 +17664,7 @@
         </p:nvSpPr>
         <p:spPr>
           <a:xfrm>
-            <a:off x="981218" y="1093694"/>
+            <a:off x="8951884" y="155125"/>
             <a:ext cx="2971871" cy="1135957"/>
           </a:xfrm>
           <a:prstGeom prst="wedgeRoundRectCallout">
@@ -17283,7 +17722,7 @@
         </p:nvSpPr>
         <p:spPr>
           <a:xfrm>
-            <a:off x="1145593" y="1648130"/>
+            <a:off x="9143127" y="709561"/>
             <a:ext cx="1219201" cy="394447"/>
           </a:xfrm>
           <a:prstGeom prst="snip2DiagRect">
@@ -17341,7 +17780,7 @@
         </p:nvSpPr>
         <p:spPr>
           <a:xfrm>
-            <a:off x="2557605" y="1648130"/>
+            <a:off x="10553570" y="709561"/>
             <a:ext cx="1219201" cy="394447"/>
           </a:xfrm>
           <a:prstGeom prst="snip2DiagRect">
@@ -17399,8 +17838,8 @@
         </p:nvSpPr>
         <p:spPr>
           <a:xfrm>
-            <a:off x="983301" y="3960813"/>
-            <a:ext cx="1771851" cy="754626"/>
+            <a:off x="973062" y="3822462"/>
+            <a:ext cx="1719906" cy="754626"/>
           </a:xfrm>
           <a:prstGeom prst="wedgeRoundRectCallout">
             <a:avLst>
@@ -17439,7 +17878,7 @@
             <a:pPr algn="ctr"/>
             <a:r>
               <a:rPr lang="en-US" dirty="0">
-                <a:latin typeface="Myriad Pro" panose="020B0503030403020204" pitchFamily="34" charset="0"/>
+                <a:latin typeface="Source Sans Pro" panose="020B0503030403020204" pitchFamily="34" charset="0"/>
               </a:rPr>
               <a:t>Energy / Power source</a:t>
             </a:r>
@@ -17460,8 +17899,8 @@
         </p:nvSpPr>
         <p:spPr>
           <a:xfrm>
-            <a:off x="1674478" y="1163104"/>
-            <a:ext cx="1677430" cy="347159"/>
+            <a:off x="9576407" y="199450"/>
+            <a:ext cx="1865504" cy="347159"/>
           </a:xfrm>
           <a:prstGeom prst="wedgeRoundRectCallout">
             <a:avLst>
@@ -17502,7 +17941,7 @@
               <a:rPr lang="en-US" dirty="0">
                 <a:latin typeface="Consolas" panose="020B0609020204030204" pitchFamily="49" charset="0"/>
               </a:rPr>
-              <a:t>allocate()</a:t>
+              <a:t>distribute()</a:t>
             </a:r>
           </a:p>
         </p:txBody>
@@ -17561,9 +18000,131 @@
             <a:pPr algn="ctr"/>
             <a:r>
               <a:rPr lang="en-US" dirty="0">
-                <a:latin typeface="Myriad Pro" panose="020B0503030403020204" pitchFamily="34" charset="0"/>
+                <a:latin typeface="Source Sans Pro" panose="020B0503030403020204" pitchFamily="34" charset="0"/>
               </a:rPr>
               <a:t>Storage</a:t>
+            </a:r>
+          </a:p>
+        </p:txBody>
+      </p:sp>
+      <p:sp>
+        <p:nvSpPr>
+          <p:cNvPr id="23" name="Rechthoek: afgeschuinde diagonale hoeken 22">
+            <a:extLst>
+              <a:ext uri="{FF2B5EF4-FFF2-40B4-BE49-F238E27FC236}">
+                <a16:creationId xmlns:a16="http://schemas.microsoft.com/office/drawing/2014/main" id="{E530E280-1AA7-47CE-97BC-CCFDEDB182E3}"/>
+              </a:ext>
+            </a:extLst>
+          </p:cNvPr>
+          <p:cNvSpPr/>
+          <p:nvPr/>
+        </p:nvSpPr>
+        <p:spPr>
+          <a:xfrm>
+            <a:off x="1338252" y="1798852"/>
+            <a:ext cx="916879" cy="357406"/>
+          </a:xfrm>
+          <a:prstGeom prst="snip2DiagRect">
+            <a:avLst>
+              <a:gd name="adj1" fmla="val 12903"/>
+              <a:gd name="adj2" fmla="val 16667"/>
+            </a:avLst>
+          </a:prstGeom>
+          <a:noFill/>
+          <a:ln>
+            <a:noFill/>
+          </a:ln>
+        </p:spPr>
+        <p:style>
+          <a:lnRef idx="2">
+            <a:schemeClr val="accent2">
+              <a:shade val="50000"/>
+            </a:schemeClr>
+          </a:lnRef>
+          <a:fillRef idx="1">
+            <a:schemeClr val="accent2"/>
+          </a:fillRef>
+          <a:effectRef idx="0">
+            <a:schemeClr val="accent2"/>
+          </a:effectRef>
+          <a:fontRef idx="minor">
+            <a:schemeClr val="lt1"/>
+          </a:fontRef>
+        </p:style>
+        <p:txBody>
+          <a:bodyPr rtlCol="0" anchor="ctr"/>
+          <a:lstStyle/>
+          <a:p>
+            <a:pPr algn="ctr"/>
+            <a:r>
+              <a:rPr lang="en-US" dirty="0">
+                <a:solidFill>
+                  <a:srgbClr val="ED7D31"/>
+                </a:solidFill>
+                <a:latin typeface="Source Sans Pro" panose="020B0503030403020204" pitchFamily="34" charset="0"/>
+              </a:rPr>
+              <a:t>- input</a:t>
+            </a:r>
+          </a:p>
+        </p:txBody>
+      </p:sp>
+      <p:sp>
+        <p:nvSpPr>
+          <p:cNvPr id="25" name="Rechthoek: afgeschuinde diagonale hoeken 24">
+            <a:extLst>
+              <a:ext uri="{FF2B5EF4-FFF2-40B4-BE49-F238E27FC236}">
+                <a16:creationId xmlns:a16="http://schemas.microsoft.com/office/drawing/2014/main" id="{8DA4849E-ED8B-4D56-BF85-21EDBAEA18DD}"/>
+              </a:ext>
+            </a:extLst>
+          </p:cNvPr>
+          <p:cNvSpPr/>
+          <p:nvPr/>
+        </p:nvSpPr>
+        <p:spPr>
+          <a:xfrm>
+            <a:off x="1345651" y="2144172"/>
+            <a:ext cx="984762" cy="357406"/>
+          </a:xfrm>
+          <a:prstGeom prst="snip2DiagRect">
+            <a:avLst>
+              <a:gd name="adj1" fmla="val 12903"/>
+              <a:gd name="adj2" fmla="val 16667"/>
+            </a:avLst>
+          </a:prstGeom>
+          <a:noFill/>
+          <a:ln>
+            <a:noFill/>
+          </a:ln>
+        </p:spPr>
+        <p:style>
+          <a:lnRef idx="2">
+            <a:schemeClr val="accent2">
+              <a:shade val="50000"/>
+            </a:schemeClr>
+          </a:lnRef>
+          <a:fillRef idx="1">
+            <a:schemeClr val="accent2"/>
+          </a:fillRef>
+          <a:effectRef idx="0">
+            <a:schemeClr val="accent2"/>
+          </a:effectRef>
+          <a:fontRef idx="minor">
+            <a:schemeClr val="lt1"/>
+          </a:fontRef>
+        </p:style>
+        <p:txBody>
+          <a:bodyPr rtlCol="0" anchor="ctr"/>
+          <a:lstStyle/>
+          <a:p>
+            <a:pPr algn="ctr"/>
+            <a:r>
+              <a:rPr lang="en-US" dirty="0">
+                <a:solidFill>
+                  <a:srgbClr val="4472C4"/>
+                </a:solidFill>
+                <a:latin typeface="Source Sans Pro" panose="020B0503030403020204" pitchFamily="34" charset="0"/>
+              </a:rPr>
+              <a:t>- return</a:t>
             </a:r>
           </a:p>
         </p:txBody>
@@ -17620,7 +18181,7 @@
         </p:blipFill>
         <p:spPr>
           <a:xfrm>
-            <a:off x="10072106" y="3515125"/>
+            <a:off x="4888453" y="2533468"/>
             <a:ext cx="2059112" cy="3942272"/>
           </a:xfrm>
           <a:prstGeom prst="rect">
@@ -17650,7 +18211,7 @@
         </p:blipFill>
         <p:spPr>
           <a:xfrm>
-            <a:off x="9851366" y="4246589"/>
+            <a:off x="7128664" y="3930066"/>
             <a:ext cx="1884602" cy="2658717"/>
           </a:xfrm>
           <a:prstGeom prst="rect">
@@ -18301,7 +18862,7 @@
               <a:rPr lang="es-ES" sz="1600" dirty="0">
                 <a:latin typeface="Consolas" panose="020B0609020204030204" pitchFamily="49" charset="0"/>
               </a:rPr>
-              <a:t>15h</a:t>
+              <a:t>12h</a:t>
             </a:r>
           </a:p>
         </p:txBody>
@@ -18652,49 +19213,6 @@
           </a:p>
         </p:txBody>
       </p:sp>
-      <p:pic>
-        <p:nvPicPr>
-          <p:cNvPr id="8" name="Afbeelding 7">
-            <a:extLst>
-              <a:ext uri="{FF2B5EF4-FFF2-40B4-BE49-F238E27FC236}">
-                <a16:creationId xmlns:a16="http://schemas.microsoft.com/office/drawing/2014/main" id="{27ACA546-41C7-45FB-8840-C40C9DD78EFA}"/>
-              </a:ext>
-            </a:extLst>
-          </p:cNvPr>
-          <p:cNvPicPr>
-            <a:picLocks noChangeAspect="1"/>
-          </p:cNvPicPr>
-          <p:nvPr/>
-        </p:nvPicPr>
-        <p:blipFill>
-          <a:blip r:embed="rId3">
-            <a:duotone>
-              <a:schemeClr val="accent3">
-                <a:shade val="45000"/>
-                <a:satMod val="135000"/>
-              </a:schemeClr>
-              <a:prstClr val="white"/>
-            </a:duotone>
-            <a:extLst>
-              <a:ext uri="{28A0092B-C50C-407E-A947-70E740481C1C}">
-                <a14:useLocalDpi xmlns:a14="http://schemas.microsoft.com/office/drawing/2010/main" val="0"/>
-              </a:ext>
-            </a:extLst>
-          </a:blip>
-          <a:stretch>
-            <a:fillRect/>
-          </a:stretch>
-        </p:blipFill>
-        <p:spPr>
-          <a:xfrm>
-            <a:off x="1028562" y="1932058"/>
-            <a:ext cx="1275971" cy="1275971"/>
-          </a:xfrm>
-          <a:prstGeom prst="rect">
-            <a:avLst/>
-          </a:prstGeom>
-        </p:spPr>
-      </p:pic>
       <p:sp>
         <p:nvSpPr>
           <p:cNvPr id="21" name="Rechthoek 20">
@@ -18888,7 +19406,7 @@
           <p:nvPr/>
         </p:nvPicPr>
         <p:blipFill>
-          <a:blip r:embed="rId4"/>
+          <a:blip r:embed="rId3"/>
           <a:stretch>
             <a:fillRect/>
           </a:stretch>
@@ -18974,6 +19492,42 @@
           </a:p>
         </p:txBody>
       </p:sp>
+      <p:pic>
+        <p:nvPicPr>
+          <p:cNvPr id="11" name="Graphic 10">
+            <a:extLst>
+              <a:ext uri="{FF2B5EF4-FFF2-40B4-BE49-F238E27FC236}">
+                <a16:creationId xmlns:a16="http://schemas.microsoft.com/office/drawing/2014/main" id="{E83EA1E6-6748-43B7-9912-311313FF83F7}"/>
+              </a:ext>
+            </a:extLst>
+          </p:cNvPr>
+          <p:cNvPicPr>
+            <a:picLocks noChangeAspect="1"/>
+          </p:cNvPicPr>
+          <p:nvPr/>
+        </p:nvPicPr>
+        <p:blipFill>
+          <a:blip r:embed="rId4">
+            <a:extLst>
+              <a:ext uri="{96DAC541-7B7A-43D3-8B79-37D633B846F1}">
+                <asvg:svgBlip xmlns:asvg="http://schemas.microsoft.com/office/drawing/2016/SVG/main" r:embed="rId5"/>
+              </a:ext>
+            </a:extLst>
+          </a:blip>
+          <a:stretch>
+            <a:fillRect/>
+          </a:stretch>
+        </p:blipFill>
+        <p:spPr>
+          <a:xfrm>
+            <a:off x="1387478" y="2269129"/>
+            <a:ext cx="657225" cy="438150"/>
+          </a:xfrm>
+          <a:prstGeom prst="rect">
+            <a:avLst/>
+          </a:prstGeom>
+        </p:spPr>
+      </p:pic>
     </p:spTree>
     <p:extLst>
       <p:ext uri="{BB962C8B-B14F-4D97-AF65-F5344CB8AC3E}">
@@ -19018,10 +19572,10 @@
         </p:nvGrpSpPr>
         <p:grpSpPr>
           <a:xfrm>
-            <a:off x="4889432" y="1001033"/>
-            <a:ext cx="2048215" cy="2301177"/>
-            <a:chOff x="6153347" y="517637"/>
-            <a:chExt cx="2048215" cy="2301177"/>
+            <a:off x="5770242" y="1402969"/>
+            <a:ext cx="690113" cy="2301177"/>
+            <a:chOff x="7511449" y="517637"/>
+            <a:chExt cx="690113" cy="2301177"/>
           </a:xfrm>
         </p:grpSpPr>
         <p:sp>
@@ -19080,49 +19634,6 @@
             </a:p>
           </p:txBody>
         </p:sp>
-        <p:pic>
-          <p:nvPicPr>
-            <p:cNvPr id="16" name="Afbeelding 15">
-              <a:extLst>
-                <a:ext uri="{FF2B5EF4-FFF2-40B4-BE49-F238E27FC236}">
-                  <a16:creationId xmlns:a16="http://schemas.microsoft.com/office/drawing/2014/main" id="{825C8BD3-BC64-45CC-A04B-D3DC5674EAB5}"/>
-                </a:ext>
-              </a:extLst>
-            </p:cNvPr>
-            <p:cNvPicPr>
-              <a:picLocks noChangeAspect="1"/>
-            </p:cNvPicPr>
-            <p:nvPr/>
-          </p:nvPicPr>
-          <p:blipFill>
-            <a:blip r:embed="rId2">
-              <a:duotone>
-                <a:schemeClr val="accent3">
-                  <a:shade val="45000"/>
-                  <a:satMod val="135000"/>
-                </a:schemeClr>
-                <a:prstClr val="white"/>
-              </a:duotone>
-              <a:extLst>
-                <a:ext uri="{28A0092B-C50C-407E-A947-70E740481C1C}">
-                  <a14:useLocalDpi xmlns:a14="http://schemas.microsoft.com/office/drawing/2010/main" val="0"/>
-                </a:ext>
-              </a:extLst>
-            </a:blip>
-            <a:stretch>
-              <a:fillRect/>
-            </a:stretch>
-          </p:blipFill>
-          <p:spPr>
-            <a:xfrm>
-              <a:off x="6153347" y="1001033"/>
-              <a:ext cx="1275971" cy="1275971"/>
-            </a:xfrm>
-            <a:prstGeom prst="rect">
-              <a:avLst/>
-            </a:prstGeom>
-          </p:spPr>
-        </p:pic>
         <p:sp>
           <p:nvSpPr>
             <p:cNvPr id="19" name="Rechthoek: afgeronde hoeken 18">
@@ -19229,7 +19740,7 @@
                 <a:rPr lang="es-ES" sz="1600" dirty="0">
                   <a:latin typeface="Consolas" panose="020B0609020204030204" pitchFamily="49" charset="0"/>
                 </a:rPr>
-                <a:t>15h</a:t>
+                <a:t>12h</a:t>
               </a:r>
             </a:p>
           </p:txBody>
@@ -19304,10 +19815,10 @@
         </p:nvGrpSpPr>
         <p:grpSpPr>
           <a:xfrm>
-            <a:off x="1614874" y="1001033"/>
-            <a:ext cx="2048215" cy="2301177"/>
-            <a:chOff x="944313" y="1315658"/>
-            <a:chExt cx="2048215" cy="2301177"/>
+            <a:off x="3510560" y="1402969"/>
+            <a:ext cx="690114" cy="2301177"/>
+            <a:chOff x="2302414" y="1315658"/>
+            <a:chExt cx="690114" cy="2301177"/>
           </a:xfrm>
         </p:grpSpPr>
         <p:sp>
@@ -19366,49 +19877,6 @@
             </a:p>
           </p:txBody>
         </p:sp>
-        <p:pic>
-          <p:nvPicPr>
-            <p:cNvPr id="12" name="Afbeelding 11">
-              <a:extLst>
-                <a:ext uri="{FF2B5EF4-FFF2-40B4-BE49-F238E27FC236}">
-                  <a16:creationId xmlns:a16="http://schemas.microsoft.com/office/drawing/2014/main" id="{7221F89F-95AA-4C88-91A5-BB1AEC136D17}"/>
-                </a:ext>
-              </a:extLst>
-            </p:cNvPr>
-            <p:cNvPicPr>
-              <a:picLocks noChangeAspect="1"/>
-            </p:cNvPicPr>
-            <p:nvPr/>
-          </p:nvPicPr>
-          <p:blipFill>
-            <a:blip r:embed="rId2">
-              <a:duotone>
-                <a:schemeClr val="accent3">
-                  <a:shade val="45000"/>
-                  <a:satMod val="135000"/>
-                </a:schemeClr>
-                <a:prstClr val="white"/>
-              </a:duotone>
-              <a:extLst>
-                <a:ext uri="{28A0092B-C50C-407E-A947-70E740481C1C}">
-                  <a14:useLocalDpi xmlns:a14="http://schemas.microsoft.com/office/drawing/2010/main" val="0"/>
-                </a:ext>
-              </a:extLst>
-            </a:blip>
-            <a:stretch>
-              <a:fillRect/>
-            </a:stretch>
-          </p:blipFill>
-          <p:spPr>
-            <a:xfrm>
-              <a:off x="944313" y="1799054"/>
-              <a:ext cx="1275971" cy="1275971"/>
-            </a:xfrm>
-            <a:prstGeom prst="rect">
-              <a:avLst/>
-            </a:prstGeom>
-          </p:spPr>
-        </p:pic>
         <p:sp>
           <p:nvSpPr>
             <p:cNvPr id="20" name="Rechthoek: afgeronde hoeken 19">
@@ -19590,10 +20058,10 @@
         </p:nvGrpSpPr>
         <p:grpSpPr>
           <a:xfrm>
-            <a:off x="8312782" y="980721"/>
-            <a:ext cx="2048215" cy="2301177"/>
-            <a:chOff x="9264770" y="517637"/>
-            <a:chExt cx="2048215" cy="2301177"/>
+            <a:off x="8244017" y="1382657"/>
+            <a:ext cx="690113" cy="2301177"/>
+            <a:chOff x="10622872" y="517637"/>
+            <a:chExt cx="690113" cy="2301177"/>
           </a:xfrm>
         </p:grpSpPr>
         <p:sp>
@@ -19652,49 +20120,6 @@
             </a:p>
           </p:txBody>
         </p:sp>
-        <p:pic>
-          <p:nvPicPr>
-            <p:cNvPr id="18" name="Afbeelding 17">
-              <a:extLst>
-                <a:ext uri="{FF2B5EF4-FFF2-40B4-BE49-F238E27FC236}">
-                  <a16:creationId xmlns:a16="http://schemas.microsoft.com/office/drawing/2014/main" id="{99262EDF-82A8-40D6-A8F2-4E32FFA5E04D}"/>
-                </a:ext>
-              </a:extLst>
-            </p:cNvPr>
-            <p:cNvPicPr>
-              <a:picLocks noChangeAspect="1"/>
-            </p:cNvPicPr>
-            <p:nvPr/>
-          </p:nvPicPr>
-          <p:blipFill>
-            <a:blip r:embed="rId2">
-              <a:duotone>
-                <a:schemeClr val="accent3">
-                  <a:shade val="45000"/>
-                  <a:satMod val="135000"/>
-                </a:schemeClr>
-                <a:prstClr val="white"/>
-              </a:duotone>
-              <a:extLst>
-                <a:ext uri="{28A0092B-C50C-407E-A947-70E740481C1C}">
-                  <a14:useLocalDpi xmlns:a14="http://schemas.microsoft.com/office/drawing/2010/main" val="0"/>
-                </a:ext>
-              </a:extLst>
-            </a:blip>
-            <a:stretch>
-              <a:fillRect/>
-            </a:stretch>
-          </p:blipFill>
-          <p:spPr>
-            <a:xfrm>
-              <a:off x="9264770" y="1001033"/>
-              <a:ext cx="1275971" cy="1275971"/>
-            </a:xfrm>
-            <a:prstGeom prst="rect">
-              <a:avLst/>
-            </a:prstGeom>
-          </p:spPr>
-        </p:pic>
         <p:sp>
           <p:nvSpPr>
             <p:cNvPr id="26" name="Rechthoek 25">
@@ -19709,7 +20134,7 @@
           </p:nvSpPr>
           <p:spPr>
             <a:xfrm>
-              <a:off x="10688169" y="2277004"/>
+              <a:off x="10688169" y="1384243"/>
               <a:ext cx="559518" cy="399012"/>
             </a:xfrm>
             <a:prstGeom prst="rect">
@@ -19745,7 +20170,7 @@
                 <a:rPr lang="es-ES" sz="1600" dirty="0">
                   <a:latin typeface="Consolas" panose="020B0609020204030204" pitchFamily="49" charset="0"/>
                 </a:rPr>
-                <a:t>15h</a:t>
+                <a:t>12h</a:t>
               </a:r>
             </a:p>
           </p:txBody>
@@ -19765,8 +20190,8 @@
         </p:nvSpPr>
         <p:spPr>
           <a:xfrm>
-            <a:off x="1401761" y="3662112"/>
-            <a:ext cx="2794015" cy="870978"/>
+            <a:off x="2326750" y="3954155"/>
+            <a:ext cx="1945597" cy="984611"/>
           </a:xfrm>
           <a:prstGeom prst="wedgeRoundRectCallout">
             <a:avLst>
@@ -19805,7 +20230,7 @@
             <a:pPr algn="ctr"/>
             <a:r>
               <a:rPr lang="en-US" dirty="0">
-                <a:latin typeface="Myriad Pro" panose="020B0503030403020204" pitchFamily="34" charset="0"/>
+                <a:latin typeface="Source Sans Pro" panose="020B0503030403020204" pitchFamily="34" charset="0"/>
               </a:rPr>
               <a:t>“I am not in a hurry”</a:t>
             </a:r>
@@ -19826,8 +20251,8 @@
         </p:nvSpPr>
         <p:spPr>
           <a:xfrm>
-            <a:off x="4646122" y="3682424"/>
-            <a:ext cx="2794015" cy="870978"/>
+            <a:off x="4535591" y="3938659"/>
+            <a:ext cx="1945597" cy="1000108"/>
           </a:xfrm>
           <a:prstGeom prst="wedgeRoundRectCallout">
             <a:avLst>
@@ -19866,7 +20291,7 @@
             <a:pPr algn="ctr"/>
             <a:r>
               <a:rPr lang="en-US" dirty="0">
-                <a:latin typeface="Myriad Pro" panose="020B0503030403020204" pitchFamily="34" charset="0"/>
+                <a:latin typeface="Source Sans Pro" panose="020B0503030403020204" pitchFamily="34" charset="0"/>
               </a:rPr>
               <a:t>“Just a minimum charge in case of an emergency”</a:t>
             </a:r>
@@ -19887,8 +20312,8 @@
         </p:nvSpPr>
         <p:spPr>
           <a:xfrm>
-            <a:off x="7932556" y="3682424"/>
-            <a:ext cx="2949373" cy="870978"/>
+            <a:off x="6782026" y="3938659"/>
+            <a:ext cx="2191158" cy="1000108"/>
           </a:xfrm>
           <a:prstGeom prst="wedgeRoundRectCallout">
             <a:avLst>
@@ -19927,13 +20352,121 @@
             <a:pPr algn="ctr"/>
             <a:r>
               <a:rPr lang="en-US" dirty="0">
-                <a:latin typeface="Myriad Pro" panose="020B0503030403020204" pitchFamily="34" charset="0"/>
+                <a:latin typeface="Source Sans Pro" panose="020B0503030403020204" pitchFamily="34" charset="0"/>
               </a:rPr>
               <a:t>“My battery is huge. Charge whenever it is better”</a:t>
             </a:r>
           </a:p>
         </p:txBody>
       </p:sp>
+      <p:pic>
+        <p:nvPicPr>
+          <p:cNvPr id="21" name="Graphic 20">
+            <a:extLst>
+              <a:ext uri="{FF2B5EF4-FFF2-40B4-BE49-F238E27FC236}">
+                <a16:creationId xmlns:a16="http://schemas.microsoft.com/office/drawing/2014/main" id="{6E42DDCE-B4AB-42CD-A889-55BB309FC140}"/>
+              </a:ext>
+            </a:extLst>
+          </p:cNvPr>
+          <p:cNvPicPr>
+            <a:picLocks noChangeAspect="1"/>
+          </p:cNvPicPr>
+          <p:nvPr/>
+        </p:nvPicPr>
+        <p:blipFill>
+          <a:blip r:embed="rId2">
+            <a:extLst>
+              <a:ext uri="{96DAC541-7B7A-43D3-8B79-37D633B846F1}">
+                <asvg:svgBlip xmlns:asvg="http://schemas.microsoft.com/office/drawing/2016/SVG/main" r:embed="rId3"/>
+              </a:ext>
+            </a:extLst>
+          </a:blip>
+          <a:stretch>
+            <a:fillRect/>
+          </a:stretch>
+        </p:blipFill>
+        <p:spPr>
+          <a:xfrm>
+            <a:off x="2368588" y="2154118"/>
+            <a:ext cx="883959" cy="589307"/>
+          </a:xfrm>
+          <a:prstGeom prst="rect">
+            <a:avLst/>
+          </a:prstGeom>
+        </p:spPr>
+      </p:pic>
+      <p:pic>
+        <p:nvPicPr>
+          <p:cNvPr id="27" name="Graphic 26">
+            <a:extLst>
+              <a:ext uri="{FF2B5EF4-FFF2-40B4-BE49-F238E27FC236}">
+                <a16:creationId xmlns:a16="http://schemas.microsoft.com/office/drawing/2014/main" id="{FB221658-A14E-4483-985B-6FE0E8332A05}"/>
+              </a:ext>
+            </a:extLst>
+          </p:cNvPr>
+          <p:cNvPicPr>
+            <a:picLocks noChangeAspect="1"/>
+          </p:cNvPicPr>
+          <p:nvPr/>
+        </p:nvPicPr>
+        <p:blipFill>
+          <a:blip r:embed="rId2">
+            <a:extLst>
+              <a:ext uri="{96DAC541-7B7A-43D3-8B79-37D633B846F1}">
+                <asvg:svgBlip xmlns:asvg="http://schemas.microsoft.com/office/drawing/2016/SVG/main" r:embed="rId3"/>
+              </a:ext>
+            </a:extLst>
+          </a:blip>
+          <a:stretch>
+            <a:fillRect/>
+          </a:stretch>
+        </p:blipFill>
+        <p:spPr>
+          <a:xfrm>
+            <a:off x="4734749" y="2154117"/>
+            <a:ext cx="883959" cy="589307"/>
+          </a:xfrm>
+          <a:prstGeom prst="rect">
+            <a:avLst/>
+          </a:prstGeom>
+        </p:spPr>
+      </p:pic>
+      <p:pic>
+        <p:nvPicPr>
+          <p:cNvPr id="31" name="Graphic 30">
+            <a:extLst>
+              <a:ext uri="{FF2B5EF4-FFF2-40B4-BE49-F238E27FC236}">
+                <a16:creationId xmlns:a16="http://schemas.microsoft.com/office/drawing/2014/main" id="{1B0D9327-522A-4F97-AC89-C26181347A99}"/>
+              </a:ext>
+            </a:extLst>
+          </p:cNvPr>
+          <p:cNvPicPr>
+            <a:picLocks noChangeAspect="1"/>
+          </p:cNvPicPr>
+          <p:nvPr/>
+        </p:nvPicPr>
+        <p:blipFill>
+          <a:blip r:embed="rId2">
+            <a:extLst>
+              <a:ext uri="{96DAC541-7B7A-43D3-8B79-37D633B846F1}">
+                <asvg:svgBlip xmlns:asvg="http://schemas.microsoft.com/office/drawing/2016/SVG/main" r:embed="rId3"/>
+              </a:ext>
+            </a:extLst>
+          </a:blip>
+          <a:stretch>
+            <a:fillRect/>
+          </a:stretch>
+        </p:blipFill>
+        <p:spPr>
+          <a:xfrm>
+            <a:off x="7162210" y="2154116"/>
+            <a:ext cx="883959" cy="589307"/>
+          </a:xfrm>
+          <a:prstGeom prst="rect">
+            <a:avLst/>
+          </a:prstGeom>
+        </p:spPr>
+      </p:pic>
     </p:spTree>
     <p:extLst>
       <p:ext uri="{BB962C8B-B14F-4D97-AF65-F5344CB8AC3E}">

</xml_diff>

<commit_message>
synchronizer experiment, update images
</commit_message>
<xml_diff>
--- a/support/support_eflows.pptx
+++ b/support/support_eflows.pptx
@@ -11,15 +11,17 @@
     <p:sldId id="273" r:id="rId5"/>
     <p:sldId id="265" r:id="rId6"/>
     <p:sldId id="274" r:id="rId7"/>
-    <p:sldId id="266" r:id="rId8"/>
-    <p:sldId id="268" r:id="rId9"/>
-    <p:sldId id="269" r:id="rId10"/>
-    <p:sldId id="267" r:id="rId11"/>
-    <p:sldId id="257" r:id="rId12"/>
-    <p:sldId id="272" r:id="rId13"/>
-    <p:sldId id="262" r:id="rId14"/>
-    <p:sldId id="263" r:id="rId15"/>
-    <p:sldId id="260" r:id="rId16"/>
+    <p:sldId id="275" r:id="rId8"/>
+    <p:sldId id="266" r:id="rId9"/>
+    <p:sldId id="268" r:id="rId10"/>
+    <p:sldId id="269" r:id="rId11"/>
+    <p:sldId id="267" r:id="rId12"/>
+    <p:sldId id="257" r:id="rId13"/>
+    <p:sldId id="272" r:id="rId14"/>
+    <p:sldId id="276" r:id="rId15"/>
+    <p:sldId id="262" r:id="rId16"/>
+    <p:sldId id="263" r:id="rId17"/>
+    <p:sldId id="260" r:id="rId18"/>
   </p:sldIdLst>
   <p:sldSz cx="12192000" cy="6858000"/>
   <p:notesSz cx="6858000" cy="9144000"/>
@@ -133,6 +135,7 @@
         <p14:section name="fitting curve" id="{E37A4D50-1D68-416A-A1AB-A68F47444949}">
           <p14:sldIdLst>
             <p14:sldId id="274"/>
+            <p14:sldId id="275"/>
           </p14:sldIdLst>
         </p14:section>
         <p14:section name="Principles" id="{5B70542D-0864-4511-849B-3260EAAE84D0}">
@@ -151,6 +154,7 @@
           <p14:sldIdLst>
             <p14:sldId id="257"/>
             <p14:sldId id="272"/>
+            <p14:sldId id="276"/>
             <p14:sldId id="262"/>
             <p14:sldId id="263"/>
             <p14:sldId id="260"/>
@@ -163,6 +167,410 @@
     </p:ext>
   </p:extLst>
 </p:presentation>
+</file>
+
+<file path=ppt/revisionInfo.xml><?xml version="1.0" encoding="utf-8"?>
+<p1510:revInfo xmlns:a="http://schemas.openxmlformats.org/drawingml/2006/main" xmlns:r="http://schemas.openxmlformats.org/officeDocument/2006/relationships" xmlns:p1510="http://schemas.microsoft.com/office/powerpoint/2015/10/main">
+  <p1510:revLst>
+    <p1510:client id="{BEA97D3E-2050-4A75-A34E-E58E22EBA529}" v="24" dt="2018-12-22T12:50:19.071"/>
+  </p1510:revLst>
+</p1510:revInfo>
+</file>
+
+<file path=ppt/changesInfos/changesInfo1.xml><?xml version="1.0" encoding="utf-8"?>
+<pc:chgInfo xmlns:a="http://schemas.openxmlformats.org/drawingml/2006/main" xmlns:r="http://schemas.openxmlformats.org/officeDocument/2006/relationships" xmlns:ac="http://schemas.microsoft.com/office/drawing/2013/main/command" xmlns:pc="http://schemas.microsoft.com/office/powerpoint/2013/main/command">
+  <pc:docChgLst>
+    <pc:chgData name="Carlos Varela Martín" userId="f36e150ee4317515" providerId="LiveId" clId="{BEA97D3E-2050-4A75-A34E-E58E22EBA529}"/>
+    <pc:docChg chg="undo custSel addSld modSld sldOrd">
+      <pc:chgData name="Carlos Varela Martín" userId="f36e150ee4317515" providerId="LiveId" clId="{BEA97D3E-2050-4A75-A34E-E58E22EBA529}" dt="2018-12-22T12:50:24.230" v="364" actId="478"/>
+      <pc:docMkLst>
+        <pc:docMk/>
+      </pc:docMkLst>
+      <pc:sldChg chg="addSp delSp modSp add">
+        <pc:chgData name="Carlos Varela Martín" userId="f36e150ee4317515" providerId="LiveId" clId="{BEA97D3E-2050-4A75-A34E-E58E22EBA529}" dt="2018-12-22T12:38:17.728" v="232" actId="1036"/>
+        <pc:sldMkLst>
+          <pc:docMk/>
+          <pc:sldMk cId="2778268346" sldId="275"/>
+        </pc:sldMkLst>
+        <pc:spChg chg="add mod">
+          <ac:chgData name="Carlos Varela Martín" userId="f36e150ee4317515" providerId="LiveId" clId="{BEA97D3E-2050-4A75-A34E-E58E22EBA529}" dt="2018-12-22T12:38:05.750" v="212" actId="164"/>
+          <ac:spMkLst>
+            <pc:docMk/>
+            <pc:sldMk cId="2778268346" sldId="275"/>
+            <ac:spMk id="6" creationId="{B47AC452-C788-4CB5-BE0D-0ED321BDEC0A}"/>
+          </ac:spMkLst>
+        </pc:spChg>
+        <pc:spChg chg="add mod">
+          <ac:chgData name="Carlos Varela Martín" userId="f36e150ee4317515" providerId="LiveId" clId="{BEA97D3E-2050-4A75-A34E-E58E22EBA529}" dt="2018-12-22T12:38:05.750" v="212" actId="164"/>
+          <ac:spMkLst>
+            <pc:docMk/>
+            <pc:sldMk cId="2778268346" sldId="275"/>
+            <ac:spMk id="7" creationId="{37A5B257-8525-4787-88C3-8ACB800CAA06}"/>
+          </ac:spMkLst>
+        </pc:spChg>
+        <pc:spChg chg="add mod">
+          <ac:chgData name="Carlos Varela Martín" userId="f36e150ee4317515" providerId="LiveId" clId="{BEA97D3E-2050-4A75-A34E-E58E22EBA529}" dt="2018-12-22T12:38:17.728" v="232" actId="1036"/>
+          <ac:spMkLst>
+            <pc:docMk/>
+            <pc:sldMk cId="2778268346" sldId="275"/>
+            <ac:spMk id="21" creationId="{5227EE72-404F-4199-AE26-CFBEF2363564}"/>
+          </ac:spMkLst>
+        </pc:spChg>
+        <pc:spChg chg="del mod topLvl">
+          <ac:chgData name="Carlos Varela Martín" userId="f36e150ee4317515" providerId="LiveId" clId="{BEA97D3E-2050-4A75-A34E-E58E22EBA529}" dt="2018-12-22T12:35:54.928" v="141" actId="478"/>
+          <ac:spMkLst>
+            <pc:docMk/>
+            <pc:sldMk cId="2778268346" sldId="275"/>
+            <ac:spMk id="60" creationId="{61E54199-3884-4C03-81CB-FE59C33C12B9}"/>
+          </ac:spMkLst>
+        </pc:spChg>
+        <pc:spChg chg="mod topLvl">
+          <ac:chgData name="Carlos Varela Martín" userId="f36e150ee4317515" providerId="LiveId" clId="{BEA97D3E-2050-4A75-A34E-E58E22EBA529}" dt="2018-12-22T12:34:10.061" v="62" actId="1076"/>
+          <ac:spMkLst>
+            <pc:docMk/>
+            <pc:sldMk cId="2778268346" sldId="275"/>
+            <ac:spMk id="61" creationId="{08BB6C7D-4076-4E77-8AD7-1A03523C6DD5}"/>
+          </ac:spMkLst>
+        </pc:spChg>
+        <pc:spChg chg="mod">
+          <ac:chgData name="Carlos Varela Martín" userId="f36e150ee4317515" providerId="LiveId" clId="{BEA97D3E-2050-4A75-A34E-E58E22EBA529}" dt="2018-12-22T12:33:15.927" v="45" actId="1035"/>
+          <ac:spMkLst>
+            <pc:docMk/>
+            <pc:sldMk cId="2778268346" sldId="275"/>
+            <ac:spMk id="67" creationId="{FCE76FDB-4002-444D-9A15-C354E0708CD1}"/>
+          </ac:spMkLst>
+        </pc:spChg>
+        <pc:spChg chg="mod">
+          <ac:chgData name="Carlos Varela Martín" userId="f36e150ee4317515" providerId="LiveId" clId="{BEA97D3E-2050-4A75-A34E-E58E22EBA529}" dt="2018-12-22T12:33:39.175" v="55" actId="1035"/>
+          <ac:spMkLst>
+            <pc:docMk/>
+            <pc:sldMk cId="2778268346" sldId="275"/>
+            <ac:spMk id="68" creationId="{B2715FB0-B54D-4C0A-9EE5-88496E5F18DB}"/>
+          </ac:spMkLst>
+        </pc:spChg>
+        <pc:spChg chg="mod">
+          <ac:chgData name="Carlos Varela Martín" userId="f36e150ee4317515" providerId="LiveId" clId="{BEA97D3E-2050-4A75-A34E-E58E22EBA529}" dt="2018-12-22T12:33:32.539" v="49" actId="14100"/>
+          <ac:spMkLst>
+            <pc:docMk/>
+            <pc:sldMk cId="2778268346" sldId="275"/>
+            <ac:spMk id="69" creationId="{226A4F65-A7D8-4C31-8845-8669AC68F824}"/>
+          </ac:spMkLst>
+        </pc:spChg>
+        <pc:spChg chg="mod topLvl">
+          <ac:chgData name="Carlos Varela Martín" userId="f36e150ee4317515" providerId="LiveId" clId="{BEA97D3E-2050-4A75-A34E-E58E22EBA529}" dt="2018-12-22T12:36:33.835" v="150" actId="1076"/>
+          <ac:spMkLst>
+            <pc:docMk/>
+            <pc:sldMk cId="2778268346" sldId="275"/>
+            <ac:spMk id="70" creationId="{851D5282-4385-4A98-BA9E-A379A9E0F812}"/>
+          </ac:spMkLst>
+        </pc:spChg>
+        <pc:spChg chg="mod topLvl">
+          <ac:chgData name="Carlos Varela Martín" userId="f36e150ee4317515" providerId="LiveId" clId="{BEA97D3E-2050-4A75-A34E-E58E22EBA529}" dt="2018-12-22T12:38:05.750" v="212" actId="164"/>
+          <ac:spMkLst>
+            <pc:docMk/>
+            <pc:sldMk cId="2778268346" sldId="275"/>
+            <ac:spMk id="71" creationId="{6BF2A7C1-27D4-43B4-AB0E-5B1AC3142BBD}"/>
+          </ac:spMkLst>
+        </pc:spChg>
+        <pc:grpChg chg="mod topLvl">
+          <ac:chgData name="Carlos Varela Martín" userId="f36e150ee4317515" providerId="LiveId" clId="{BEA97D3E-2050-4A75-A34E-E58E22EBA529}" dt="2018-12-22T12:38:05.750" v="212" actId="164"/>
+          <ac:grpSpMkLst>
+            <pc:docMk/>
+            <pc:sldMk cId="2778268346" sldId="275"/>
+            <ac:grpSpMk id="2" creationId="{C7526A9D-4AB8-4EB7-8FF4-6E2E5725406F}"/>
+          </ac:grpSpMkLst>
+        </pc:grpChg>
+        <pc:grpChg chg="mod topLvl">
+          <ac:chgData name="Carlos Varela Martín" userId="f36e150ee4317515" providerId="LiveId" clId="{BEA97D3E-2050-4A75-A34E-E58E22EBA529}" dt="2018-12-22T12:38:05.750" v="212" actId="164"/>
+          <ac:grpSpMkLst>
+            <pc:docMk/>
+            <pc:sldMk cId="2778268346" sldId="275"/>
+            <ac:grpSpMk id="3" creationId="{4C505B6E-A8D2-4AF2-B19A-865F5054C9B9}"/>
+          </ac:grpSpMkLst>
+        </pc:grpChg>
+        <pc:grpChg chg="mod topLvl">
+          <ac:chgData name="Carlos Varela Martín" userId="f36e150ee4317515" providerId="LiveId" clId="{BEA97D3E-2050-4A75-A34E-E58E22EBA529}" dt="2018-12-22T12:38:05.750" v="212" actId="164"/>
+          <ac:grpSpMkLst>
+            <pc:docMk/>
+            <pc:sldMk cId="2778268346" sldId="275"/>
+            <ac:grpSpMk id="4" creationId="{98C49389-5EF9-4742-9E45-3914AD3CAA1E}"/>
+          </ac:grpSpMkLst>
+        </pc:grpChg>
+        <pc:grpChg chg="del">
+          <ac:chgData name="Carlos Varela Martín" userId="f36e150ee4317515" providerId="LiveId" clId="{BEA97D3E-2050-4A75-A34E-E58E22EBA529}" dt="2018-12-22T12:31:47.291" v="1" actId="165"/>
+          <ac:grpSpMkLst>
+            <pc:docMk/>
+            <pc:sldMk cId="2778268346" sldId="275"/>
+            <ac:grpSpMk id="5" creationId="{C359F4B9-6DA2-418F-A46F-1785291A4610}"/>
+          </ac:grpSpMkLst>
+        </pc:grpChg>
+        <pc:grpChg chg="add mod">
+          <ac:chgData name="Carlos Varela Martín" userId="f36e150ee4317515" providerId="LiveId" clId="{BEA97D3E-2050-4A75-A34E-E58E22EBA529}" dt="2018-12-22T12:38:05.750" v="212" actId="164"/>
+          <ac:grpSpMkLst>
+            <pc:docMk/>
+            <pc:sldMk cId="2778268346" sldId="275"/>
+            <ac:grpSpMk id="8" creationId="{D5ED4C82-3D57-411C-AE57-644077A3E7A0}"/>
+          </ac:grpSpMkLst>
+        </pc:grpChg>
+        <pc:picChg chg="mod topLvl">
+          <ac:chgData name="Carlos Varela Martín" userId="f36e150ee4317515" providerId="LiveId" clId="{BEA97D3E-2050-4A75-A34E-E58E22EBA529}" dt="2018-12-22T12:38:05.750" v="212" actId="164"/>
+          <ac:picMkLst>
+            <pc:docMk/>
+            <pc:sldMk cId="2778268346" sldId="275"/>
+            <ac:picMk id="55" creationId="{D09FC886-26D6-48E1-ACA9-B4F980E3BE3D}"/>
+          </ac:picMkLst>
+        </pc:picChg>
+        <pc:picChg chg="mod">
+          <ac:chgData name="Carlos Varela Martín" userId="f36e150ee4317515" providerId="LiveId" clId="{BEA97D3E-2050-4A75-A34E-E58E22EBA529}" dt="2018-12-22T12:35:04.282" v="108" actId="1036"/>
+          <ac:picMkLst>
+            <pc:docMk/>
+            <pc:sldMk cId="2778268346" sldId="275"/>
+            <ac:picMk id="56" creationId="{E67FB254-0CB8-46A1-AFCC-4F985D70A4B5}"/>
+          </ac:picMkLst>
+        </pc:picChg>
+        <pc:picChg chg="mod">
+          <ac:chgData name="Carlos Varela Martín" userId="f36e150ee4317515" providerId="LiveId" clId="{BEA97D3E-2050-4A75-A34E-E58E22EBA529}" dt="2018-12-22T12:35:16.342" v="130" actId="1035"/>
+          <ac:picMkLst>
+            <pc:docMk/>
+            <pc:sldMk cId="2778268346" sldId="275"/>
+            <ac:picMk id="57" creationId="{AFE5896D-E014-47E9-A8EB-74F209122F5A}"/>
+          </ac:picMkLst>
+        </pc:picChg>
+        <pc:picChg chg="mod">
+          <ac:chgData name="Carlos Varela Martín" userId="f36e150ee4317515" providerId="LiveId" clId="{BEA97D3E-2050-4A75-A34E-E58E22EBA529}" dt="2018-12-22T12:34:36.610" v="65" actId="1076"/>
+          <ac:picMkLst>
+            <pc:docMk/>
+            <pc:sldMk cId="2778268346" sldId="275"/>
+            <ac:picMk id="59" creationId="{53FD0E8C-9C12-4DAD-BDE8-51963ADE8FAA}"/>
+          </ac:picMkLst>
+        </pc:picChg>
+      </pc:sldChg>
+      <pc:sldChg chg="addSp delSp modSp add ord">
+        <pc:chgData name="Carlos Varela Martín" userId="f36e150ee4317515" providerId="LiveId" clId="{BEA97D3E-2050-4A75-A34E-E58E22EBA529}" dt="2018-12-22T12:50:24.230" v="364" actId="478"/>
+        <pc:sldMkLst>
+          <pc:docMk/>
+          <pc:sldMk cId="4217298631" sldId="276"/>
+        </pc:sldMkLst>
+        <pc:spChg chg="add mod topLvl">
+          <ac:chgData name="Carlos Varela Martín" userId="f36e150ee4317515" providerId="LiveId" clId="{BEA97D3E-2050-4A75-A34E-E58E22EBA529}" dt="2018-12-22T12:50:10.379" v="361" actId="165"/>
+          <ac:spMkLst>
+            <pc:docMk/>
+            <pc:sldMk cId="4217298631" sldId="276"/>
+            <ac:spMk id="2" creationId="{0D7B7C2C-8865-42BC-8FEE-964ADB6FB541}"/>
+          </ac:spMkLst>
+        </pc:spChg>
+        <pc:spChg chg="add mod topLvl">
+          <ac:chgData name="Carlos Varela Martín" userId="f36e150ee4317515" providerId="LiveId" clId="{BEA97D3E-2050-4A75-A34E-E58E22EBA529}" dt="2018-12-22T12:50:10.379" v="361" actId="165"/>
+          <ac:spMkLst>
+            <pc:docMk/>
+            <pc:sldMk cId="4217298631" sldId="276"/>
+            <ac:spMk id="6" creationId="{A1D0F5C7-BD13-46F0-90F7-8D7E32BAAF57}"/>
+          </ac:spMkLst>
+        </pc:spChg>
+        <pc:spChg chg="mod">
+          <ac:chgData name="Carlos Varela Martín" userId="f36e150ee4317515" providerId="LiveId" clId="{BEA97D3E-2050-4A75-A34E-E58E22EBA529}" dt="2018-12-22T12:45:48.973" v="305" actId="14100"/>
+          <ac:spMkLst>
+            <pc:docMk/>
+            <pc:sldMk cId="4217298631" sldId="276"/>
+            <ac:spMk id="35" creationId="{C6E52372-0CDC-4AAE-800C-B054CE6F791D}"/>
+          </ac:spMkLst>
+        </pc:spChg>
+        <pc:spChg chg="add mod topLvl">
+          <ac:chgData name="Carlos Varela Martín" userId="f36e150ee4317515" providerId="LiveId" clId="{BEA97D3E-2050-4A75-A34E-E58E22EBA529}" dt="2018-12-22T12:50:10.379" v="361" actId="165"/>
+          <ac:spMkLst>
+            <pc:docMk/>
+            <pc:sldMk cId="4217298631" sldId="276"/>
+            <ac:spMk id="44" creationId="{9737AA9E-6536-47F2-A956-FA94E6459183}"/>
+          </ac:spMkLst>
+        </pc:spChg>
+        <pc:spChg chg="del">
+          <ac:chgData name="Carlos Varela Martín" userId="f36e150ee4317515" providerId="LiveId" clId="{BEA97D3E-2050-4A75-A34E-E58E22EBA529}" dt="2018-12-22T12:41:41.346" v="254" actId="478"/>
+          <ac:spMkLst>
+            <pc:docMk/>
+            <pc:sldMk cId="4217298631" sldId="276"/>
+            <ac:spMk id="46" creationId="{95B105D7-FE4D-41F1-B0F7-12FD2A8E64F6}"/>
+          </ac:spMkLst>
+        </pc:spChg>
+        <pc:spChg chg="mod topLvl">
+          <ac:chgData name="Carlos Varela Martín" userId="f36e150ee4317515" providerId="LiveId" clId="{BEA97D3E-2050-4A75-A34E-E58E22EBA529}" dt="2018-12-22T12:50:10.379" v="361" actId="165"/>
+          <ac:spMkLst>
+            <pc:docMk/>
+            <pc:sldMk cId="4217298631" sldId="276"/>
+            <ac:spMk id="48" creationId="{2111D5F4-EB20-4B11-87B2-D8253140C143}"/>
+          </ac:spMkLst>
+        </pc:spChg>
+        <pc:spChg chg="mod topLvl">
+          <ac:chgData name="Carlos Varela Martín" userId="f36e150ee4317515" providerId="LiveId" clId="{BEA97D3E-2050-4A75-A34E-E58E22EBA529}" dt="2018-12-22T12:50:10.379" v="361" actId="165"/>
+          <ac:spMkLst>
+            <pc:docMk/>
+            <pc:sldMk cId="4217298631" sldId="276"/>
+            <ac:spMk id="49" creationId="{D454BD4A-7510-4277-96D7-E737DF5A968E}"/>
+          </ac:spMkLst>
+        </pc:spChg>
+        <pc:spChg chg="add mod topLvl">
+          <ac:chgData name="Carlos Varela Martín" userId="f36e150ee4317515" providerId="LiveId" clId="{BEA97D3E-2050-4A75-A34E-E58E22EBA529}" dt="2018-12-22T12:50:10.379" v="361" actId="165"/>
+          <ac:spMkLst>
+            <pc:docMk/>
+            <pc:sldMk cId="4217298631" sldId="276"/>
+            <ac:spMk id="50" creationId="{A3761784-E224-45AF-A315-CAAF3523936B}"/>
+          </ac:spMkLst>
+        </pc:spChg>
+        <pc:spChg chg="add mod topLvl">
+          <ac:chgData name="Carlos Varela Martín" userId="f36e150ee4317515" providerId="LiveId" clId="{BEA97D3E-2050-4A75-A34E-E58E22EBA529}" dt="2018-12-22T12:50:10.379" v="361" actId="165"/>
+          <ac:spMkLst>
+            <pc:docMk/>
+            <pc:sldMk cId="4217298631" sldId="276"/>
+            <ac:spMk id="51" creationId="{517A5A3E-36B3-4680-919F-F0679A6F5E77}"/>
+          </ac:spMkLst>
+        </pc:spChg>
+        <pc:spChg chg="add mod topLvl">
+          <ac:chgData name="Carlos Varela Martín" userId="f36e150ee4317515" providerId="LiveId" clId="{BEA97D3E-2050-4A75-A34E-E58E22EBA529}" dt="2018-12-22T12:50:10.379" v="361" actId="165"/>
+          <ac:spMkLst>
+            <pc:docMk/>
+            <pc:sldMk cId="4217298631" sldId="276"/>
+            <ac:spMk id="52" creationId="{32789738-BCEC-45CE-A629-2D2640616A94}"/>
+          </ac:spMkLst>
+        </pc:spChg>
+        <pc:spChg chg="add mod topLvl">
+          <ac:chgData name="Carlos Varela Martín" userId="f36e150ee4317515" providerId="LiveId" clId="{BEA97D3E-2050-4A75-A34E-E58E22EBA529}" dt="2018-12-22T12:50:10.379" v="361" actId="165"/>
+          <ac:spMkLst>
+            <pc:docMk/>
+            <pc:sldMk cId="4217298631" sldId="276"/>
+            <ac:spMk id="53" creationId="{7C19119D-EEA4-4296-A981-C92AB1AAD05B}"/>
+          </ac:spMkLst>
+        </pc:spChg>
+        <pc:spChg chg="add del mod">
+          <ac:chgData name="Carlos Varela Martín" userId="f36e150ee4317515" providerId="LiveId" clId="{BEA97D3E-2050-4A75-A34E-E58E22EBA529}" dt="2018-12-22T12:50:24.230" v="364" actId="478"/>
+          <ac:spMkLst>
+            <pc:docMk/>
+            <pc:sldMk cId="4217298631" sldId="276"/>
+            <ac:spMk id="54" creationId="{B5F7CA5C-288A-4A5A-ADB1-71B1A5978F19}"/>
+          </ac:spMkLst>
+        </pc:spChg>
+        <pc:spChg chg="mod topLvl">
+          <ac:chgData name="Carlos Varela Martín" userId="f36e150ee4317515" providerId="LiveId" clId="{BEA97D3E-2050-4A75-A34E-E58E22EBA529}" dt="2018-12-22T12:50:10.379" v="361" actId="165"/>
+          <ac:spMkLst>
+            <pc:docMk/>
+            <pc:sldMk cId="4217298631" sldId="276"/>
+            <ac:spMk id="56" creationId="{0AD8E80A-6CA5-43CB-A22B-BC71DE3D06EF}"/>
+          </ac:spMkLst>
+        </pc:spChg>
+        <pc:spChg chg="mod topLvl">
+          <ac:chgData name="Carlos Varela Martín" userId="f36e150ee4317515" providerId="LiveId" clId="{BEA97D3E-2050-4A75-A34E-E58E22EBA529}" dt="2018-12-22T12:50:10.379" v="361" actId="165"/>
+          <ac:spMkLst>
+            <pc:docMk/>
+            <pc:sldMk cId="4217298631" sldId="276"/>
+            <ac:spMk id="57" creationId="{C0A6DD0C-3BED-4984-968A-43D5E772F34B}"/>
+          </ac:spMkLst>
+        </pc:spChg>
+        <pc:spChg chg="del">
+          <ac:chgData name="Carlos Varela Martín" userId="f36e150ee4317515" providerId="LiveId" clId="{BEA97D3E-2050-4A75-A34E-E58E22EBA529}" dt="2018-12-22T12:40:52.544" v="237" actId="478"/>
+          <ac:spMkLst>
+            <pc:docMk/>
+            <pc:sldMk cId="4217298631" sldId="276"/>
+            <ac:spMk id="58" creationId="{1E76BC88-E8CB-4FA3-9106-20DFF277B133}"/>
+          </ac:spMkLst>
+        </pc:spChg>
+        <pc:spChg chg="del">
+          <ac:chgData name="Carlos Varela Martín" userId="f36e150ee4317515" providerId="LiveId" clId="{BEA97D3E-2050-4A75-A34E-E58E22EBA529}" dt="2018-12-22T12:42:44.657" v="265" actId="478"/>
+          <ac:spMkLst>
+            <pc:docMk/>
+            <pc:sldMk cId="4217298631" sldId="276"/>
+            <ac:spMk id="59" creationId="{2759EED9-A59D-447F-BE0B-F20E44E474B0}"/>
+          </ac:spMkLst>
+        </pc:spChg>
+        <pc:spChg chg="del">
+          <ac:chgData name="Carlos Varela Martín" userId="f36e150ee4317515" providerId="LiveId" clId="{BEA97D3E-2050-4A75-A34E-E58E22EBA529}" dt="2018-12-22T12:42:39.242" v="262" actId="478"/>
+          <ac:spMkLst>
+            <pc:docMk/>
+            <pc:sldMk cId="4217298631" sldId="276"/>
+            <ac:spMk id="60" creationId="{8406B4E2-BDA2-449E-963F-E410BBFC020E}"/>
+          </ac:spMkLst>
+        </pc:spChg>
+        <pc:spChg chg="del">
+          <ac:chgData name="Carlos Varela Martín" userId="f36e150ee4317515" providerId="LiveId" clId="{BEA97D3E-2050-4A75-A34E-E58E22EBA529}" dt="2018-12-22T12:42:51.555" v="268" actId="478"/>
+          <ac:spMkLst>
+            <pc:docMk/>
+            <pc:sldMk cId="4217298631" sldId="276"/>
+            <ac:spMk id="61" creationId="{47D29F45-AD16-4755-8123-1FED8EBAFC0F}"/>
+          </ac:spMkLst>
+        </pc:spChg>
+        <pc:spChg chg="del">
+          <ac:chgData name="Carlos Varela Martín" userId="f36e150ee4317515" providerId="LiveId" clId="{BEA97D3E-2050-4A75-A34E-E58E22EBA529}" dt="2018-12-22T12:41:33.208" v="251" actId="478"/>
+          <ac:spMkLst>
+            <pc:docMk/>
+            <pc:sldMk cId="4217298631" sldId="276"/>
+            <ac:spMk id="62" creationId="{5052FE26-8FCC-4C96-A776-AF46D7B8304C}"/>
+          </ac:spMkLst>
+        </pc:spChg>
+        <pc:spChg chg="mod topLvl">
+          <ac:chgData name="Carlos Varela Martín" userId="f36e150ee4317515" providerId="LiveId" clId="{BEA97D3E-2050-4A75-A34E-E58E22EBA529}" dt="2018-12-22T12:50:10.379" v="361" actId="165"/>
+          <ac:spMkLst>
+            <pc:docMk/>
+            <pc:sldMk cId="4217298631" sldId="276"/>
+            <ac:spMk id="63" creationId="{1C792E4E-5918-40B6-980E-9FF04A29BC14}"/>
+          </ac:spMkLst>
+        </pc:spChg>
+        <pc:spChg chg="mod topLvl">
+          <ac:chgData name="Carlos Varela Martín" userId="f36e150ee4317515" providerId="LiveId" clId="{BEA97D3E-2050-4A75-A34E-E58E22EBA529}" dt="2018-12-22T12:50:10.379" v="361" actId="165"/>
+          <ac:spMkLst>
+            <pc:docMk/>
+            <pc:sldMk cId="4217298631" sldId="276"/>
+            <ac:spMk id="64" creationId="{D74578DD-F913-4337-B11D-F1076D02F75F}"/>
+          </ac:spMkLst>
+        </pc:spChg>
+        <pc:spChg chg="del mod">
+          <ac:chgData name="Carlos Varela Martín" userId="f36e150ee4317515" providerId="LiveId" clId="{BEA97D3E-2050-4A75-A34E-E58E22EBA529}" dt="2018-12-22T12:40:50.138" v="236" actId="478"/>
+          <ac:spMkLst>
+            <pc:docMk/>
+            <pc:sldMk cId="4217298631" sldId="276"/>
+            <ac:spMk id="65" creationId="{7ADAFA4D-9234-47DE-9308-2D4693A38223}"/>
+          </ac:spMkLst>
+        </pc:spChg>
+        <pc:spChg chg="del">
+          <ac:chgData name="Carlos Varela Martín" userId="f36e150ee4317515" providerId="LiveId" clId="{BEA97D3E-2050-4A75-A34E-E58E22EBA529}" dt="2018-12-22T12:40:54.216" v="238" actId="478"/>
+          <ac:spMkLst>
+            <pc:docMk/>
+            <pc:sldMk cId="4217298631" sldId="276"/>
+            <ac:spMk id="66" creationId="{A6060F96-5DA9-436E-B288-A11A9FB69C3C}"/>
+          </ac:spMkLst>
+        </pc:spChg>
+        <pc:grpChg chg="add del mod">
+          <ac:chgData name="Carlos Varela Martín" userId="f36e150ee4317515" providerId="LiveId" clId="{BEA97D3E-2050-4A75-A34E-E58E22EBA529}" dt="2018-12-22T12:50:10.379" v="361" actId="165"/>
+          <ac:grpSpMkLst>
+            <pc:docMk/>
+            <pc:sldMk cId="4217298631" sldId="276"/>
+            <ac:grpSpMk id="7" creationId="{A10E8173-79BC-4ED7-88D2-FDC68424DA5D}"/>
+          </ac:grpSpMkLst>
+        </pc:grpChg>
+        <pc:grpChg chg="mod topLvl">
+          <ac:chgData name="Carlos Varela Martín" userId="f36e150ee4317515" providerId="LiveId" clId="{BEA97D3E-2050-4A75-A34E-E58E22EBA529}" dt="2018-12-22T12:50:10.379" v="361" actId="165"/>
+          <ac:grpSpMkLst>
+            <pc:docMk/>
+            <pc:sldMk cId="4217298631" sldId="276"/>
+            <ac:grpSpMk id="47" creationId="{A2C54758-B27F-429A-88FE-892600B709C1}"/>
+          </ac:grpSpMkLst>
+        </pc:grpChg>
+        <pc:picChg chg="mod topLvl modCrop">
+          <ac:chgData name="Carlos Varela Martín" userId="f36e150ee4317515" providerId="LiveId" clId="{BEA97D3E-2050-4A75-A34E-E58E22EBA529}" dt="2018-12-22T12:50:10.379" v="361" actId="165"/>
+          <ac:picMkLst>
+            <pc:docMk/>
+            <pc:sldMk cId="4217298631" sldId="276"/>
+            <ac:picMk id="4" creationId="{CA9D7E81-FD5B-43AE-AF48-ECF1FCE1058B}"/>
+          </ac:picMkLst>
+        </pc:picChg>
+        <pc:cxnChg chg="mod">
+          <ac:chgData name="Carlos Varela Martín" userId="f36e150ee4317515" providerId="LiveId" clId="{BEA97D3E-2050-4A75-A34E-E58E22EBA529}" dt="2018-12-22T12:45:21.127" v="303" actId="14100"/>
+          <ac:cxnSpMkLst>
+            <pc:docMk/>
+            <pc:sldMk cId="4217298631" sldId="276"/>
+            <ac:cxnSpMk id="45" creationId="{3E165466-9A18-495F-A97B-F2B85539E096}"/>
+          </ac:cxnSpMkLst>
+        </pc:cxnChg>
+      </pc:sldChg>
+    </pc:docChg>
+  </pc:docChgLst>
+</pc:chgInfo>
 </file>
 
 <file path=ppt/slideLayouts/slideLayout1.xml><?xml version="1.0" encoding="utf-8"?>
@@ -314,7 +722,7 @@
           <a:p>
             <a:fld id="{581C469B-4AAA-4FDE-898A-4F118D9816DE}" type="datetimeFigureOut">
               <a:rPr lang="es-ES" smtClean="0"/>
-              <a:t>21/11/2018</a:t>
+              <a:t>22/12/2018</a:t>
             </a:fld>
             <a:endParaRPr lang="es-ES"/>
           </a:p>
@@ -368,7 +776,7 @@
           <a:p>
             <a:fld id="{FC824D5B-8BBF-4941-A60A-3F80940A014C}" type="slidenum">
               <a:rPr lang="es-ES" smtClean="0"/>
-              <a:t>‹nr.›</a:t>
+              <a:t>‹#›</a:t>
             </a:fld>
             <a:endParaRPr lang="es-ES"/>
           </a:p>
@@ -514,7 +922,7 @@
           <a:p>
             <a:fld id="{581C469B-4AAA-4FDE-898A-4F118D9816DE}" type="datetimeFigureOut">
               <a:rPr lang="es-ES" smtClean="0"/>
-              <a:t>21/11/2018</a:t>
+              <a:t>22/12/2018</a:t>
             </a:fld>
             <a:endParaRPr lang="es-ES"/>
           </a:p>
@@ -568,7 +976,7 @@
           <a:p>
             <a:fld id="{FC824D5B-8BBF-4941-A60A-3F80940A014C}" type="slidenum">
               <a:rPr lang="es-ES" smtClean="0"/>
-              <a:t>‹nr.›</a:t>
+              <a:t>‹#›</a:t>
             </a:fld>
             <a:endParaRPr lang="es-ES"/>
           </a:p>
@@ -724,7 +1132,7 @@
           <a:p>
             <a:fld id="{581C469B-4AAA-4FDE-898A-4F118D9816DE}" type="datetimeFigureOut">
               <a:rPr lang="es-ES" smtClean="0"/>
-              <a:t>21/11/2018</a:t>
+              <a:t>22/12/2018</a:t>
             </a:fld>
             <a:endParaRPr lang="es-ES"/>
           </a:p>
@@ -778,7 +1186,7 @@
           <a:p>
             <a:fld id="{FC824D5B-8BBF-4941-A60A-3F80940A014C}" type="slidenum">
               <a:rPr lang="es-ES" smtClean="0"/>
-              <a:t>‹nr.›</a:t>
+              <a:t>‹#›</a:t>
             </a:fld>
             <a:endParaRPr lang="es-ES"/>
           </a:p>
@@ -924,7 +1332,7 @@
           <a:p>
             <a:fld id="{581C469B-4AAA-4FDE-898A-4F118D9816DE}" type="datetimeFigureOut">
               <a:rPr lang="es-ES" smtClean="0"/>
-              <a:t>21/11/2018</a:t>
+              <a:t>22/12/2018</a:t>
             </a:fld>
             <a:endParaRPr lang="es-ES"/>
           </a:p>
@@ -978,7 +1386,7 @@
           <a:p>
             <a:fld id="{FC824D5B-8BBF-4941-A60A-3F80940A014C}" type="slidenum">
               <a:rPr lang="es-ES" smtClean="0"/>
-              <a:t>‹nr.›</a:t>
+              <a:t>‹#›</a:t>
             </a:fld>
             <a:endParaRPr lang="es-ES"/>
           </a:p>
@@ -1200,7 +1608,7 @@
           <a:p>
             <a:fld id="{581C469B-4AAA-4FDE-898A-4F118D9816DE}" type="datetimeFigureOut">
               <a:rPr lang="es-ES" smtClean="0"/>
-              <a:t>21/11/2018</a:t>
+              <a:t>22/12/2018</a:t>
             </a:fld>
             <a:endParaRPr lang="es-ES"/>
           </a:p>
@@ -1254,7 +1662,7 @@
           <a:p>
             <a:fld id="{FC824D5B-8BBF-4941-A60A-3F80940A014C}" type="slidenum">
               <a:rPr lang="es-ES" smtClean="0"/>
-              <a:t>‹nr.›</a:t>
+              <a:t>‹#›</a:t>
             </a:fld>
             <a:endParaRPr lang="es-ES"/>
           </a:p>
@@ -1468,7 +1876,7 @@
           <a:p>
             <a:fld id="{581C469B-4AAA-4FDE-898A-4F118D9816DE}" type="datetimeFigureOut">
               <a:rPr lang="es-ES" smtClean="0"/>
-              <a:t>21/11/2018</a:t>
+              <a:t>22/12/2018</a:t>
             </a:fld>
             <a:endParaRPr lang="es-ES"/>
           </a:p>
@@ -1522,7 +1930,7 @@
           <a:p>
             <a:fld id="{FC824D5B-8BBF-4941-A60A-3F80940A014C}" type="slidenum">
               <a:rPr lang="es-ES" smtClean="0"/>
-              <a:t>‹nr.›</a:t>
+              <a:t>‹#›</a:t>
             </a:fld>
             <a:endParaRPr lang="es-ES"/>
           </a:p>
@@ -1883,7 +2291,7 @@
           <a:p>
             <a:fld id="{581C469B-4AAA-4FDE-898A-4F118D9816DE}" type="datetimeFigureOut">
               <a:rPr lang="es-ES" smtClean="0"/>
-              <a:t>21/11/2018</a:t>
+              <a:t>22/12/2018</a:t>
             </a:fld>
             <a:endParaRPr lang="es-ES"/>
           </a:p>
@@ -1937,7 +2345,7 @@
           <a:p>
             <a:fld id="{FC824D5B-8BBF-4941-A60A-3F80940A014C}" type="slidenum">
               <a:rPr lang="es-ES" smtClean="0"/>
-              <a:t>‹nr.›</a:t>
+              <a:t>‹#›</a:t>
             </a:fld>
             <a:endParaRPr lang="es-ES"/>
           </a:p>
@@ -2025,7 +2433,7 @@
           <a:p>
             <a:fld id="{581C469B-4AAA-4FDE-898A-4F118D9816DE}" type="datetimeFigureOut">
               <a:rPr lang="es-ES" smtClean="0"/>
-              <a:t>21/11/2018</a:t>
+              <a:t>22/12/2018</a:t>
             </a:fld>
             <a:endParaRPr lang="es-ES"/>
           </a:p>
@@ -2079,7 +2487,7 @@
           <a:p>
             <a:fld id="{FC824D5B-8BBF-4941-A60A-3F80940A014C}" type="slidenum">
               <a:rPr lang="es-ES" smtClean="0"/>
-              <a:t>‹nr.›</a:t>
+              <a:t>‹#›</a:t>
             </a:fld>
             <a:endParaRPr lang="es-ES"/>
           </a:p>
@@ -2138,7 +2546,7 @@
           <a:p>
             <a:fld id="{581C469B-4AAA-4FDE-898A-4F118D9816DE}" type="datetimeFigureOut">
               <a:rPr lang="es-ES" smtClean="0"/>
-              <a:t>21/11/2018</a:t>
+              <a:t>22/12/2018</a:t>
             </a:fld>
             <a:endParaRPr lang="es-ES"/>
           </a:p>
@@ -2192,7 +2600,7 @@
           <a:p>
             <a:fld id="{FC824D5B-8BBF-4941-A60A-3F80940A014C}" type="slidenum">
               <a:rPr lang="es-ES" smtClean="0"/>
-              <a:t>‹nr.›</a:t>
+              <a:t>‹#›</a:t>
             </a:fld>
             <a:endParaRPr lang="es-ES"/>
           </a:p>
@@ -2451,7 +2859,7 @@
           <a:p>
             <a:fld id="{581C469B-4AAA-4FDE-898A-4F118D9816DE}" type="datetimeFigureOut">
               <a:rPr lang="es-ES" smtClean="0"/>
-              <a:t>21/11/2018</a:t>
+              <a:t>22/12/2018</a:t>
             </a:fld>
             <a:endParaRPr lang="es-ES"/>
           </a:p>
@@ -2505,7 +2913,7 @@
           <a:p>
             <a:fld id="{FC824D5B-8BBF-4941-A60A-3F80940A014C}" type="slidenum">
               <a:rPr lang="es-ES" smtClean="0"/>
-              <a:t>‹nr.›</a:t>
+              <a:t>‹#›</a:t>
             </a:fld>
             <a:endParaRPr lang="es-ES"/>
           </a:p>
@@ -2740,7 +3148,7 @@
           <a:p>
             <a:fld id="{581C469B-4AAA-4FDE-898A-4F118D9816DE}" type="datetimeFigureOut">
               <a:rPr lang="es-ES" smtClean="0"/>
-              <a:t>21/11/2018</a:t>
+              <a:t>22/12/2018</a:t>
             </a:fld>
             <a:endParaRPr lang="es-ES"/>
           </a:p>
@@ -2794,7 +3202,7 @@
           <a:p>
             <a:fld id="{FC824D5B-8BBF-4941-A60A-3F80940A014C}" type="slidenum">
               <a:rPr lang="es-ES" smtClean="0"/>
-              <a:t>‹nr.›</a:t>
+              <a:t>‹#›</a:t>
             </a:fld>
             <a:endParaRPr lang="es-ES"/>
           </a:p>
@@ -2983,7 +3391,7 @@
           <a:p>
             <a:fld id="{581C469B-4AAA-4FDE-898A-4F118D9816DE}" type="datetimeFigureOut">
               <a:rPr lang="es-ES" smtClean="0"/>
-              <a:t>21/11/2018</a:t>
+              <a:t>22/12/2018</a:t>
             </a:fld>
             <a:endParaRPr lang="es-ES"/>
           </a:p>
@@ -3073,7 +3481,7 @@
           <a:p>
             <a:fld id="{FC824D5B-8BBF-4941-A60A-3F80940A014C}" type="slidenum">
               <a:rPr lang="es-ES" smtClean="0"/>
-              <a:t>‹nr.›</a:t>
+              <a:t>‹#›</a:t>
             </a:fld>
             <a:endParaRPr lang="es-ES"/>
           </a:p>
@@ -4643,6 +5051,212 @@
 </file>
 
 <file path=ppt/slides/slide10.xml><?xml version="1.0" encoding="utf-8"?>
+<p:sld xmlns:a="http://schemas.openxmlformats.org/drawingml/2006/main" xmlns:r="http://schemas.openxmlformats.org/officeDocument/2006/relationships" xmlns:p="http://schemas.openxmlformats.org/presentationml/2006/main">
+  <p:cSld>
+    <p:spTree>
+      <p:nvGrpSpPr>
+        <p:cNvPr id="1" name=""/>
+        <p:cNvGrpSpPr/>
+        <p:nvPr/>
+      </p:nvGrpSpPr>
+      <p:grpSpPr>
+        <a:xfrm>
+          <a:off x="0" y="0"/>
+          <a:ext cx="0" cy="0"/>
+          <a:chOff x="0" y="0"/>
+          <a:chExt cx="0" cy="0"/>
+        </a:xfrm>
+      </p:grpSpPr>
+      <p:pic>
+        <p:nvPicPr>
+          <p:cNvPr id="4" name="Afbeelding 3">
+            <a:extLst>
+              <a:ext uri="{FF2B5EF4-FFF2-40B4-BE49-F238E27FC236}">
+                <a16:creationId xmlns:a16="http://schemas.microsoft.com/office/drawing/2014/main" id="{5D3A40C2-5DFF-4E25-BE95-C39C40B031BD}"/>
+              </a:ext>
+            </a:extLst>
+          </p:cNvPr>
+          <p:cNvPicPr>
+            <a:picLocks noChangeAspect="1"/>
+          </p:cNvPicPr>
+          <p:nvPr/>
+        </p:nvPicPr>
+        <p:blipFill>
+          <a:blip r:embed="rId2">
+            <a:extLst>
+              <a:ext uri="{28A0092B-C50C-407E-A947-70E740481C1C}">
+                <a14:useLocalDpi xmlns:a14="http://schemas.microsoft.com/office/drawing/2010/main" val="0"/>
+              </a:ext>
+            </a:extLst>
+          </a:blip>
+          <a:stretch>
+            <a:fillRect/>
+          </a:stretch>
+        </p:blipFill>
+        <p:spPr>
+          <a:xfrm>
+            <a:off x="3660986" y="1086120"/>
+            <a:ext cx="4762500" cy="2571750"/>
+          </a:xfrm>
+          <a:prstGeom prst="rect">
+            <a:avLst/>
+          </a:prstGeom>
+        </p:spPr>
+      </p:pic>
+      <p:sp>
+        <p:nvSpPr>
+          <p:cNvPr id="5" name="Tekstballon: rechthoek met afgeronde hoeken 4">
+            <a:extLst>
+              <a:ext uri="{FF2B5EF4-FFF2-40B4-BE49-F238E27FC236}">
+                <a16:creationId xmlns:a16="http://schemas.microsoft.com/office/drawing/2014/main" id="{C3840F02-3BF8-43B5-BCC9-0ECDBD32A843}"/>
+              </a:ext>
+            </a:extLst>
+          </p:cNvPr>
+          <p:cNvSpPr/>
+          <p:nvPr/>
+        </p:nvSpPr>
+        <p:spPr>
+          <a:xfrm>
+            <a:off x="3149823" y="4295475"/>
+            <a:ext cx="2794015" cy="870978"/>
+          </a:xfrm>
+          <a:prstGeom prst="wedgeRoundRectCallout">
+            <a:avLst>
+              <a:gd name="adj1" fmla="val -27257"/>
+              <a:gd name="adj2" fmla="val 3548"/>
+              <a:gd name="adj3" fmla="val 16667"/>
+            </a:avLst>
+          </a:prstGeom>
+          <a:solidFill>
+            <a:schemeClr val="bg1">
+              <a:lumMod val="85000"/>
+            </a:schemeClr>
+          </a:solidFill>
+          <a:ln>
+            <a:noFill/>
+          </a:ln>
+        </p:spPr>
+        <p:style>
+          <a:lnRef idx="0">
+            <a:scrgbClr r="0" g="0" b="0"/>
+          </a:lnRef>
+          <a:fillRef idx="0">
+            <a:scrgbClr r="0" g="0" b="0"/>
+          </a:fillRef>
+          <a:effectRef idx="0">
+            <a:scrgbClr r="0" g="0" b="0"/>
+          </a:effectRef>
+          <a:fontRef idx="minor">
+            <a:schemeClr val="dk1"/>
+          </a:fontRef>
+        </p:style>
+        <p:txBody>
+          <a:bodyPr rtlCol="0" anchor="ctr"/>
+          <a:lstStyle/>
+          <a:p>
+            <a:pPr algn="ctr"/>
+            <a:r>
+              <a:rPr lang="en-US" dirty="0">
+                <a:latin typeface="Myriad Pro" panose="020B0503030403020204" pitchFamily="34" charset="0"/>
+              </a:rPr>
+              <a:t>OOP</a:t>
+            </a:r>
+          </a:p>
+          <a:p>
+            <a:pPr algn="ctr"/>
+            <a:r>
+              <a:rPr lang="en-US" dirty="0">
+                <a:latin typeface="Myriad Pro" panose="020B0503030403020204" pitchFamily="34" charset="0"/>
+              </a:rPr>
+              <a:t>Inheritance and encapsulation</a:t>
+            </a:r>
+          </a:p>
+        </p:txBody>
+      </p:sp>
+      <p:sp>
+        <p:nvSpPr>
+          <p:cNvPr id="6" name="Tekstballon: rechthoek met afgeronde hoeken 5">
+            <a:extLst>
+              <a:ext uri="{FF2B5EF4-FFF2-40B4-BE49-F238E27FC236}">
+                <a16:creationId xmlns:a16="http://schemas.microsoft.com/office/drawing/2014/main" id="{7649A52F-2D75-4561-8468-91F047F49D60}"/>
+              </a:ext>
+            </a:extLst>
+          </p:cNvPr>
+          <p:cNvSpPr/>
+          <p:nvPr/>
+        </p:nvSpPr>
+        <p:spPr>
+          <a:xfrm>
+            <a:off x="6118090" y="4295475"/>
+            <a:ext cx="2794015" cy="870978"/>
+          </a:xfrm>
+          <a:prstGeom prst="wedgeRoundRectCallout">
+            <a:avLst>
+              <a:gd name="adj1" fmla="val -27257"/>
+              <a:gd name="adj2" fmla="val 3548"/>
+              <a:gd name="adj3" fmla="val 16667"/>
+            </a:avLst>
+          </a:prstGeom>
+          <a:solidFill>
+            <a:schemeClr val="bg1">
+              <a:lumMod val="85000"/>
+            </a:schemeClr>
+          </a:solidFill>
+          <a:ln>
+            <a:noFill/>
+          </a:ln>
+        </p:spPr>
+        <p:style>
+          <a:lnRef idx="0">
+            <a:scrgbClr r="0" g="0" b="0"/>
+          </a:lnRef>
+          <a:fillRef idx="0">
+            <a:scrgbClr r="0" g="0" b="0"/>
+          </a:fillRef>
+          <a:effectRef idx="0">
+            <a:scrgbClr r="0" g="0" b="0"/>
+          </a:effectRef>
+          <a:fontRef idx="minor">
+            <a:schemeClr val="dk1"/>
+          </a:fontRef>
+        </p:style>
+        <p:txBody>
+          <a:bodyPr rtlCol="0" anchor="ctr"/>
+          <a:lstStyle/>
+          <a:p>
+            <a:pPr algn="ctr"/>
+            <a:r>
+              <a:rPr lang="en-US" dirty="0">
+                <a:latin typeface="Myriad Pro" panose="020B0503030403020204" pitchFamily="34" charset="0"/>
+              </a:rPr>
+              <a:t>FP</a:t>
+            </a:r>
+          </a:p>
+          <a:p>
+            <a:pPr algn="ctr"/>
+            <a:r>
+              <a:rPr lang="en-US" dirty="0">
+                <a:latin typeface="Myriad Pro" panose="020B0503030403020204" pitchFamily="34" charset="0"/>
+              </a:rPr>
+              <a:t>Separation of data and functions and high level of abstraction</a:t>
+            </a:r>
+          </a:p>
+        </p:txBody>
+      </p:sp>
+    </p:spTree>
+    <p:extLst>
+      <p:ext uri="{BB962C8B-B14F-4D97-AF65-F5344CB8AC3E}">
+        <p14:creationId xmlns:p14="http://schemas.microsoft.com/office/powerpoint/2010/main" val="953885131"/>
+      </p:ext>
+    </p:extLst>
+  </p:cSld>
+  <p:clrMapOvr>
+    <a:masterClrMapping/>
+  </p:clrMapOvr>
+</p:sld>
+</file>
+
+<file path=ppt/slides/slide11.xml><?xml version="1.0" encoding="utf-8"?>
 <p:sld xmlns:a="http://schemas.openxmlformats.org/drawingml/2006/main" xmlns:r="http://schemas.openxmlformats.org/officeDocument/2006/relationships" xmlns:p="http://schemas.openxmlformats.org/presentationml/2006/main">
   <p:cSld>
     <p:spTree>
@@ -6260,7 +6874,7 @@
 </p:sld>
 </file>
 
-<file path=ppt/slides/slide11.xml><?xml version="1.0" encoding="utf-8"?>
+<file path=ppt/slides/slide12.xml><?xml version="1.0" encoding="utf-8"?>
 <p:sld xmlns:a="http://schemas.openxmlformats.org/drawingml/2006/main" xmlns:r="http://schemas.openxmlformats.org/officeDocument/2006/relationships" xmlns:p="http://schemas.openxmlformats.org/presentationml/2006/main">
   <p:cSld>
     <p:spTree>
@@ -7300,7 +7914,7 @@
 </p:sld>
 </file>
 
-<file path=ppt/slides/slide12.xml><?xml version="1.0" encoding="utf-8"?>
+<file path=ppt/slides/slide13.xml><?xml version="1.0" encoding="utf-8"?>
 <p:sld xmlns:a="http://schemas.openxmlformats.org/drawingml/2006/main" xmlns:r="http://schemas.openxmlformats.org/officeDocument/2006/relationships" xmlns:p="http://schemas.openxmlformats.org/presentationml/2006/main">
   <p:cSld>
     <p:spTree>
@@ -7804,7 +8418,1883 @@
 </p:sld>
 </file>
 
-<file path=ppt/slides/slide13.xml><?xml version="1.0" encoding="utf-8"?>
+<file path=ppt/slides/slide14.xml><?xml version="1.0" encoding="utf-8"?>
+<p:sld xmlns:a="http://schemas.openxmlformats.org/drawingml/2006/main" xmlns:r="http://schemas.openxmlformats.org/officeDocument/2006/relationships" xmlns:p="http://schemas.openxmlformats.org/presentationml/2006/main">
+  <p:cSld>
+    <p:spTree>
+      <p:nvGrpSpPr>
+        <p:cNvPr id="1" name=""/>
+        <p:cNvGrpSpPr/>
+        <p:nvPr/>
+      </p:nvGrpSpPr>
+      <p:grpSpPr>
+        <a:xfrm>
+          <a:off x="0" y="0"/>
+          <a:ext cx="0" cy="0"/>
+          <a:chOff x="0" y="0"/>
+          <a:chExt cx="0" cy="0"/>
+        </a:xfrm>
+      </p:grpSpPr>
+      <p:pic>
+        <p:nvPicPr>
+          <p:cNvPr id="4" name="Afbeelding 3">
+            <a:extLst>
+              <a:ext uri="{FF2B5EF4-FFF2-40B4-BE49-F238E27FC236}">
+                <a16:creationId xmlns:a16="http://schemas.microsoft.com/office/drawing/2014/main" id="{CA9D7E81-FD5B-43AE-AF48-ECF1FCE1058B}"/>
+              </a:ext>
+            </a:extLst>
+          </p:cNvPr>
+          <p:cNvPicPr>
+            <a:picLocks noChangeAspect="1"/>
+          </p:cNvPicPr>
+          <p:nvPr/>
+        </p:nvPicPr>
+        <p:blipFill rotWithShape="1">
+          <a:blip r:embed="rId2"/>
+          <a:srcRect r="10019"/>
+          <a:stretch/>
+        </p:blipFill>
+        <p:spPr>
+          <a:xfrm>
+            <a:off x="6369990" y="1351278"/>
+            <a:ext cx="3942410" cy="2911550"/>
+          </a:xfrm>
+          <a:prstGeom prst="rect">
+            <a:avLst/>
+          </a:prstGeom>
+        </p:spPr>
+      </p:pic>
+      <p:grpSp>
+        <p:nvGrpSpPr>
+          <p:cNvPr id="47" name="Groep 46">
+            <a:extLst>
+              <a:ext uri="{FF2B5EF4-FFF2-40B4-BE49-F238E27FC236}">
+                <a16:creationId xmlns:a16="http://schemas.microsoft.com/office/drawing/2014/main" id="{A2C54758-B27F-429A-88FE-892600B709C1}"/>
+              </a:ext>
+            </a:extLst>
+          </p:cNvPr>
+          <p:cNvGrpSpPr/>
+          <p:nvPr/>
+        </p:nvGrpSpPr>
+        <p:grpSpPr>
+          <a:xfrm>
+            <a:off x="1129226" y="1527880"/>
+            <a:ext cx="9183174" cy="5218761"/>
+            <a:chOff x="1129226" y="845708"/>
+            <a:chExt cx="9183174" cy="5218761"/>
+          </a:xfrm>
+        </p:grpSpPr>
+        <p:grpSp>
+          <p:nvGrpSpPr>
+            <p:cNvPr id="36" name="Groep 35">
+              <a:extLst>
+                <a:ext uri="{FF2B5EF4-FFF2-40B4-BE49-F238E27FC236}">
+                  <a16:creationId xmlns:a16="http://schemas.microsoft.com/office/drawing/2014/main" id="{471CE262-DB4C-4D93-84B1-C25446AEF670}"/>
+                </a:ext>
+              </a:extLst>
+            </p:cNvPr>
+            <p:cNvGrpSpPr/>
+            <p:nvPr/>
+          </p:nvGrpSpPr>
+          <p:grpSpPr>
+            <a:xfrm>
+              <a:off x="1129226" y="1306525"/>
+              <a:ext cx="7129586" cy="4757944"/>
+              <a:chOff x="1129226" y="1306525"/>
+              <a:chExt cx="7129586" cy="4757944"/>
+            </a:xfrm>
+          </p:grpSpPr>
+          <p:grpSp>
+            <p:nvGrpSpPr>
+              <p:cNvPr id="17" name="Groep 16">
+                <a:extLst>
+                  <a:ext uri="{FF2B5EF4-FFF2-40B4-BE49-F238E27FC236}">
+                    <a16:creationId xmlns:a16="http://schemas.microsoft.com/office/drawing/2014/main" id="{8ACDC2B9-159E-49ED-961C-37729EF41ACE}"/>
+                  </a:ext>
+                </a:extLst>
+              </p:cNvPr>
+              <p:cNvGrpSpPr/>
+              <p:nvPr/>
+            </p:nvGrpSpPr>
+            <p:grpSpPr>
+              <a:xfrm>
+                <a:off x="1672240" y="1306525"/>
+                <a:ext cx="1097280" cy="794582"/>
+                <a:chOff x="889175" y="1002687"/>
+                <a:chExt cx="1097280" cy="794582"/>
+              </a:xfrm>
+            </p:grpSpPr>
+            <p:cxnSp>
+              <p:nvCxnSpPr>
+                <p:cNvPr id="18" name="Rechte verbindingslijn 17">
+                  <a:extLst>
+                    <a:ext uri="{FF2B5EF4-FFF2-40B4-BE49-F238E27FC236}">
+                      <a16:creationId xmlns:a16="http://schemas.microsoft.com/office/drawing/2014/main" id="{E443E526-A290-427A-A10A-DB24FDD6E3F4}"/>
+                    </a:ext>
+                  </a:extLst>
+                </p:cNvPr>
+                <p:cNvCxnSpPr/>
+                <p:nvPr/>
+              </p:nvCxnSpPr>
+              <p:spPr>
+                <a:xfrm>
+                  <a:off x="889175" y="1002687"/>
+                  <a:ext cx="1097280" cy="0"/>
+                </a:xfrm>
+                <a:prstGeom prst="line">
+                  <a:avLst/>
+                </a:prstGeom>
+              </p:spPr>
+              <p:style>
+                <a:lnRef idx="3">
+                  <a:schemeClr val="dk1"/>
+                </a:lnRef>
+                <a:fillRef idx="0">
+                  <a:schemeClr val="dk1"/>
+                </a:fillRef>
+                <a:effectRef idx="2">
+                  <a:schemeClr val="dk1"/>
+                </a:effectRef>
+                <a:fontRef idx="minor">
+                  <a:schemeClr val="tx1"/>
+                </a:fontRef>
+              </p:style>
+            </p:cxnSp>
+            <p:cxnSp>
+              <p:nvCxnSpPr>
+                <p:cNvPr id="19" name="Rechte verbindingslijn 18">
+                  <a:extLst>
+                    <a:ext uri="{FF2B5EF4-FFF2-40B4-BE49-F238E27FC236}">
+                      <a16:creationId xmlns:a16="http://schemas.microsoft.com/office/drawing/2014/main" id="{906EA044-3631-47DE-AD1A-FA93DB42DF09}"/>
+                    </a:ext>
+                  </a:extLst>
+                </p:cNvPr>
+                <p:cNvCxnSpPr>
+                  <a:cxnSpLocks/>
+                </p:cNvCxnSpPr>
+                <p:nvPr/>
+              </p:nvCxnSpPr>
+              <p:spPr>
+                <a:xfrm>
+                  <a:off x="1986455" y="1002687"/>
+                  <a:ext cx="0" cy="794582"/>
+                </a:xfrm>
+                <a:prstGeom prst="line">
+                  <a:avLst/>
+                </a:prstGeom>
+              </p:spPr>
+              <p:style>
+                <a:lnRef idx="3">
+                  <a:schemeClr val="dk1"/>
+                </a:lnRef>
+                <a:fillRef idx="0">
+                  <a:schemeClr val="dk1"/>
+                </a:fillRef>
+                <a:effectRef idx="2">
+                  <a:schemeClr val="dk1"/>
+                </a:effectRef>
+                <a:fontRef idx="minor">
+                  <a:schemeClr val="tx1"/>
+                </a:fontRef>
+              </p:style>
+            </p:cxnSp>
+          </p:grpSp>
+          <p:grpSp>
+            <p:nvGrpSpPr>
+              <p:cNvPr id="20" name="Groep 19">
+                <a:extLst>
+                  <a:ext uri="{FF2B5EF4-FFF2-40B4-BE49-F238E27FC236}">
+                    <a16:creationId xmlns:a16="http://schemas.microsoft.com/office/drawing/2014/main" id="{BC05D767-FB82-4E5C-A4DC-1405810F4C7A}"/>
+                  </a:ext>
+                </a:extLst>
+              </p:cNvPr>
+              <p:cNvGrpSpPr/>
+              <p:nvPr/>
+            </p:nvGrpSpPr>
+            <p:grpSpPr>
+              <a:xfrm>
+                <a:off x="2769520" y="2101107"/>
+                <a:ext cx="1097280" cy="794582"/>
+                <a:chOff x="889175" y="1002687"/>
+                <a:chExt cx="1097280" cy="794582"/>
+              </a:xfrm>
+            </p:grpSpPr>
+            <p:cxnSp>
+              <p:nvCxnSpPr>
+                <p:cNvPr id="21" name="Rechte verbindingslijn 20">
+                  <a:extLst>
+                    <a:ext uri="{FF2B5EF4-FFF2-40B4-BE49-F238E27FC236}">
+                      <a16:creationId xmlns:a16="http://schemas.microsoft.com/office/drawing/2014/main" id="{7C5CAA49-1DC3-463B-A193-422210606B97}"/>
+                    </a:ext>
+                  </a:extLst>
+                </p:cNvPr>
+                <p:cNvCxnSpPr/>
+                <p:nvPr/>
+              </p:nvCxnSpPr>
+              <p:spPr>
+                <a:xfrm>
+                  <a:off x="889175" y="1002687"/>
+                  <a:ext cx="1097280" cy="0"/>
+                </a:xfrm>
+                <a:prstGeom prst="line">
+                  <a:avLst/>
+                </a:prstGeom>
+              </p:spPr>
+              <p:style>
+                <a:lnRef idx="3">
+                  <a:schemeClr val="dk1"/>
+                </a:lnRef>
+                <a:fillRef idx="0">
+                  <a:schemeClr val="dk1"/>
+                </a:fillRef>
+                <a:effectRef idx="2">
+                  <a:schemeClr val="dk1"/>
+                </a:effectRef>
+                <a:fontRef idx="minor">
+                  <a:schemeClr val="tx1"/>
+                </a:fontRef>
+              </p:style>
+            </p:cxnSp>
+            <p:cxnSp>
+              <p:nvCxnSpPr>
+                <p:cNvPr id="22" name="Rechte verbindingslijn 21">
+                  <a:extLst>
+                    <a:ext uri="{FF2B5EF4-FFF2-40B4-BE49-F238E27FC236}">
+                      <a16:creationId xmlns:a16="http://schemas.microsoft.com/office/drawing/2014/main" id="{6B6D20B1-5190-4B09-BCBB-5F93FDF308DC}"/>
+                    </a:ext>
+                  </a:extLst>
+                </p:cNvPr>
+                <p:cNvCxnSpPr>
+                  <a:cxnSpLocks/>
+                </p:cNvCxnSpPr>
+                <p:nvPr/>
+              </p:nvCxnSpPr>
+              <p:spPr>
+                <a:xfrm>
+                  <a:off x="1986455" y="1002687"/>
+                  <a:ext cx="0" cy="794582"/>
+                </a:xfrm>
+                <a:prstGeom prst="line">
+                  <a:avLst/>
+                </a:prstGeom>
+              </p:spPr>
+              <p:style>
+                <a:lnRef idx="3">
+                  <a:schemeClr val="dk1"/>
+                </a:lnRef>
+                <a:fillRef idx="0">
+                  <a:schemeClr val="dk1"/>
+                </a:fillRef>
+                <a:effectRef idx="2">
+                  <a:schemeClr val="dk1"/>
+                </a:effectRef>
+                <a:fontRef idx="minor">
+                  <a:schemeClr val="tx1"/>
+                </a:fontRef>
+              </p:style>
+            </p:cxnSp>
+          </p:grpSp>
+          <p:grpSp>
+            <p:nvGrpSpPr>
+              <p:cNvPr id="23" name="Groep 22">
+                <a:extLst>
+                  <a:ext uri="{FF2B5EF4-FFF2-40B4-BE49-F238E27FC236}">
+                    <a16:creationId xmlns:a16="http://schemas.microsoft.com/office/drawing/2014/main" id="{8E059BB4-EE64-407B-9915-D6ADC89715F0}"/>
+                  </a:ext>
+                </a:extLst>
+              </p:cNvPr>
+              <p:cNvGrpSpPr/>
+              <p:nvPr/>
+            </p:nvGrpSpPr>
+            <p:grpSpPr>
+              <a:xfrm>
+                <a:off x="3866800" y="2895688"/>
+                <a:ext cx="1097280" cy="794582"/>
+                <a:chOff x="889175" y="1002687"/>
+                <a:chExt cx="1097280" cy="794582"/>
+              </a:xfrm>
+            </p:grpSpPr>
+            <p:cxnSp>
+              <p:nvCxnSpPr>
+                <p:cNvPr id="24" name="Rechte verbindingslijn 23">
+                  <a:extLst>
+                    <a:ext uri="{FF2B5EF4-FFF2-40B4-BE49-F238E27FC236}">
+                      <a16:creationId xmlns:a16="http://schemas.microsoft.com/office/drawing/2014/main" id="{724D5F57-386B-4B7E-886A-512A3AC4BEE3}"/>
+                    </a:ext>
+                  </a:extLst>
+                </p:cNvPr>
+                <p:cNvCxnSpPr/>
+                <p:nvPr/>
+              </p:nvCxnSpPr>
+              <p:spPr>
+                <a:xfrm>
+                  <a:off x="889175" y="1002687"/>
+                  <a:ext cx="1097280" cy="0"/>
+                </a:xfrm>
+                <a:prstGeom prst="line">
+                  <a:avLst/>
+                </a:prstGeom>
+              </p:spPr>
+              <p:style>
+                <a:lnRef idx="3">
+                  <a:schemeClr val="dk1"/>
+                </a:lnRef>
+                <a:fillRef idx="0">
+                  <a:schemeClr val="dk1"/>
+                </a:fillRef>
+                <a:effectRef idx="2">
+                  <a:schemeClr val="dk1"/>
+                </a:effectRef>
+                <a:fontRef idx="minor">
+                  <a:schemeClr val="tx1"/>
+                </a:fontRef>
+              </p:style>
+            </p:cxnSp>
+            <p:cxnSp>
+              <p:nvCxnSpPr>
+                <p:cNvPr id="25" name="Rechte verbindingslijn 24">
+                  <a:extLst>
+                    <a:ext uri="{FF2B5EF4-FFF2-40B4-BE49-F238E27FC236}">
+                      <a16:creationId xmlns:a16="http://schemas.microsoft.com/office/drawing/2014/main" id="{96B9AEB4-D002-4D8B-ACAE-A5533DB7C21B}"/>
+                    </a:ext>
+                  </a:extLst>
+                </p:cNvPr>
+                <p:cNvCxnSpPr>
+                  <a:cxnSpLocks/>
+                </p:cNvCxnSpPr>
+                <p:nvPr/>
+              </p:nvCxnSpPr>
+              <p:spPr>
+                <a:xfrm>
+                  <a:off x="1986455" y="1002687"/>
+                  <a:ext cx="0" cy="794582"/>
+                </a:xfrm>
+                <a:prstGeom prst="line">
+                  <a:avLst/>
+                </a:prstGeom>
+              </p:spPr>
+              <p:style>
+                <a:lnRef idx="3">
+                  <a:schemeClr val="dk1"/>
+                </a:lnRef>
+                <a:fillRef idx="0">
+                  <a:schemeClr val="dk1"/>
+                </a:fillRef>
+                <a:effectRef idx="2">
+                  <a:schemeClr val="dk1"/>
+                </a:effectRef>
+                <a:fontRef idx="minor">
+                  <a:schemeClr val="tx1"/>
+                </a:fontRef>
+              </p:style>
+            </p:cxnSp>
+          </p:grpSp>
+          <p:grpSp>
+            <p:nvGrpSpPr>
+              <p:cNvPr id="26" name="Groep 25">
+                <a:extLst>
+                  <a:ext uri="{FF2B5EF4-FFF2-40B4-BE49-F238E27FC236}">
+                    <a16:creationId xmlns:a16="http://schemas.microsoft.com/office/drawing/2014/main" id="{AE7FE060-04EE-4584-925C-49F6DB805138}"/>
+                  </a:ext>
+                </a:extLst>
+              </p:cNvPr>
+              <p:cNvGrpSpPr/>
+              <p:nvPr/>
+            </p:nvGrpSpPr>
+            <p:grpSpPr>
+              <a:xfrm>
+                <a:off x="4952081" y="3690270"/>
+                <a:ext cx="1097280" cy="794582"/>
+                <a:chOff x="889175" y="1002687"/>
+                <a:chExt cx="1097280" cy="794582"/>
+              </a:xfrm>
+            </p:grpSpPr>
+            <p:cxnSp>
+              <p:nvCxnSpPr>
+                <p:cNvPr id="27" name="Rechte verbindingslijn 26">
+                  <a:extLst>
+                    <a:ext uri="{FF2B5EF4-FFF2-40B4-BE49-F238E27FC236}">
+                      <a16:creationId xmlns:a16="http://schemas.microsoft.com/office/drawing/2014/main" id="{601D3B6B-D4A9-4B75-938C-EC41DF9822E7}"/>
+                    </a:ext>
+                  </a:extLst>
+                </p:cNvPr>
+                <p:cNvCxnSpPr/>
+                <p:nvPr/>
+              </p:nvCxnSpPr>
+              <p:spPr>
+                <a:xfrm>
+                  <a:off x="889175" y="1002687"/>
+                  <a:ext cx="1097280" cy="0"/>
+                </a:xfrm>
+                <a:prstGeom prst="line">
+                  <a:avLst/>
+                </a:prstGeom>
+              </p:spPr>
+              <p:style>
+                <a:lnRef idx="3">
+                  <a:schemeClr val="dk1"/>
+                </a:lnRef>
+                <a:fillRef idx="0">
+                  <a:schemeClr val="dk1"/>
+                </a:fillRef>
+                <a:effectRef idx="2">
+                  <a:schemeClr val="dk1"/>
+                </a:effectRef>
+                <a:fontRef idx="minor">
+                  <a:schemeClr val="tx1"/>
+                </a:fontRef>
+              </p:style>
+            </p:cxnSp>
+            <p:cxnSp>
+              <p:nvCxnSpPr>
+                <p:cNvPr id="28" name="Rechte verbindingslijn 27">
+                  <a:extLst>
+                    <a:ext uri="{FF2B5EF4-FFF2-40B4-BE49-F238E27FC236}">
+                      <a16:creationId xmlns:a16="http://schemas.microsoft.com/office/drawing/2014/main" id="{3DA16994-120B-4368-95BE-11CBFD7ABE69}"/>
+                    </a:ext>
+                  </a:extLst>
+                </p:cNvPr>
+                <p:cNvCxnSpPr>
+                  <a:cxnSpLocks/>
+                </p:cNvCxnSpPr>
+                <p:nvPr/>
+              </p:nvCxnSpPr>
+              <p:spPr>
+                <a:xfrm>
+                  <a:off x="1986455" y="1002687"/>
+                  <a:ext cx="0" cy="794582"/>
+                </a:xfrm>
+                <a:prstGeom prst="line">
+                  <a:avLst/>
+                </a:prstGeom>
+              </p:spPr>
+              <p:style>
+                <a:lnRef idx="3">
+                  <a:schemeClr val="dk1"/>
+                </a:lnRef>
+                <a:fillRef idx="0">
+                  <a:schemeClr val="dk1"/>
+                </a:fillRef>
+                <a:effectRef idx="2">
+                  <a:schemeClr val="dk1"/>
+                </a:effectRef>
+                <a:fontRef idx="minor">
+                  <a:schemeClr val="tx1"/>
+                </a:fontRef>
+              </p:style>
+            </p:cxnSp>
+          </p:grpSp>
+          <p:grpSp>
+            <p:nvGrpSpPr>
+              <p:cNvPr id="29" name="Groep 28">
+                <a:extLst>
+                  <a:ext uri="{FF2B5EF4-FFF2-40B4-BE49-F238E27FC236}">
+                    <a16:creationId xmlns:a16="http://schemas.microsoft.com/office/drawing/2014/main" id="{61F74697-01DD-45C7-A0DB-C03DC65ECE50}"/>
+                  </a:ext>
+                </a:extLst>
+              </p:cNvPr>
+              <p:cNvGrpSpPr/>
+              <p:nvPr/>
+            </p:nvGrpSpPr>
+            <p:grpSpPr>
+              <a:xfrm>
+                <a:off x="6056806" y="4478283"/>
+                <a:ext cx="1097280" cy="794582"/>
+                <a:chOff x="889175" y="1002687"/>
+                <a:chExt cx="1097280" cy="794582"/>
+              </a:xfrm>
+            </p:grpSpPr>
+            <p:cxnSp>
+              <p:nvCxnSpPr>
+                <p:cNvPr id="30" name="Rechte verbindingslijn 29">
+                  <a:extLst>
+                    <a:ext uri="{FF2B5EF4-FFF2-40B4-BE49-F238E27FC236}">
+                      <a16:creationId xmlns:a16="http://schemas.microsoft.com/office/drawing/2014/main" id="{B268DDDE-5604-4F90-A943-B7CFB3D15BB1}"/>
+                    </a:ext>
+                  </a:extLst>
+                </p:cNvPr>
+                <p:cNvCxnSpPr/>
+                <p:nvPr/>
+              </p:nvCxnSpPr>
+              <p:spPr>
+                <a:xfrm>
+                  <a:off x="889175" y="1002687"/>
+                  <a:ext cx="1097280" cy="0"/>
+                </a:xfrm>
+                <a:prstGeom prst="line">
+                  <a:avLst/>
+                </a:prstGeom>
+              </p:spPr>
+              <p:style>
+                <a:lnRef idx="3">
+                  <a:schemeClr val="dk1"/>
+                </a:lnRef>
+                <a:fillRef idx="0">
+                  <a:schemeClr val="dk1"/>
+                </a:fillRef>
+                <a:effectRef idx="2">
+                  <a:schemeClr val="dk1"/>
+                </a:effectRef>
+                <a:fontRef idx="minor">
+                  <a:schemeClr val="tx1"/>
+                </a:fontRef>
+              </p:style>
+            </p:cxnSp>
+            <p:cxnSp>
+              <p:nvCxnSpPr>
+                <p:cNvPr id="31" name="Rechte verbindingslijn 30">
+                  <a:extLst>
+                    <a:ext uri="{FF2B5EF4-FFF2-40B4-BE49-F238E27FC236}">
+                      <a16:creationId xmlns:a16="http://schemas.microsoft.com/office/drawing/2014/main" id="{B52C5D95-5734-4278-BBC5-FD1FA2CFDA4C}"/>
+                    </a:ext>
+                  </a:extLst>
+                </p:cNvPr>
+                <p:cNvCxnSpPr>
+                  <a:cxnSpLocks/>
+                </p:cNvCxnSpPr>
+                <p:nvPr/>
+              </p:nvCxnSpPr>
+              <p:spPr>
+                <a:xfrm>
+                  <a:off x="1986455" y="1002687"/>
+                  <a:ext cx="0" cy="794582"/>
+                </a:xfrm>
+                <a:prstGeom prst="line">
+                  <a:avLst/>
+                </a:prstGeom>
+              </p:spPr>
+              <p:style>
+                <a:lnRef idx="3">
+                  <a:schemeClr val="dk1"/>
+                </a:lnRef>
+                <a:fillRef idx="0">
+                  <a:schemeClr val="dk1"/>
+                </a:fillRef>
+                <a:effectRef idx="2">
+                  <a:schemeClr val="dk1"/>
+                </a:effectRef>
+                <a:fontRef idx="minor">
+                  <a:schemeClr val="tx1"/>
+                </a:fontRef>
+              </p:style>
+            </p:cxnSp>
+          </p:grpSp>
+          <p:grpSp>
+            <p:nvGrpSpPr>
+              <p:cNvPr id="32" name="Groep 31">
+                <a:extLst>
+                  <a:ext uri="{FF2B5EF4-FFF2-40B4-BE49-F238E27FC236}">
+                    <a16:creationId xmlns:a16="http://schemas.microsoft.com/office/drawing/2014/main" id="{A9F9A91D-60AD-4AF1-A271-38270FCDC242}"/>
+                  </a:ext>
+                </a:extLst>
+              </p:cNvPr>
+              <p:cNvGrpSpPr/>
+              <p:nvPr/>
+            </p:nvGrpSpPr>
+            <p:grpSpPr>
+              <a:xfrm>
+                <a:off x="7161532" y="5269887"/>
+                <a:ext cx="1097280" cy="794582"/>
+                <a:chOff x="889175" y="1002687"/>
+                <a:chExt cx="1097280" cy="794582"/>
+              </a:xfrm>
+            </p:grpSpPr>
+            <p:cxnSp>
+              <p:nvCxnSpPr>
+                <p:cNvPr id="33" name="Rechte verbindingslijn 32">
+                  <a:extLst>
+                    <a:ext uri="{FF2B5EF4-FFF2-40B4-BE49-F238E27FC236}">
+                      <a16:creationId xmlns:a16="http://schemas.microsoft.com/office/drawing/2014/main" id="{47383DBE-A85C-41E9-819B-C2639E45928E}"/>
+                    </a:ext>
+                  </a:extLst>
+                </p:cNvPr>
+                <p:cNvCxnSpPr/>
+                <p:nvPr/>
+              </p:nvCxnSpPr>
+              <p:spPr>
+                <a:xfrm>
+                  <a:off x="889175" y="1002687"/>
+                  <a:ext cx="1097280" cy="0"/>
+                </a:xfrm>
+                <a:prstGeom prst="line">
+                  <a:avLst/>
+                </a:prstGeom>
+              </p:spPr>
+              <p:style>
+                <a:lnRef idx="3">
+                  <a:schemeClr val="dk1"/>
+                </a:lnRef>
+                <a:fillRef idx="0">
+                  <a:schemeClr val="dk1"/>
+                </a:fillRef>
+                <a:effectRef idx="2">
+                  <a:schemeClr val="dk1"/>
+                </a:effectRef>
+                <a:fontRef idx="minor">
+                  <a:schemeClr val="tx1"/>
+                </a:fontRef>
+              </p:style>
+            </p:cxnSp>
+            <p:cxnSp>
+              <p:nvCxnSpPr>
+                <p:cNvPr id="34" name="Rechte verbindingslijn 33">
+                  <a:extLst>
+                    <a:ext uri="{FF2B5EF4-FFF2-40B4-BE49-F238E27FC236}">
+                      <a16:creationId xmlns:a16="http://schemas.microsoft.com/office/drawing/2014/main" id="{B784D191-EBF3-497D-9DAB-717C025F85FB}"/>
+                    </a:ext>
+                  </a:extLst>
+                </p:cNvPr>
+                <p:cNvCxnSpPr>
+                  <a:cxnSpLocks/>
+                </p:cNvCxnSpPr>
+                <p:nvPr/>
+              </p:nvCxnSpPr>
+              <p:spPr>
+                <a:xfrm>
+                  <a:off x="1986455" y="1002687"/>
+                  <a:ext cx="0" cy="794582"/>
+                </a:xfrm>
+                <a:prstGeom prst="line">
+                  <a:avLst/>
+                </a:prstGeom>
+              </p:spPr>
+              <p:style>
+                <a:lnRef idx="3">
+                  <a:schemeClr val="dk1"/>
+                </a:lnRef>
+                <a:fillRef idx="0">
+                  <a:schemeClr val="dk1"/>
+                </a:fillRef>
+                <a:effectRef idx="2">
+                  <a:schemeClr val="dk1"/>
+                </a:effectRef>
+                <a:fontRef idx="minor">
+                  <a:schemeClr val="tx1"/>
+                </a:fontRef>
+              </p:style>
+            </p:cxnSp>
+          </p:grpSp>
+          <p:sp>
+            <p:nvSpPr>
+              <p:cNvPr id="35" name="Pijl: omlaag 34">
+                <a:extLst>
+                  <a:ext uri="{FF2B5EF4-FFF2-40B4-BE49-F238E27FC236}">
+                    <a16:creationId xmlns:a16="http://schemas.microsoft.com/office/drawing/2014/main" id="{C6E52372-0CDC-4AAE-800C-B054CE6F791D}"/>
+                  </a:ext>
+                </a:extLst>
+              </p:cNvPr>
+              <p:cNvSpPr/>
+              <p:nvPr/>
+            </p:nvSpPr>
+            <p:spPr>
+              <a:xfrm rot="18411430">
+                <a:off x="3846614" y="767485"/>
+                <a:ext cx="765585" cy="6200361"/>
+              </a:xfrm>
+              <a:prstGeom prst="downArrow">
+                <a:avLst/>
+              </a:prstGeom>
+              <a:gradFill flip="none" rotWithShape="1">
+                <a:gsLst>
+                  <a:gs pos="100000">
+                    <a:srgbClr val="66A266"/>
+                  </a:gs>
+                  <a:gs pos="0">
+                    <a:srgbClr val="FFC966"/>
+                  </a:gs>
+                </a:gsLst>
+                <a:lin ang="5400000" scaled="1"/>
+                <a:tileRect/>
+              </a:gradFill>
+              <a:ln>
+                <a:noFill/>
+              </a:ln>
+            </p:spPr>
+            <p:style>
+              <a:lnRef idx="2">
+                <a:schemeClr val="accent1">
+                  <a:shade val="50000"/>
+                </a:schemeClr>
+              </a:lnRef>
+              <a:fillRef idx="1">
+                <a:schemeClr val="accent1"/>
+              </a:fillRef>
+              <a:effectRef idx="0">
+                <a:schemeClr val="accent1"/>
+              </a:effectRef>
+              <a:fontRef idx="minor">
+                <a:schemeClr val="lt1"/>
+              </a:fontRef>
+            </p:style>
+            <p:txBody>
+              <a:bodyPr rtlCol="0" anchor="ctr"/>
+              <a:lstStyle/>
+              <a:p>
+                <a:pPr algn="ctr"/>
+                <a:endParaRPr lang="es-ES" dirty="0"/>
+              </a:p>
+            </p:txBody>
+          </p:sp>
+        </p:grpSp>
+        <p:sp>
+          <p:nvSpPr>
+            <p:cNvPr id="39" name="Pijl: draaiend 38">
+              <a:extLst>
+                <a:ext uri="{FF2B5EF4-FFF2-40B4-BE49-F238E27FC236}">
+                  <a16:creationId xmlns:a16="http://schemas.microsoft.com/office/drawing/2014/main" id="{BEF042D4-FFFA-4D79-9CF6-81BA2CFFA3DC}"/>
+                </a:ext>
+              </a:extLst>
+            </p:cNvPr>
+            <p:cNvSpPr/>
+            <p:nvPr/>
+          </p:nvSpPr>
+          <p:spPr>
+            <a:xfrm rot="2169773">
+              <a:off x="2115073" y="845708"/>
+              <a:ext cx="1307401" cy="1307401"/>
+            </a:xfrm>
+            <a:prstGeom prst="circularArrow">
+              <a:avLst/>
+            </a:prstGeom>
+            <a:solidFill>
+              <a:schemeClr val="bg1">
+                <a:lumMod val="85000"/>
+              </a:schemeClr>
+            </a:solidFill>
+            <a:ln>
+              <a:noFill/>
+            </a:ln>
+          </p:spPr>
+          <p:style>
+            <a:lnRef idx="0">
+              <a:scrgbClr r="0" g="0" b="0"/>
+            </a:lnRef>
+            <a:fillRef idx="0">
+              <a:scrgbClr r="0" g="0" b="0"/>
+            </a:fillRef>
+            <a:effectRef idx="0">
+              <a:scrgbClr r="0" g="0" b="0"/>
+            </a:effectRef>
+            <a:fontRef idx="minor">
+              <a:schemeClr val="dk1"/>
+            </a:fontRef>
+          </p:style>
+          <p:txBody>
+            <a:bodyPr rtlCol="0" anchor="ctr"/>
+            <a:lstStyle/>
+            <a:p>
+              <a:pPr algn="ctr"/>
+              <a:endParaRPr lang="es-ES">
+                <a:solidFill>
+                  <a:schemeClr val="dk1"/>
+                </a:solidFill>
+                <a:latin typeface="Myriad Pro" panose="020B0503030403020204" pitchFamily="34" charset="0"/>
+              </a:endParaRPr>
+            </a:p>
+          </p:txBody>
+        </p:sp>
+        <p:sp>
+          <p:nvSpPr>
+            <p:cNvPr id="40" name="Pijl: draaiend 39">
+              <a:extLst>
+                <a:ext uri="{FF2B5EF4-FFF2-40B4-BE49-F238E27FC236}">
+                  <a16:creationId xmlns:a16="http://schemas.microsoft.com/office/drawing/2014/main" id="{1A582674-CE9B-49DF-86FE-5ED1A6E7DED0}"/>
+                </a:ext>
+              </a:extLst>
+            </p:cNvPr>
+            <p:cNvSpPr/>
+            <p:nvPr/>
+          </p:nvSpPr>
+          <p:spPr>
+            <a:xfrm rot="2169773">
+              <a:off x="4247103" y="2360904"/>
+              <a:ext cx="1307401" cy="1307401"/>
+            </a:xfrm>
+            <a:prstGeom prst="circularArrow">
+              <a:avLst/>
+            </a:prstGeom>
+            <a:solidFill>
+              <a:schemeClr val="bg1">
+                <a:lumMod val="85000"/>
+              </a:schemeClr>
+            </a:solidFill>
+            <a:ln>
+              <a:noFill/>
+            </a:ln>
+          </p:spPr>
+          <p:style>
+            <a:lnRef idx="0">
+              <a:scrgbClr r="0" g="0" b="0"/>
+            </a:lnRef>
+            <a:fillRef idx="0">
+              <a:scrgbClr r="0" g="0" b="0"/>
+            </a:fillRef>
+            <a:effectRef idx="0">
+              <a:scrgbClr r="0" g="0" b="0"/>
+            </a:effectRef>
+            <a:fontRef idx="minor">
+              <a:schemeClr val="dk1"/>
+            </a:fontRef>
+          </p:style>
+          <p:txBody>
+            <a:bodyPr rtlCol="0" anchor="ctr"/>
+            <a:lstStyle/>
+            <a:p>
+              <a:pPr algn="ctr"/>
+              <a:endParaRPr lang="es-ES">
+                <a:solidFill>
+                  <a:schemeClr val="dk1"/>
+                </a:solidFill>
+                <a:latin typeface="Myriad Pro" panose="020B0503030403020204" pitchFamily="34" charset="0"/>
+              </a:endParaRPr>
+            </a:p>
+          </p:txBody>
+        </p:sp>
+        <p:sp>
+          <p:nvSpPr>
+            <p:cNvPr id="41" name="Pijl: draaiend 40">
+              <a:extLst>
+                <a:ext uri="{FF2B5EF4-FFF2-40B4-BE49-F238E27FC236}">
+                  <a16:creationId xmlns:a16="http://schemas.microsoft.com/office/drawing/2014/main" id="{CCB46CCA-F43F-488E-B4A2-363274C9FF12}"/>
+                </a:ext>
+              </a:extLst>
+            </p:cNvPr>
+            <p:cNvSpPr/>
+            <p:nvPr/>
+          </p:nvSpPr>
+          <p:spPr>
+            <a:xfrm rot="2169773">
+              <a:off x="5321487" y="3179260"/>
+              <a:ext cx="1307401" cy="1307401"/>
+            </a:xfrm>
+            <a:prstGeom prst="circularArrow">
+              <a:avLst/>
+            </a:prstGeom>
+            <a:solidFill>
+              <a:schemeClr val="bg1">
+                <a:lumMod val="85000"/>
+              </a:schemeClr>
+            </a:solidFill>
+            <a:ln>
+              <a:noFill/>
+            </a:ln>
+          </p:spPr>
+          <p:style>
+            <a:lnRef idx="0">
+              <a:scrgbClr r="0" g="0" b="0"/>
+            </a:lnRef>
+            <a:fillRef idx="0">
+              <a:scrgbClr r="0" g="0" b="0"/>
+            </a:fillRef>
+            <a:effectRef idx="0">
+              <a:scrgbClr r="0" g="0" b="0"/>
+            </a:effectRef>
+            <a:fontRef idx="minor">
+              <a:schemeClr val="dk1"/>
+            </a:fontRef>
+          </p:style>
+          <p:txBody>
+            <a:bodyPr rtlCol="0" anchor="ctr"/>
+            <a:lstStyle/>
+            <a:p>
+              <a:pPr algn="ctr"/>
+              <a:endParaRPr lang="es-ES">
+                <a:solidFill>
+                  <a:schemeClr val="dk1"/>
+                </a:solidFill>
+                <a:latin typeface="Myriad Pro" panose="020B0503030403020204" pitchFamily="34" charset="0"/>
+              </a:endParaRPr>
+            </a:p>
+          </p:txBody>
+        </p:sp>
+        <p:sp>
+          <p:nvSpPr>
+            <p:cNvPr id="42" name="Pijl: draaiend 41">
+              <a:extLst>
+                <a:ext uri="{FF2B5EF4-FFF2-40B4-BE49-F238E27FC236}">
+                  <a16:creationId xmlns:a16="http://schemas.microsoft.com/office/drawing/2014/main" id="{86142F22-EDAF-4267-B464-580B94FF15DF}"/>
+                </a:ext>
+              </a:extLst>
+            </p:cNvPr>
+            <p:cNvSpPr/>
+            <p:nvPr/>
+          </p:nvSpPr>
+          <p:spPr>
+            <a:xfrm rot="2169773">
+              <a:off x="6378977" y="3961846"/>
+              <a:ext cx="1307401" cy="1307401"/>
+            </a:xfrm>
+            <a:prstGeom prst="circularArrow">
+              <a:avLst/>
+            </a:prstGeom>
+            <a:solidFill>
+              <a:schemeClr val="bg1">
+                <a:lumMod val="85000"/>
+              </a:schemeClr>
+            </a:solidFill>
+            <a:ln>
+              <a:noFill/>
+            </a:ln>
+          </p:spPr>
+          <p:style>
+            <a:lnRef idx="0">
+              <a:scrgbClr r="0" g="0" b="0"/>
+            </a:lnRef>
+            <a:fillRef idx="0">
+              <a:scrgbClr r="0" g="0" b="0"/>
+            </a:fillRef>
+            <a:effectRef idx="0">
+              <a:scrgbClr r="0" g="0" b="0"/>
+            </a:effectRef>
+            <a:fontRef idx="minor">
+              <a:schemeClr val="dk1"/>
+            </a:fontRef>
+          </p:style>
+          <p:txBody>
+            <a:bodyPr rtlCol="0" anchor="ctr"/>
+            <a:lstStyle/>
+            <a:p>
+              <a:pPr algn="ctr"/>
+              <a:endParaRPr lang="es-ES">
+                <a:solidFill>
+                  <a:schemeClr val="dk1"/>
+                </a:solidFill>
+                <a:latin typeface="Myriad Pro" panose="020B0503030403020204" pitchFamily="34" charset="0"/>
+              </a:endParaRPr>
+            </a:p>
+          </p:txBody>
+        </p:sp>
+        <p:sp>
+          <p:nvSpPr>
+            <p:cNvPr id="43" name="Pijl: draaiend 42">
+              <a:extLst>
+                <a:ext uri="{FF2B5EF4-FFF2-40B4-BE49-F238E27FC236}">
+                  <a16:creationId xmlns:a16="http://schemas.microsoft.com/office/drawing/2014/main" id="{D4753A58-0ADA-4291-9D2B-DA0B478D2677}"/>
+                </a:ext>
+              </a:extLst>
+            </p:cNvPr>
+            <p:cNvSpPr/>
+            <p:nvPr/>
+          </p:nvSpPr>
+          <p:spPr>
+            <a:xfrm rot="2169773">
+              <a:off x="3181089" y="1542546"/>
+              <a:ext cx="1307401" cy="1307401"/>
+            </a:xfrm>
+            <a:prstGeom prst="circularArrow">
+              <a:avLst/>
+            </a:prstGeom>
+            <a:solidFill>
+              <a:schemeClr val="bg1">
+                <a:lumMod val="85000"/>
+              </a:schemeClr>
+            </a:solidFill>
+            <a:ln>
+              <a:noFill/>
+            </a:ln>
+          </p:spPr>
+          <p:style>
+            <a:lnRef idx="0">
+              <a:scrgbClr r="0" g="0" b="0"/>
+            </a:lnRef>
+            <a:fillRef idx="0">
+              <a:scrgbClr r="0" g="0" b="0"/>
+            </a:fillRef>
+            <a:effectRef idx="0">
+              <a:scrgbClr r="0" g="0" b="0"/>
+            </a:effectRef>
+            <a:fontRef idx="minor">
+              <a:schemeClr val="dk1"/>
+            </a:fontRef>
+          </p:style>
+          <p:txBody>
+            <a:bodyPr rtlCol="0" anchor="ctr"/>
+            <a:lstStyle/>
+            <a:p>
+              <a:pPr algn="ctr"/>
+              <a:endParaRPr lang="es-ES">
+                <a:solidFill>
+                  <a:schemeClr val="dk1"/>
+                </a:solidFill>
+                <a:latin typeface="Myriad Pro" panose="020B0503030403020204" pitchFamily="34" charset="0"/>
+              </a:endParaRPr>
+            </a:p>
+          </p:txBody>
+        </p:sp>
+        <p:cxnSp>
+          <p:nvCxnSpPr>
+            <p:cNvPr id="45" name="Rechte verbindingslijn 44">
+              <a:extLst>
+                <a:ext uri="{FF2B5EF4-FFF2-40B4-BE49-F238E27FC236}">
+                  <a16:creationId xmlns:a16="http://schemas.microsoft.com/office/drawing/2014/main" id="{3E165466-9A18-495F-A97B-F2B85539E096}"/>
+                </a:ext>
+              </a:extLst>
+            </p:cNvPr>
+            <p:cNvCxnSpPr>
+              <a:cxnSpLocks/>
+            </p:cNvCxnSpPr>
+            <p:nvPr/>
+          </p:nvCxnSpPr>
+          <p:spPr>
+            <a:xfrm>
+              <a:off x="8258812" y="6064469"/>
+              <a:ext cx="2053588" cy="0"/>
+            </a:xfrm>
+            <a:prstGeom prst="line">
+              <a:avLst/>
+            </a:prstGeom>
+          </p:spPr>
+          <p:style>
+            <a:lnRef idx="3">
+              <a:schemeClr val="dk1"/>
+            </a:lnRef>
+            <a:fillRef idx="0">
+              <a:schemeClr val="dk1"/>
+            </a:fillRef>
+            <a:effectRef idx="2">
+              <a:schemeClr val="dk1"/>
+            </a:effectRef>
+            <a:fontRef idx="minor">
+              <a:schemeClr val="tx1"/>
+            </a:fontRef>
+          </p:style>
+        </p:cxnSp>
+      </p:grpSp>
+      <p:sp>
+        <p:nvSpPr>
+          <p:cNvPr id="48" name="Ovaal 47">
+            <a:extLst>
+              <a:ext uri="{FF2B5EF4-FFF2-40B4-BE49-F238E27FC236}">
+                <a16:creationId xmlns:a16="http://schemas.microsoft.com/office/drawing/2014/main" id="{2111D5F4-EB20-4B11-87B2-D8253140C143}"/>
+              </a:ext>
+            </a:extLst>
+          </p:cNvPr>
+          <p:cNvSpPr/>
+          <p:nvPr/>
+        </p:nvSpPr>
+        <p:spPr>
+          <a:xfrm>
+            <a:off x="7848770" y="4995025"/>
+            <a:ext cx="228600" cy="228600"/>
+          </a:xfrm>
+          <a:prstGeom prst="ellipse">
+            <a:avLst/>
+          </a:prstGeom>
+          <a:solidFill>
+            <a:srgbClr val="66A266"/>
+          </a:solidFill>
+          <a:ln>
+            <a:solidFill>
+              <a:srgbClr val="5A9140"/>
+            </a:solidFill>
+          </a:ln>
+        </p:spPr>
+        <p:style>
+          <a:lnRef idx="2">
+            <a:schemeClr val="accent1">
+              <a:shade val="50000"/>
+            </a:schemeClr>
+          </a:lnRef>
+          <a:fillRef idx="1">
+            <a:schemeClr val="accent1"/>
+          </a:fillRef>
+          <a:effectRef idx="0">
+            <a:schemeClr val="accent1"/>
+          </a:effectRef>
+          <a:fontRef idx="minor">
+            <a:schemeClr val="lt1"/>
+          </a:fontRef>
+        </p:style>
+        <p:txBody>
+          <a:bodyPr rtlCol="0" anchor="ctr"/>
+          <a:lstStyle/>
+          <a:p>
+            <a:pPr algn="ctr"/>
+            <a:endParaRPr lang="es-ES"/>
+          </a:p>
+        </p:txBody>
+      </p:sp>
+      <p:sp>
+        <p:nvSpPr>
+          <p:cNvPr id="49" name="Ovaal 48">
+            <a:extLst>
+              <a:ext uri="{FF2B5EF4-FFF2-40B4-BE49-F238E27FC236}">
+                <a16:creationId xmlns:a16="http://schemas.microsoft.com/office/drawing/2014/main" id="{D454BD4A-7510-4277-96D7-E737DF5A968E}"/>
+              </a:ext>
+            </a:extLst>
+          </p:cNvPr>
+          <p:cNvSpPr/>
+          <p:nvPr/>
+        </p:nvSpPr>
+        <p:spPr>
+          <a:xfrm>
+            <a:off x="3318160" y="1531499"/>
+            <a:ext cx="228600" cy="228600"/>
+          </a:xfrm>
+          <a:prstGeom prst="ellipse">
+            <a:avLst/>
+          </a:prstGeom>
+          <a:solidFill>
+            <a:srgbClr val="FFC967"/>
+          </a:solidFill>
+          <a:ln>
+            <a:solidFill>
+              <a:schemeClr val="accent4"/>
+            </a:solidFill>
+          </a:ln>
+        </p:spPr>
+        <p:style>
+          <a:lnRef idx="2">
+            <a:schemeClr val="accent1">
+              <a:shade val="50000"/>
+            </a:schemeClr>
+          </a:lnRef>
+          <a:fillRef idx="1">
+            <a:schemeClr val="accent1"/>
+          </a:fillRef>
+          <a:effectRef idx="0">
+            <a:schemeClr val="accent1"/>
+          </a:effectRef>
+          <a:fontRef idx="minor">
+            <a:schemeClr val="lt1"/>
+          </a:fontRef>
+        </p:style>
+        <p:txBody>
+          <a:bodyPr rtlCol="0" anchor="ctr"/>
+          <a:lstStyle/>
+          <a:p>
+            <a:pPr algn="ctr"/>
+            <a:endParaRPr lang="es-ES"/>
+          </a:p>
+        </p:txBody>
+      </p:sp>
+      <p:sp>
+        <p:nvSpPr>
+          <p:cNvPr id="56" name="Vrije vorm: vorm 55">
+            <a:extLst>
+              <a:ext uri="{FF2B5EF4-FFF2-40B4-BE49-F238E27FC236}">
+                <a16:creationId xmlns:a16="http://schemas.microsoft.com/office/drawing/2014/main" id="{0AD8E80A-6CA5-43CB-A22B-BC71DE3D06EF}"/>
+              </a:ext>
+            </a:extLst>
+          </p:cNvPr>
+          <p:cNvSpPr/>
+          <p:nvPr/>
+        </p:nvSpPr>
+        <p:spPr>
+          <a:xfrm rot="205139">
+            <a:off x="3650549" y="1608599"/>
+            <a:ext cx="5345151" cy="318740"/>
+          </a:xfrm>
+          <a:custGeom>
+            <a:avLst/>
+            <a:gdLst>
+              <a:gd name="connsiteX0" fmla="*/ 5181600 w 5181600"/>
+              <a:gd name="connsiteY0" fmla="*/ 660241 h 660241"/>
+              <a:gd name="connsiteX1" fmla="*/ 2781300 w 5181600"/>
+              <a:gd name="connsiteY1" fmla="*/ 6191 h 660241"/>
+              <a:gd name="connsiteX2" fmla="*/ 0 w 5181600"/>
+              <a:gd name="connsiteY2" fmla="*/ 387191 h 660241"/>
+            </a:gdLst>
+            <a:ahLst/>
+            <a:cxnLst>
+              <a:cxn ang="0">
+                <a:pos x="connsiteX0" y="connsiteY0"/>
+              </a:cxn>
+              <a:cxn ang="0">
+                <a:pos x="connsiteX1" y="connsiteY1"/>
+              </a:cxn>
+              <a:cxn ang="0">
+                <a:pos x="connsiteX2" y="connsiteY2"/>
+              </a:cxn>
+            </a:cxnLst>
+            <a:rect l="l" t="t" r="r" b="b"/>
+            <a:pathLst>
+              <a:path w="5181600" h="660241">
+                <a:moveTo>
+                  <a:pt x="5181600" y="660241"/>
+                </a:moveTo>
+                <a:cubicBezTo>
+                  <a:pt x="4413250" y="355970"/>
+                  <a:pt x="3644900" y="51699"/>
+                  <a:pt x="2781300" y="6191"/>
+                </a:cubicBezTo>
+                <a:cubicBezTo>
+                  <a:pt x="1917700" y="-39317"/>
+                  <a:pt x="958850" y="173937"/>
+                  <a:pt x="0" y="387191"/>
+                </a:cubicBezTo>
+              </a:path>
+            </a:pathLst>
+          </a:custGeom>
+          <a:ln>
+            <a:headEnd type="none" w="med" len="med"/>
+            <a:tailEnd type="arrow" w="med" len="med"/>
+          </a:ln>
+        </p:spPr>
+        <p:style>
+          <a:lnRef idx="3">
+            <a:schemeClr val="dk1"/>
+          </a:lnRef>
+          <a:fillRef idx="0">
+            <a:schemeClr val="dk1"/>
+          </a:fillRef>
+          <a:effectRef idx="2">
+            <a:schemeClr val="dk1"/>
+          </a:effectRef>
+          <a:fontRef idx="minor">
+            <a:schemeClr val="tx1"/>
+          </a:fontRef>
+        </p:style>
+        <p:txBody>
+          <a:bodyPr rtlCol="0" anchor="ctr"/>
+          <a:lstStyle/>
+          <a:p>
+            <a:pPr algn="ctr"/>
+            <a:endParaRPr lang="es-ES"/>
+          </a:p>
+        </p:txBody>
+      </p:sp>
+      <p:sp>
+        <p:nvSpPr>
+          <p:cNvPr id="57" name="Vrije vorm: vorm 56">
+            <a:extLst>
+              <a:ext uri="{FF2B5EF4-FFF2-40B4-BE49-F238E27FC236}">
+                <a16:creationId xmlns:a16="http://schemas.microsoft.com/office/drawing/2014/main" id="{C0A6DD0C-3BED-4984-968A-43D5E772F34B}"/>
+              </a:ext>
+            </a:extLst>
+          </p:cNvPr>
+          <p:cNvSpPr/>
+          <p:nvPr/>
+        </p:nvSpPr>
+        <p:spPr>
+          <a:xfrm rot="17065183">
+            <a:off x="7112858" y="3556660"/>
+            <a:ext cx="2255703" cy="372942"/>
+          </a:xfrm>
+          <a:custGeom>
+            <a:avLst/>
+            <a:gdLst>
+              <a:gd name="connsiteX0" fmla="*/ 5181600 w 5181600"/>
+              <a:gd name="connsiteY0" fmla="*/ 660241 h 660241"/>
+              <a:gd name="connsiteX1" fmla="*/ 2781300 w 5181600"/>
+              <a:gd name="connsiteY1" fmla="*/ 6191 h 660241"/>
+              <a:gd name="connsiteX2" fmla="*/ 0 w 5181600"/>
+              <a:gd name="connsiteY2" fmla="*/ 387191 h 660241"/>
+            </a:gdLst>
+            <a:ahLst/>
+            <a:cxnLst>
+              <a:cxn ang="0">
+                <a:pos x="connsiteX0" y="connsiteY0"/>
+              </a:cxn>
+              <a:cxn ang="0">
+                <a:pos x="connsiteX1" y="connsiteY1"/>
+              </a:cxn>
+              <a:cxn ang="0">
+                <a:pos x="connsiteX2" y="connsiteY2"/>
+              </a:cxn>
+            </a:cxnLst>
+            <a:rect l="l" t="t" r="r" b="b"/>
+            <a:pathLst>
+              <a:path w="5181600" h="660241">
+                <a:moveTo>
+                  <a:pt x="5181600" y="660241"/>
+                </a:moveTo>
+                <a:cubicBezTo>
+                  <a:pt x="4413250" y="355970"/>
+                  <a:pt x="3644900" y="51699"/>
+                  <a:pt x="2781300" y="6191"/>
+                </a:cubicBezTo>
+                <a:cubicBezTo>
+                  <a:pt x="1917700" y="-39317"/>
+                  <a:pt x="958850" y="173937"/>
+                  <a:pt x="0" y="387191"/>
+                </a:cubicBezTo>
+              </a:path>
+            </a:pathLst>
+          </a:custGeom>
+          <a:ln>
+            <a:headEnd type="none" w="med" len="med"/>
+            <a:tailEnd type="arrow" w="med" len="med"/>
+          </a:ln>
+        </p:spPr>
+        <p:style>
+          <a:lnRef idx="3">
+            <a:schemeClr val="dk1"/>
+          </a:lnRef>
+          <a:fillRef idx="0">
+            <a:schemeClr val="dk1"/>
+          </a:fillRef>
+          <a:effectRef idx="2">
+            <a:schemeClr val="dk1"/>
+          </a:effectRef>
+          <a:fontRef idx="minor">
+            <a:schemeClr val="tx1"/>
+          </a:fontRef>
+        </p:style>
+        <p:txBody>
+          <a:bodyPr rtlCol="0" anchor="ctr"/>
+          <a:lstStyle/>
+          <a:p>
+            <a:pPr algn="ctr"/>
+            <a:endParaRPr lang="es-ES"/>
+          </a:p>
+        </p:txBody>
+      </p:sp>
+      <p:sp>
+        <p:nvSpPr>
+          <p:cNvPr id="63" name="Rechthoek 62">
+            <a:extLst>
+              <a:ext uri="{FF2B5EF4-FFF2-40B4-BE49-F238E27FC236}">
+                <a16:creationId xmlns:a16="http://schemas.microsoft.com/office/drawing/2014/main" id="{1C792E4E-5918-40B6-980E-9FF04A29BC14}"/>
+              </a:ext>
+            </a:extLst>
+          </p:cNvPr>
+          <p:cNvSpPr/>
+          <p:nvPr/>
+        </p:nvSpPr>
+        <p:spPr>
+          <a:xfrm>
+            <a:off x="1709197" y="2044643"/>
+            <a:ext cx="1035225" cy="399012"/>
+          </a:xfrm>
+          <a:prstGeom prst="rect">
+            <a:avLst/>
+          </a:prstGeom>
+          <a:noFill/>
+          <a:ln>
+            <a:noFill/>
+          </a:ln>
+        </p:spPr>
+        <p:style>
+          <a:lnRef idx="2">
+            <a:schemeClr val="accent1">
+              <a:shade val="50000"/>
+            </a:schemeClr>
+          </a:lnRef>
+          <a:fillRef idx="1">
+            <a:schemeClr val="accent1"/>
+          </a:fillRef>
+          <a:effectRef idx="0">
+            <a:schemeClr val="accent1"/>
+          </a:effectRef>
+          <a:fontRef idx="minor">
+            <a:schemeClr val="lt1"/>
+          </a:fontRef>
+        </p:style>
+        <p:txBody>
+          <a:bodyPr rtlCol="0" anchor="ctr"/>
+          <a:lstStyle/>
+          <a:p>
+            <a:pPr algn="ctr"/>
+            <a:r>
+              <a:rPr lang="es-ES" sz="1600" dirty="0">
+                <a:solidFill>
+                  <a:schemeClr val="tx1"/>
+                </a:solidFill>
+                <a:latin typeface="Consolas" panose="020B0609020204030204" pitchFamily="49" charset="0"/>
+              </a:rPr>
+              <a:t>flex_15</a:t>
+            </a:r>
+          </a:p>
+        </p:txBody>
+      </p:sp>
+      <p:sp>
+        <p:nvSpPr>
+          <p:cNvPr id="64" name="Rechthoek 63">
+            <a:extLst>
+              <a:ext uri="{FF2B5EF4-FFF2-40B4-BE49-F238E27FC236}">
+                <a16:creationId xmlns:a16="http://schemas.microsoft.com/office/drawing/2014/main" id="{D74578DD-F913-4337-B11D-F1076D02F75F}"/>
+              </a:ext>
+            </a:extLst>
+          </p:cNvPr>
+          <p:cNvSpPr/>
+          <p:nvPr/>
+        </p:nvSpPr>
+        <p:spPr>
+          <a:xfrm>
+            <a:off x="3117844" y="2951518"/>
+            <a:ext cx="570676" cy="399012"/>
+          </a:xfrm>
+          <a:prstGeom prst="rect">
+            <a:avLst/>
+          </a:prstGeom>
+          <a:noFill/>
+          <a:ln>
+            <a:noFill/>
+          </a:ln>
+        </p:spPr>
+        <p:style>
+          <a:lnRef idx="2">
+            <a:schemeClr val="accent1">
+              <a:shade val="50000"/>
+            </a:schemeClr>
+          </a:lnRef>
+          <a:fillRef idx="1">
+            <a:schemeClr val="accent1"/>
+          </a:fillRef>
+          <a:effectRef idx="0">
+            <a:schemeClr val="accent1"/>
+          </a:effectRef>
+          <a:fontRef idx="minor">
+            <a:schemeClr val="lt1"/>
+          </a:fontRef>
+        </p:style>
+        <p:txBody>
+          <a:bodyPr rtlCol="0" anchor="ctr"/>
+          <a:lstStyle/>
+          <a:p>
+            <a:pPr algn="ctr"/>
+            <a:r>
+              <a:rPr lang="es-ES" sz="1600" dirty="0">
+                <a:solidFill>
+                  <a:schemeClr val="tx1"/>
+                </a:solidFill>
+                <a:latin typeface="Consolas" panose="020B0609020204030204" pitchFamily="49" charset="0"/>
+              </a:rPr>
+              <a:t>…</a:t>
+            </a:r>
+          </a:p>
+        </p:txBody>
+      </p:sp>
+      <p:sp>
+        <p:nvSpPr>
+          <p:cNvPr id="44" name="Rechthoek 62">
+            <a:extLst>
+              <a:ext uri="{FF2B5EF4-FFF2-40B4-BE49-F238E27FC236}">
+                <a16:creationId xmlns:a16="http://schemas.microsoft.com/office/drawing/2014/main" id="{9737AA9E-6536-47F2-A956-FA94E6459183}"/>
+              </a:ext>
+            </a:extLst>
+          </p:cNvPr>
+          <p:cNvSpPr/>
+          <p:nvPr/>
+        </p:nvSpPr>
+        <p:spPr>
+          <a:xfrm>
+            <a:off x="3868602" y="3699485"/>
+            <a:ext cx="1035225" cy="399012"/>
+          </a:xfrm>
+          <a:prstGeom prst="rect">
+            <a:avLst/>
+          </a:prstGeom>
+          <a:noFill/>
+          <a:ln>
+            <a:noFill/>
+          </a:ln>
+        </p:spPr>
+        <p:style>
+          <a:lnRef idx="2">
+            <a:schemeClr val="accent1">
+              <a:shade val="50000"/>
+            </a:schemeClr>
+          </a:lnRef>
+          <a:fillRef idx="1">
+            <a:schemeClr val="accent1"/>
+          </a:fillRef>
+          <a:effectRef idx="0">
+            <a:schemeClr val="accent1"/>
+          </a:effectRef>
+          <a:fontRef idx="minor">
+            <a:schemeClr val="lt1"/>
+          </a:fontRef>
+        </p:style>
+        <p:txBody>
+          <a:bodyPr rtlCol="0" anchor="ctr"/>
+          <a:lstStyle/>
+          <a:p>
+            <a:pPr algn="ctr"/>
+            <a:r>
+              <a:rPr lang="es-ES" sz="1600" dirty="0">
+                <a:solidFill>
+                  <a:schemeClr val="tx1"/>
+                </a:solidFill>
+                <a:latin typeface="Consolas" panose="020B0609020204030204" pitchFamily="49" charset="0"/>
+              </a:rPr>
+              <a:t>flex_4</a:t>
+            </a:r>
+          </a:p>
+        </p:txBody>
+      </p:sp>
+      <p:sp>
+        <p:nvSpPr>
+          <p:cNvPr id="50" name="Rechthoek 62">
+            <a:extLst>
+              <a:ext uri="{FF2B5EF4-FFF2-40B4-BE49-F238E27FC236}">
+                <a16:creationId xmlns:a16="http://schemas.microsoft.com/office/drawing/2014/main" id="{A3761784-E224-45AF-A315-CAAF3523936B}"/>
+              </a:ext>
+            </a:extLst>
+          </p:cNvPr>
+          <p:cNvSpPr/>
+          <p:nvPr/>
+        </p:nvSpPr>
+        <p:spPr>
+          <a:xfrm>
+            <a:off x="4979227" y="4537224"/>
+            <a:ext cx="1035225" cy="399012"/>
+          </a:xfrm>
+          <a:prstGeom prst="rect">
+            <a:avLst/>
+          </a:prstGeom>
+          <a:noFill/>
+          <a:ln>
+            <a:noFill/>
+          </a:ln>
+        </p:spPr>
+        <p:style>
+          <a:lnRef idx="2">
+            <a:schemeClr val="accent1">
+              <a:shade val="50000"/>
+            </a:schemeClr>
+          </a:lnRef>
+          <a:fillRef idx="1">
+            <a:schemeClr val="accent1"/>
+          </a:fillRef>
+          <a:effectRef idx="0">
+            <a:schemeClr val="accent1"/>
+          </a:effectRef>
+          <a:fontRef idx="minor">
+            <a:schemeClr val="lt1"/>
+          </a:fontRef>
+        </p:style>
+        <p:txBody>
+          <a:bodyPr rtlCol="0" anchor="ctr"/>
+          <a:lstStyle/>
+          <a:p>
+            <a:pPr algn="ctr"/>
+            <a:r>
+              <a:rPr lang="es-ES" sz="1600" dirty="0">
+                <a:solidFill>
+                  <a:schemeClr val="tx1"/>
+                </a:solidFill>
+                <a:latin typeface="Consolas" panose="020B0609020204030204" pitchFamily="49" charset="0"/>
+              </a:rPr>
+              <a:t>flex_3</a:t>
+            </a:r>
+          </a:p>
+        </p:txBody>
+      </p:sp>
+      <p:sp>
+        <p:nvSpPr>
+          <p:cNvPr id="51" name="Rechthoek 62">
+            <a:extLst>
+              <a:ext uri="{FF2B5EF4-FFF2-40B4-BE49-F238E27FC236}">
+                <a16:creationId xmlns:a16="http://schemas.microsoft.com/office/drawing/2014/main" id="{517A5A3E-36B3-4680-919F-F0679A6F5E77}"/>
+              </a:ext>
+            </a:extLst>
+          </p:cNvPr>
+          <p:cNvSpPr/>
+          <p:nvPr/>
+        </p:nvSpPr>
+        <p:spPr>
+          <a:xfrm>
+            <a:off x="6021688" y="5272384"/>
+            <a:ext cx="1035225" cy="399012"/>
+          </a:xfrm>
+          <a:prstGeom prst="rect">
+            <a:avLst/>
+          </a:prstGeom>
+          <a:noFill/>
+          <a:ln>
+            <a:noFill/>
+          </a:ln>
+        </p:spPr>
+        <p:style>
+          <a:lnRef idx="2">
+            <a:schemeClr val="accent1">
+              <a:shade val="50000"/>
+            </a:schemeClr>
+          </a:lnRef>
+          <a:fillRef idx="1">
+            <a:schemeClr val="accent1"/>
+          </a:fillRef>
+          <a:effectRef idx="0">
+            <a:schemeClr val="accent1"/>
+          </a:effectRef>
+          <a:fontRef idx="minor">
+            <a:schemeClr val="lt1"/>
+          </a:fontRef>
+        </p:style>
+        <p:txBody>
+          <a:bodyPr rtlCol="0" anchor="ctr"/>
+          <a:lstStyle/>
+          <a:p>
+            <a:pPr algn="ctr"/>
+            <a:r>
+              <a:rPr lang="es-ES" sz="1600" dirty="0">
+                <a:solidFill>
+                  <a:schemeClr val="tx1"/>
+                </a:solidFill>
+                <a:latin typeface="Consolas" panose="020B0609020204030204" pitchFamily="49" charset="0"/>
+              </a:rPr>
+              <a:t>flex_2</a:t>
+            </a:r>
+          </a:p>
+        </p:txBody>
+      </p:sp>
+      <p:sp>
+        <p:nvSpPr>
+          <p:cNvPr id="52" name="Rechthoek 62">
+            <a:extLst>
+              <a:ext uri="{FF2B5EF4-FFF2-40B4-BE49-F238E27FC236}">
+                <a16:creationId xmlns:a16="http://schemas.microsoft.com/office/drawing/2014/main" id="{32789738-BCEC-45CE-A629-2D2640616A94}"/>
+              </a:ext>
+            </a:extLst>
+          </p:cNvPr>
+          <p:cNvSpPr/>
+          <p:nvPr/>
+        </p:nvSpPr>
+        <p:spPr>
+          <a:xfrm>
+            <a:off x="7081954" y="6066892"/>
+            <a:ext cx="1035225" cy="399012"/>
+          </a:xfrm>
+          <a:prstGeom prst="rect">
+            <a:avLst/>
+          </a:prstGeom>
+          <a:noFill/>
+          <a:ln>
+            <a:noFill/>
+          </a:ln>
+        </p:spPr>
+        <p:style>
+          <a:lnRef idx="2">
+            <a:schemeClr val="accent1">
+              <a:shade val="50000"/>
+            </a:schemeClr>
+          </a:lnRef>
+          <a:fillRef idx="1">
+            <a:schemeClr val="accent1"/>
+          </a:fillRef>
+          <a:effectRef idx="0">
+            <a:schemeClr val="accent1"/>
+          </a:effectRef>
+          <a:fontRef idx="minor">
+            <a:schemeClr val="lt1"/>
+          </a:fontRef>
+        </p:style>
+        <p:txBody>
+          <a:bodyPr rtlCol="0" anchor="ctr"/>
+          <a:lstStyle/>
+          <a:p>
+            <a:pPr algn="ctr"/>
+            <a:r>
+              <a:rPr lang="es-ES" sz="1600" dirty="0">
+                <a:solidFill>
+                  <a:schemeClr val="tx1"/>
+                </a:solidFill>
+                <a:latin typeface="Consolas" panose="020B0609020204030204" pitchFamily="49" charset="0"/>
+              </a:rPr>
+              <a:t>flex_1</a:t>
+            </a:r>
+          </a:p>
+        </p:txBody>
+      </p:sp>
+      <p:sp>
+        <p:nvSpPr>
+          <p:cNvPr id="2" name="Rectangle 1">
+            <a:extLst>
+              <a:ext uri="{FF2B5EF4-FFF2-40B4-BE49-F238E27FC236}">
+                <a16:creationId xmlns:a16="http://schemas.microsoft.com/office/drawing/2014/main" id="{0D7B7C2C-8865-42BC-8FEE-964ADB6FB541}"/>
+              </a:ext>
+            </a:extLst>
+          </p:cNvPr>
+          <p:cNvSpPr/>
+          <p:nvPr/>
+        </p:nvSpPr>
+        <p:spPr>
+          <a:xfrm>
+            <a:off x="8391655" y="5952059"/>
+            <a:ext cx="1747519" cy="641773"/>
+          </a:xfrm>
+          <a:prstGeom prst="rect">
+            <a:avLst/>
+          </a:prstGeom>
+          <a:solidFill>
+            <a:srgbClr val="90B4D2"/>
+          </a:solidFill>
+          <a:ln>
+            <a:noFill/>
+          </a:ln>
+        </p:spPr>
+        <p:style>
+          <a:lnRef idx="2">
+            <a:schemeClr val="accent1">
+              <a:shade val="50000"/>
+            </a:schemeClr>
+          </a:lnRef>
+          <a:fillRef idx="1">
+            <a:schemeClr val="accent1"/>
+          </a:fillRef>
+          <a:effectRef idx="0">
+            <a:schemeClr val="accent1"/>
+          </a:effectRef>
+          <a:fontRef idx="minor">
+            <a:schemeClr val="lt1"/>
+          </a:fontRef>
+        </p:style>
+        <p:txBody>
+          <a:bodyPr rtlCol="0" anchor="ctr"/>
+          <a:lstStyle/>
+          <a:p>
+            <a:pPr algn="ctr"/>
+            <a:r>
+              <a:rPr lang="es-ES" dirty="0">
+                <a:solidFill>
+                  <a:schemeClr val="bg1"/>
+                </a:solidFill>
+                <a:latin typeface="Consolas" panose="020B0609020204030204" pitchFamily="49" charset="0"/>
+              </a:rPr>
+              <a:t>fixed_demand</a:t>
+            </a:r>
+          </a:p>
+        </p:txBody>
+      </p:sp>
+      <p:sp>
+        <p:nvSpPr>
+          <p:cNvPr id="6" name="Arrow: Left-Right 5">
+            <a:extLst>
+              <a:ext uri="{FF2B5EF4-FFF2-40B4-BE49-F238E27FC236}">
+                <a16:creationId xmlns:a16="http://schemas.microsoft.com/office/drawing/2014/main" id="{A1D0F5C7-BD13-46F0-90F7-8D7E32BAAF57}"/>
+              </a:ext>
+            </a:extLst>
+          </p:cNvPr>
+          <p:cNvSpPr/>
+          <p:nvPr/>
+        </p:nvSpPr>
+        <p:spPr>
+          <a:xfrm>
+            <a:off x="7816175" y="5515963"/>
+            <a:ext cx="1015994" cy="359691"/>
+          </a:xfrm>
+          <a:prstGeom prst="leftRightArrow">
+            <a:avLst/>
+          </a:prstGeom>
+          <a:solidFill>
+            <a:schemeClr val="bg1">
+              <a:lumMod val="85000"/>
+            </a:schemeClr>
+          </a:solidFill>
+          <a:ln>
+            <a:noFill/>
+          </a:ln>
+        </p:spPr>
+        <p:style>
+          <a:lnRef idx="0">
+            <a:scrgbClr r="0" g="0" b="0"/>
+          </a:lnRef>
+          <a:fillRef idx="0">
+            <a:scrgbClr r="0" g="0" b="0"/>
+          </a:fillRef>
+          <a:effectRef idx="0">
+            <a:scrgbClr r="0" g="0" b="0"/>
+          </a:effectRef>
+          <a:fontRef idx="minor">
+            <a:schemeClr val="dk1"/>
+          </a:fontRef>
+        </p:style>
+        <p:txBody>
+          <a:bodyPr rtlCol="0" anchor="ctr"/>
+          <a:lstStyle/>
+          <a:p>
+            <a:pPr algn="ctr"/>
+            <a:endParaRPr lang="en-US">
+              <a:solidFill>
+                <a:schemeClr val="dk1"/>
+              </a:solidFill>
+              <a:latin typeface="Myriad Pro" panose="020B0503030403020204" pitchFamily="34" charset="0"/>
+            </a:endParaRPr>
+          </a:p>
+        </p:txBody>
+      </p:sp>
+      <p:sp>
+        <p:nvSpPr>
+          <p:cNvPr id="53" name="Tekstballon: rechthoek met afgeronde hoeken 27">
+            <a:extLst>
+              <a:ext uri="{FF2B5EF4-FFF2-40B4-BE49-F238E27FC236}">
+                <a16:creationId xmlns:a16="http://schemas.microsoft.com/office/drawing/2014/main" id="{7C19119D-EEA4-4296-A981-C92AB1AAD05B}"/>
+              </a:ext>
+            </a:extLst>
+          </p:cNvPr>
+          <p:cNvSpPr/>
+          <p:nvPr/>
+        </p:nvSpPr>
+        <p:spPr>
+          <a:xfrm>
+            <a:off x="2012144" y="5704383"/>
+            <a:ext cx="2211399" cy="761521"/>
+          </a:xfrm>
+          <a:prstGeom prst="wedgeRoundRectCallout">
+            <a:avLst>
+              <a:gd name="adj1" fmla="val -21307"/>
+              <a:gd name="adj2" fmla="val 18819"/>
+              <a:gd name="adj3" fmla="val 16667"/>
+            </a:avLst>
+          </a:prstGeom>
+          <a:solidFill>
+            <a:schemeClr val="bg1">
+              <a:lumMod val="85000"/>
+            </a:schemeClr>
+          </a:solidFill>
+          <a:ln>
+            <a:noFill/>
+          </a:ln>
+        </p:spPr>
+        <p:style>
+          <a:lnRef idx="0">
+            <a:scrgbClr r="0" g="0" b="0"/>
+          </a:lnRef>
+          <a:fillRef idx="0">
+            <a:scrgbClr r="0" g="0" b="0"/>
+          </a:fillRef>
+          <a:effectRef idx="0">
+            <a:scrgbClr r="0" g="0" b="0"/>
+          </a:effectRef>
+          <a:fontRef idx="minor">
+            <a:schemeClr val="dk1"/>
+          </a:fontRef>
+        </p:style>
+        <p:txBody>
+          <a:bodyPr rtlCol="0" anchor="ctr"/>
+          <a:lstStyle/>
+          <a:p>
+            <a:pPr algn="ctr"/>
+            <a:r>
+              <a:rPr lang="en-US" sz="1600" dirty="0">
+                <a:latin typeface="Consolas" panose="020B0609020204030204" pitchFamily="49" charset="0"/>
+              </a:rPr>
+              <a:t>flex_1</a:t>
+            </a:r>
+            <a:r>
+              <a:rPr lang="en-US" sz="1600" dirty="0">
+                <a:latin typeface="Source Sans Pro" panose="020B0503030403020204" pitchFamily="34" charset="0"/>
+              </a:rPr>
+              <a:t> behaves as </a:t>
+            </a:r>
+            <a:r>
+              <a:rPr lang="en-US" sz="1600" dirty="0" err="1">
+                <a:latin typeface="Consolas" panose="020B0609020204030204" pitchFamily="49" charset="0"/>
+              </a:rPr>
+              <a:t>fixed_demand</a:t>
+            </a:r>
+            <a:endParaRPr lang="en-US" sz="1600" dirty="0">
+              <a:latin typeface="Consolas" panose="020B0609020204030204" pitchFamily="49" charset="0"/>
+            </a:endParaRPr>
+          </a:p>
+        </p:txBody>
+      </p:sp>
+    </p:spTree>
+    <p:extLst>
+      <p:ext uri="{BB962C8B-B14F-4D97-AF65-F5344CB8AC3E}">
+        <p14:creationId xmlns:p14="http://schemas.microsoft.com/office/powerpoint/2010/main" val="4217298631"/>
+      </p:ext>
+    </p:extLst>
+  </p:cSld>
+  <p:clrMapOvr>
+    <a:masterClrMapping/>
+  </p:clrMapOvr>
+</p:sld>
+</file>
+
+<file path=ppt/slides/slide15.xml><?xml version="1.0" encoding="utf-8"?>
 <p:sld xmlns:a="http://schemas.openxmlformats.org/drawingml/2006/main" xmlns:r="http://schemas.openxmlformats.org/officeDocument/2006/relationships" xmlns:p="http://schemas.openxmlformats.org/presentationml/2006/main">
   <p:cSld>
     <p:spTree>
@@ -9730,7 +12220,7 @@
 </p:sld>
 </file>
 
-<file path=ppt/slides/slide14.xml><?xml version="1.0" encoding="utf-8"?>
+<file path=ppt/slides/slide16.xml><?xml version="1.0" encoding="utf-8"?>
 <p:sld xmlns:a="http://schemas.openxmlformats.org/drawingml/2006/main" xmlns:r="http://schemas.openxmlformats.org/officeDocument/2006/relationships" xmlns:p="http://schemas.openxmlformats.org/presentationml/2006/main">
   <p:cSld>
     <p:spTree>
@@ -10771,7 +13261,7 @@
 </p:sld>
 </file>
 
-<file path=ppt/slides/slide15.xml><?xml version="1.0" encoding="utf-8"?>
+<file path=ppt/slides/slide17.xml><?xml version="1.0" encoding="utf-8"?>
 <p:sld xmlns:a="http://schemas.openxmlformats.org/drawingml/2006/main" xmlns:r="http://schemas.openxmlformats.org/officeDocument/2006/relationships" xmlns:p="http://schemas.openxmlformats.org/presentationml/2006/main">
   <p:cSld>
     <p:spTree>
@@ -24404,6 +26894,866 @@
       </p:grpSpPr>
       <p:sp>
         <p:nvSpPr>
+          <p:cNvPr id="35" name="Rectangle 3">
+            <a:extLst>
+              <a:ext uri="{FF2B5EF4-FFF2-40B4-BE49-F238E27FC236}">
+                <a16:creationId xmlns:a16="http://schemas.microsoft.com/office/drawing/2014/main" id="{9888744B-427F-4BB2-93E5-CAC644B36734}"/>
+              </a:ext>
+            </a:extLst>
+          </p:cNvPr>
+          <p:cNvSpPr/>
+          <p:nvPr/>
+        </p:nvSpPr>
+        <p:spPr>
+          <a:xfrm>
+            <a:off x="468298" y="335220"/>
+            <a:ext cx="4533466" cy="619462"/>
+          </a:xfrm>
+          <a:prstGeom prst="rect">
+            <a:avLst/>
+          </a:prstGeom>
+          <a:ln>
+            <a:noFill/>
+          </a:ln>
+        </p:spPr>
+        <p:style>
+          <a:lnRef idx="2">
+            <a:schemeClr val="dk1"/>
+          </a:lnRef>
+          <a:fillRef idx="1">
+            <a:schemeClr val="lt1"/>
+          </a:fillRef>
+          <a:effectRef idx="0">
+            <a:schemeClr val="dk1"/>
+          </a:effectRef>
+          <a:fontRef idx="minor">
+            <a:schemeClr val="dk1"/>
+          </a:fontRef>
+        </p:style>
+        <p:txBody>
+          <a:bodyPr rtlCol="0" anchor="ctr"/>
+          <a:lstStyle/>
+          <a:p>
+            <a:pPr algn="ctr"/>
+            <a:r>
+              <a:rPr lang="en-US" sz="3200" dirty="0">
+                <a:latin typeface="Myriad Pro" panose="020B0503030403020204" pitchFamily="34" charset="0"/>
+              </a:rPr>
+              <a:t>Fitting curve</a:t>
+            </a:r>
+          </a:p>
+        </p:txBody>
+      </p:sp>
+      <p:sp>
+        <p:nvSpPr>
+          <p:cNvPr id="36" name="Rechthoek 35">
+            <a:extLst>
+              <a:ext uri="{FF2B5EF4-FFF2-40B4-BE49-F238E27FC236}">
+                <a16:creationId xmlns:a16="http://schemas.microsoft.com/office/drawing/2014/main" id="{B790EBF1-7F5C-48C1-BEEA-5A4CF193558B}"/>
+              </a:ext>
+            </a:extLst>
+          </p:cNvPr>
+          <p:cNvSpPr/>
+          <p:nvPr/>
+        </p:nvSpPr>
+        <p:spPr>
+          <a:xfrm>
+            <a:off x="3309796" y="1061908"/>
+            <a:ext cx="6607380" cy="161398"/>
+          </a:xfrm>
+          <a:prstGeom prst="rect">
+            <a:avLst/>
+          </a:prstGeom>
+        </p:spPr>
+        <p:style>
+          <a:lnRef idx="2">
+            <a:schemeClr val="accent1">
+              <a:shade val="50000"/>
+            </a:schemeClr>
+          </a:lnRef>
+          <a:fillRef idx="1">
+            <a:schemeClr val="accent1"/>
+          </a:fillRef>
+          <a:effectRef idx="0">
+            <a:schemeClr val="accent1"/>
+          </a:effectRef>
+          <a:fontRef idx="minor">
+            <a:schemeClr val="lt1"/>
+          </a:fontRef>
+        </p:style>
+        <p:txBody>
+          <a:bodyPr rtlCol="0" anchor="ctr"/>
+          <a:lstStyle/>
+          <a:p>
+            <a:pPr algn="ctr"/>
+            <a:endParaRPr lang="es-ES"/>
+          </a:p>
+        </p:txBody>
+      </p:sp>
+      <p:sp>
+        <p:nvSpPr>
+          <p:cNvPr id="61" name="Pijl: gebogen 60">
+            <a:extLst>
+              <a:ext uri="{FF2B5EF4-FFF2-40B4-BE49-F238E27FC236}">
+                <a16:creationId xmlns:a16="http://schemas.microsoft.com/office/drawing/2014/main" id="{08BB6C7D-4076-4E77-8AD7-1A03523C6DD5}"/>
+              </a:ext>
+            </a:extLst>
+          </p:cNvPr>
+          <p:cNvSpPr/>
+          <p:nvPr/>
+        </p:nvSpPr>
+        <p:spPr>
+          <a:xfrm rot="16200000" flipH="1" flipV="1">
+            <a:off x="-355332" y="1731403"/>
+            <a:ext cx="1471823" cy="1220964"/>
+          </a:xfrm>
+          <a:prstGeom prst="bentArrow">
+            <a:avLst>
+              <a:gd name="adj1" fmla="val 19544"/>
+              <a:gd name="adj2" fmla="val 18003"/>
+              <a:gd name="adj3" fmla="val 23091"/>
+              <a:gd name="adj4" fmla="val 45841"/>
+            </a:avLst>
+          </a:prstGeom>
+          <a:solidFill>
+            <a:schemeClr val="bg1">
+              <a:lumMod val="85000"/>
+            </a:schemeClr>
+          </a:solidFill>
+          <a:ln>
+            <a:noFill/>
+          </a:ln>
+        </p:spPr>
+        <p:style>
+          <a:lnRef idx="0">
+            <a:scrgbClr r="0" g="0" b="0"/>
+          </a:lnRef>
+          <a:fillRef idx="0">
+            <a:scrgbClr r="0" g="0" b="0"/>
+          </a:fillRef>
+          <a:effectRef idx="0">
+            <a:scrgbClr r="0" g="0" b="0"/>
+          </a:effectRef>
+          <a:fontRef idx="minor">
+            <a:schemeClr val="dk1"/>
+          </a:fontRef>
+        </p:style>
+        <p:txBody>
+          <a:bodyPr rtlCol="0" anchor="ctr"/>
+          <a:lstStyle/>
+          <a:p>
+            <a:pPr algn="ctr"/>
+            <a:endParaRPr lang="es-ES">
+              <a:solidFill>
+                <a:schemeClr val="dk1"/>
+              </a:solidFill>
+              <a:latin typeface="Myriad Pro" panose="020B0503030403020204" pitchFamily="34" charset="0"/>
+            </a:endParaRPr>
+          </a:p>
+        </p:txBody>
+      </p:sp>
+      <p:sp>
+        <p:nvSpPr>
+          <p:cNvPr id="70" name="Pijl: gebogen 69">
+            <a:extLst>
+              <a:ext uri="{FF2B5EF4-FFF2-40B4-BE49-F238E27FC236}">
+                <a16:creationId xmlns:a16="http://schemas.microsoft.com/office/drawing/2014/main" id="{851D5282-4385-4A98-BA9E-A379A9E0F812}"/>
+              </a:ext>
+            </a:extLst>
+          </p:cNvPr>
+          <p:cNvSpPr/>
+          <p:nvPr/>
+        </p:nvSpPr>
+        <p:spPr>
+          <a:xfrm rot="5400000" flipV="1">
+            <a:off x="918736" y="1802525"/>
+            <a:ext cx="1471823" cy="1220964"/>
+          </a:xfrm>
+          <a:prstGeom prst="bentArrow">
+            <a:avLst>
+              <a:gd name="adj1" fmla="val 19544"/>
+              <a:gd name="adj2" fmla="val 18003"/>
+              <a:gd name="adj3" fmla="val 23091"/>
+              <a:gd name="adj4" fmla="val 45841"/>
+            </a:avLst>
+          </a:prstGeom>
+          <a:solidFill>
+            <a:schemeClr val="bg1">
+              <a:lumMod val="85000"/>
+            </a:schemeClr>
+          </a:solidFill>
+          <a:ln>
+            <a:noFill/>
+          </a:ln>
+        </p:spPr>
+        <p:style>
+          <a:lnRef idx="0">
+            <a:scrgbClr r="0" g="0" b="0"/>
+          </a:lnRef>
+          <a:fillRef idx="0">
+            <a:scrgbClr r="0" g="0" b="0"/>
+          </a:fillRef>
+          <a:effectRef idx="0">
+            <a:scrgbClr r="0" g="0" b="0"/>
+          </a:effectRef>
+          <a:fontRef idx="minor">
+            <a:schemeClr val="dk1"/>
+          </a:fontRef>
+        </p:style>
+        <p:txBody>
+          <a:bodyPr rtlCol="0" anchor="ctr"/>
+          <a:lstStyle/>
+          <a:p>
+            <a:pPr algn="ctr"/>
+            <a:endParaRPr lang="es-ES">
+              <a:solidFill>
+                <a:schemeClr val="dk1"/>
+              </a:solidFill>
+              <a:latin typeface="Myriad Pro" panose="020B0503030403020204" pitchFamily="34" charset="0"/>
+            </a:endParaRPr>
+          </a:p>
+        </p:txBody>
+      </p:sp>
+      <p:grpSp>
+        <p:nvGrpSpPr>
+          <p:cNvPr id="8" name="Group 7">
+            <a:extLst>
+              <a:ext uri="{FF2B5EF4-FFF2-40B4-BE49-F238E27FC236}">
+                <a16:creationId xmlns:a16="http://schemas.microsoft.com/office/drawing/2014/main" id="{D5ED4C82-3D57-411C-AE57-644077A3E7A0}"/>
+              </a:ext>
+            </a:extLst>
+          </p:cNvPr>
+          <p:cNvGrpSpPr/>
+          <p:nvPr/>
+        </p:nvGrpSpPr>
+        <p:grpSpPr>
+          <a:xfrm>
+            <a:off x="3309796" y="1788044"/>
+            <a:ext cx="6607380" cy="3072418"/>
+            <a:chOff x="3309796" y="1788044"/>
+            <a:chExt cx="6607380" cy="3072418"/>
+          </a:xfrm>
+        </p:grpSpPr>
+        <p:pic>
+          <p:nvPicPr>
+            <p:cNvPr id="55" name="Graphic 54">
+              <a:extLst>
+                <a:ext uri="{FF2B5EF4-FFF2-40B4-BE49-F238E27FC236}">
+                  <a16:creationId xmlns:a16="http://schemas.microsoft.com/office/drawing/2014/main" id="{D09FC886-26D6-48E1-ACA9-B4F980E3BE3D}"/>
+                </a:ext>
+              </a:extLst>
+            </p:cNvPr>
+            <p:cNvPicPr>
+              <a:picLocks noChangeAspect="1"/>
+            </p:cNvPicPr>
+            <p:nvPr/>
+          </p:nvPicPr>
+          <p:blipFill>
+            <a:blip r:embed="rId2">
+              <a:extLst>
+                <a:ext uri="{96DAC541-7B7A-43D3-8B79-37D633B846F1}">
+                  <asvg:svgBlip xmlns:asvg="http://schemas.microsoft.com/office/drawing/2016/SVG/main" r:embed="rId3"/>
+                </a:ext>
+              </a:extLst>
+            </a:blip>
+            <a:stretch>
+              <a:fillRect/>
+            </a:stretch>
+          </p:blipFill>
+          <p:spPr>
+            <a:xfrm>
+              <a:off x="8092068" y="2782602"/>
+              <a:ext cx="1220964" cy="1032156"/>
+            </a:xfrm>
+            <a:prstGeom prst="rect">
+              <a:avLst/>
+            </a:prstGeom>
+          </p:spPr>
+        </p:pic>
+        <p:grpSp>
+          <p:nvGrpSpPr>
+            <p:cNvPr id="2" name="Groep 1">
+              <a:extLst>
+                <a:ext uri="{FF2B5EF4-FFF2-40B4-BE49-F238E27FC236}">
+                  <a16:creationId xmlns:a16="http://schemas.microsoft.com/office/drawing/2014/main" id="{C7526A9D-4AB8-4EB7-8FF4-6E2E5725406F}"/>
+                </a:ext>
+              </a:extLst>
+            </p:cNvPr>
+            <p:cNvGrpSpPr/>
+            <p:nvPr/>
+          </p:nvGrpSpPr>
+          <p:grpSpPr>
+            <a:xfrm>
+              <a:off x="4407625" y="1788044"/>
+              <a:ext cx="1343562" cy="994557"/>
+              <a:chOff x="2941269" y="1960176"/>
+              <a:chExt cx="1374591" cy="1017531"/>
+            </a:xfrm>
+          </p:grpSpPr>
+          <p:pic>
+            <p:nvPicPr>
+              <p:cNvPr id="59" name="Graphic 58">
+                <a:extLst>
+                  <a:ext uri="{FF2B5EF4-FFF2-40B4-BE49-F238E27FC236}">
+                    <a16:creationId xmlns:a16="http://schemas.microsoft.com/office/drawing/2014/main" id="{53FD0E8C-9C12-4DAD-BDE8-51963ADE8FAA}"/>
+                  </a:ext>
+                </a:extLst>
+              </p:cNvPr>
+              <p:cNvPicPr>
+                <a:picLocks noChangeAspect="1"/>
+              </p:cNvPicPr>
+              <p:nvPr/>
+            </p:nvPicPr>
+            <p:blipFill>
+              <a:blip r:embed="rId4">
+                <a:extLst>
+                  <a:ext uri="{96DAC541-7B7A-43D3-8B79-37D633B846F1}">
+                    <asvg:svgBlip xmlns:asvg="http://schemas.microsoft.com/office/drawing/2016/SVG/main" r:embed="rId5"/>
+                  </a:ext>
+                </a:extLst>
+              </a:blip>
+              <a:stretch>
+                <a:fillRect/>
+              </a:stretch>
+            </p:blipFill>
+            <p:spPr>
+              <a:xfrm>
+                <a:off x="3437377" y="1960176"/>
+                <a:ext cx="403578" cy="714531"/>
+              </a:xfrm>
+              <a:prstGeom prst="rect">
+                <a:avLst/>
+              </a:prstGeom>
+            </p:spPr>
+          </p:pic>
+          <p:sp>
+            <p:nvSpPr>
+              <p:cNvPr id="67" name="Rechthoek: afgeronde hoeken 66">
+                <a:extLst>
+                  <a:ext uri="{FF2B5EF4-FFF2-40B4-BE49-F238E27FC236}">
+                    <a16:creationId xmlns:a16="http://schemas.microsoft.com/office/drawing/2014/main" id="{FCE76FDB-4002-444D-9A15-C354E0708CD1}"/>
+                  </a:ext>
+                </a:extLst>
+              </p:cNvPr>
+              <p:cNvSpPr/>
+              <p:nvPr/>
+            </p:nvSpPr>
+            <p:spPr>
+              <a:xfrm>
+                <a:off x="2941269" y="2691617"/>
+                <a:ext cx="1374591" cy="286090"/>
+              </a:xfrm>
+              <a:prstGeom prst="roundRect">
+                <a:avLst/>
+              </a:prstGeom>
+              <a:solidFill>
+                <a:srgbClr val="767171"/>
+              </a:solidFill>
+              <a:ln>
+                <a:noFill/>
+              </a:ln>
+            </p:spPr>
+            <p:style>
+              <a:lnRef idx="2">
+                <a:schemeClr val="accent1">
+                  <a:shade val="50000"/>
+                </a:schemeClr>
+              </a:lnRef>
+              <a:fillRef idx="1">
+                <a:schemeClr val="accent1"/>
+              </a:fillRef>
+              <a:effectRef idx="0">
+                <a:schemeClr val="accent1"/>
+              </a:effectRef>
+              <a:fontRef idx="minor">
+                <a:schemeClr val="lt1"/>
+              </a:fontRef>
+            </p:style>
+            <p:txBody>
+              <a:bodyPr rtlCol="0" anchor="ctr"/>
+              <a:lstStyle/>
+              <a:p>
+                <a:pPr algn="ctr"/>
+                <a:r>
+                  <a:rPr lang="en-US" sz="1600" dirty="0">
+                    <a:latin typeface="Source Sans Pro" panose="020B0503030403020204" pitchFamily="34" charset="0"/>
+                  </a:rPr>
+                  <a:t>consumption</a:t>
+                </a:r>
+              </a:p>
+            </p:txBody>
+          </p:sp>
+        </p:grpSp>
+        <p:grpSp>
+          <p:nvGrpSpPr>
+            <p:cNvPr id="3" name="Groep 2">
+              <a:extLst>
+                <a:ext uri="{FF2B5EF4-FFF2-40B4-BE49-F238E27FC236}">
+                  <a16:creationId xmlns:a16="http://schemas.microsoft.com/office/drawing/2014/main" id="{4C505B6E-A8D2-4AF2-B19A-865F5054C9B9}"/>
+                </a:ext>
+              </a:extLst>
+            </p:cNvPr>
+            <p:cNvGrpSpPr/>
+            <p:nvPr/>
+          </p:nvGrpSpPr>
+          <p:grpSpPr>
+            <a:xfrm>
+              <a:off x="4407625" y="2925102"/>
+              <a:ext cx="1343562" cy="929843"/>
+              <a:chOff x="5886952" y="2179206"/>
+              <a:chExt cx="1374591" cy="951322"/>
+            </a:xfrm>
+          </p:grpSpPr>
+          <p:pic>
+            <p:nvPicPr>
+              <p:cNvPr id="56" name="Graphic 55">
+                <a:extLst>
+                  <a:ext uri="{FF2B5EF4-FFF2-40B4-BE49-F238E27FC236}">
+                    <a16:creationId xmlns:a16="http://schemas.microsoft.com/office/drawing/2014/main" id="{E67FB254-0CB8-46A1-AFCC-4F985D70A4B5}"/>
+                  </a:ext>
+                </a:extLst>
+              </p:cNvPr>
+              <p:cNvPicPr>
+                <a:picLocks noChangeAspect="1"/>
+              </p:cNvPicPr>
+              <p:nvPr/>
+            </p:nvPicPr>
+            <p:blipFill>
+              <a:blip r:embed="rId6">
+                <a:extLst>
+                  <a:ext uri="{96DAC541-7B7A-43D3-8B79-37D633B846F1}">
+                    <asvg:svgBlip xmlns:asvg="http://schemas.microsoft.com/office/drawing/2016/SVG/main" r:embed="rId7"/>
+                  </a:ext>
+                </a:extLst>
+              </a:blip>
+              <a:stretch>
+                <a:fillRect/>
+              </a:stretch>
+            </p:blipFill>
+            <p:spPr>
+              <a:xfrm>
+                <a:off x="6298643" y="2179206"/>
+                <a:ext cx="634117" cy="658823"/>
+              </a:xfrm>
+              <a:prstGeom prst="rect">
+                <a:avLst/>
+              </a:prstGeom>
+            </p:spPr>
+          </p:pic>
+          <p:sp>
+            <p:nvSpPr>
+              <p:cNvPr id="68" name="Rechthoek: afgeronde hoeken 67">
+                <a:extLst>
+                  <a:ext uri="{FF2B5EF4-FFF2-40B4-BE49-F238E27FC236}">
+                    <a16:creationId xmlns:a16="http://schemas.microsoft.com/office/drawing/2014/main" id="{B2715FB0-B54D-4C0A-9EE5-88496E5F18DB}"/>
+                  </a:ext>
+                </a:extLst>
+              </p:cNvPr>
+              <p:cNvSpPr/>
+              <p:nvPr/>
+            </p:nvSpPr>
+            <p:spPr>
+              <a:xfrm>
+                <a:off x="5886952" y="2844436"/>
+                <a:ext cx="1374591" cy="286092"/>
+              </a:xfrm>
+              <a:prstGeom prst="roundRect">
+                <a:avLst/>
+              </a:prstGeom>
+              <a:solidFill>
+                <a:srgbClr val="767171"/>
+              </a:solidFill>
+              <a:ln>
+                <a:noFill/>
+              </a:ln>
+            </p:spPr>
+            <p:style>
+              <a:lnRef idx="2">
+                <a:schemeClr val="accent1">
+                  <a:shade val="50000"/>
+                </a:schemeClr>
+              </a:lnRef>
+              <a:fillRef idx="1">
+                <a:schemeClr val="accent1"/>
+              </a:fillRef>
+              <a:effectRef idx="0">
+                <a:schemeClr val="accent1"/>
+              </a:effectRef>
+              <a:fontRef idx="minor">
+                <a:schemeClr val="lt1"/>
+              </a:fontRef>
+            </p:style>
+            <p:txBody>
+              <a:bodyPr rtlCol="0" anchor="ctr"/>
+              <a:lstStyle/>
+              <a:p>
+                <a:pPr algn="ctr"/>
+                <a:r>
+                  <a:rPr lang="en-US" sz="1600" dirty="0">
+                    <a:latin typeface="Source Sans Pro" panose="020B0503030403020204" pitchFamily="34" charset="0"/>
+                  </a:rPr>
+                  <a:t>production</a:t>
+                </a:r>
+              </a:p>
+            </p:txBody>
+          </p:sp>
+        </p:grpSp>
+        <p:grpSp>
+          <p:nvGrpSpPr>
+            <p:cNvPr id="4" name="Groep 3">
+              <a:extLst>
+                <a:ext uri="{FF2B5EF4-FFF2-40B4-BE49-F238E27FC236}">
+                  <a16:creationId xmlns:a16="http://schemas.microsoft.com/office/drawing/2014/main" id="{98C49389-5EF9-4742-9E45-3914AD3CAA1E}"/>
+                </a:ext>
+              </a:extLst>
+            </p:cNvPr>
+            <p:cNvGrpSpPr/>
+            <p:nvPr/>
+          </p:nvGrpSpPr>
+          <p:grpSpPr>
+            <a:xfrm>
+              <a:off x="4448145" y="4062265"/>
+              <a:ext cx="1343558" cy="798197"/>
+              <a:chOff x="9130516" y="2690844"/>
+              <a:chExt cx="1374587" cy="816635"/>
+            </a:xfrm>
+          </p:grpSpPr>
+          <p:pic>
+            <p:nvPicPr>
+              <p:cNvPr id="57" name="Graphic 56">
+                <a:extLst>
+                  <a:ext uri="{FF2B5EF4-FFF2-40B4-BE49-F238E27FC236}">
+                    <a16:creationId xmlns:a16="http://schemas.microsoft.com/office/drawing/2014/main" id="{AFE5896D-E014-47E9-A8EB-74F209122F5A}"/>
+                  </a:ext>
+                </a:extLst>
+              </p:cNvPr>
+              <p:cNvPicPr>
+                <a:picLocks noChangeAspect="1"/>
+              </p:cNvPicPr>
+              <p:nvPr/>
+            </p:nvPicPr>
+            <p:blipFill>
+              <a:blip r:embed="rId8">
+                <a:extLst>
+                  <a:ext uri="{96DAC541-7B7A-43D3-8B79-37D633B846F1}">
+                    <asvg:svgBlip xmlns:asvg="http://schemas.microsoft.com/office/drawing/2016/SVG/main" r:embed="rId9"/>
+                  </a:ext>
+                </a:extLst>
+              </a:blip>
+              <a:stretch>
+                <a:fillRect/>
+              </a:stretch>
+            </p:blipFill>
+            <p:spPr>
+              <a:xfrm>
+                <a:off x="9443457" y="2690844"/>
+                <a:ext cx="760740" cy="506699"/>
+              </a:xfrm>
+              <a:prstGeom prst="rect">
+                <a:avLst/>
+              </a:prstGeom>
+            </p:spPr>
+          </p:pic>
+          <p:sp>
+            <p:nvSpPr>
+              <p:cNvPr id="69" name="Rechthoek: afgeronde hoeken 68">
+                <a:extLst>
+                  <a:ext uri="{FF2B5EF4-FFF2-40B4-BE49-F238E27FC236}">
+                    <a16:creationId xmlns:a16="http://schemas.microsoft.com/office/drawing/2014/main" id="{226A4F65-A7D8-4C31-8845-8669AC68F824}"/>
+                  </a:ext>
+                </a:extLst>
+              </p:cNvPr>
+              <p:cNvSpPr/>
+              <p:nvPr/>
+            </p:nvSpPr>
+            <p:spPr>
+              <a:xfrm>
+                <a:off x="9130516" y="3221388"/>
+                <a:ext cx="1374587" cy="286091"/>
+              </a:xfrm>
+              <a:prstGeom prst="roundRect">
+                <a:avLst/>
+              </a:prstGeom>
+              <a:solidFill>
+                <a:srgbClr val="767171"/>
+              </a:solidFill>
+              <a:ln>
+                <a:noFill/>
+              </a:ln>
+            </p:spPr>
+            <p:style>
+              <a:lnRef idx="2">
+                <a:schemeClr val="accent1">
+                  <a:shade val="50000"/>
+                </a:schemeClr>
+              </a:lnRef>
+              <a:fillRef idx="1">
+                <a:schemeClr val="accent1"/>
+              </a:fillRef>
+              <a:effectRef idx="0">
+                <a:schemeClr val="accent1"/>
+              </a:effectRef>
+              <a:fontRef idx="minor">
+                <a:schemeClr val="lt1"/>
+              </a:fontRef>
+            </p:style>
+            <p:txBody>
+              <a:bodyPr rtlCol="0" anchor="ctr"/>
+              <a:lstStyle/>
+              <a:p>
+                <a:pPr algn="ctr"/>
+                <a:r>
+                  <a:rPr lang="en-US" sz="1600" dirty="0">
+                    <a:latin typeface="Source Sans Pro" panose="020B0503030403020204" pitchFamily="34" charset="0"/>
+                  </a:rPr>
+                  <a:t>price</a:t>
+                </a:r>
+              </a:p>
+            </p:txBody>
+          </p:sp>
+        </p:grpSp>
+        <p:sp>
+          <p:nvSpPr>
+            <p:cNvPr id="71" name="Rechthoek: afgeronde hoeken 70">
+              <a:extLst>
+                <a:ext uri="{FF2B5EF4-FFF2-40B4-BE49-F238E27FC236}">
+                  <a16:creationId xmlns:a16="http://schemas.microsoft.com/office/drawing/2014/main" id="{6BF2A7C1-27D4-43B4-AB0E-5B1AC3142BBD}"/>
+                </a:ext>
+              </a:extLst>
+            </p:cNvPr>
+            <p:cNvSpPr/>
+            <p:nvPr/>
+          </p:nvSpPr>
+          <p:spPr>
+            <a:xfrm>
+              <a:off x="7925580" y="3872010"/>
+              <a:ext cx="1458379" cy="256473"/>
+            </a:xfrm>
+            <a:prstGeom prst="roundRect">
+              <a:avLst/>
+            </a:prstGeom>
+            <a:solidFill>
+              <a:srgbClr val="767171"/>
+            </a:solidFill>
+            <a:ln>
+              <a:noFill/>
+            </a:ln>
+          </p:spPr>
+          <p:style>
+            <a:lnRef idx="2">
+              <a:schemeClr val="accent1">
+                <a:shade val="50000"/>
+              </a:schemeClr>
+            </a:lnRef>
+            <a:fillRef idx="1">
+              <a:schemeClr val="accent1"/>
+            </a:fillRef>
+            <a:effectRef idx="0">
+              <a:schemeClr val="accent1"/>
+            </a:effectRef>
+            <a:fontRef idx="minor">
+              <a:schemeClr val="lt1"/>
+            </a:fontRef>
+          </p:style>
+          <p:txBody>
+            <a:bodyPr rtlCol="0" anchor="ctr"/>
+            <a:lstStyle/>
+            <a:p>
+              <a:pPr algn="ctr"/>
+              <a:r>
+                <a:rPr lang="en-US" sz="1600" dirty="0">
+                  <a:latin typeface="Source Sans Pro" panose="020B0503030403020204" pitchFamily="34" charset="0"/>
+                </a:rPr>
+                <a:t>fitting formula  </a:t>
+              </a:r>
+            </a:p>
+          </p:txBody>
+        </p:sp>
+        <p:sp>
+          <p:nvSpPr>
+            <p:cNvPr id="6" name="Right Brace 5">
+              <a:extLst>
+                <a:ext uri="{FF2B5EF4-FFF2-40B4-BE49-F238E27FC236}">
+                  <a16:creationId xmlns:a16="http://schemas.microsoft.com/office/drawing/2014/main" id="{B47AC452-C788-4CB5-BE0D-0ED321BDEC0A}"/>
+                </a:ext>
+              </a:extLst>
+            </p:cNvPr>
+            <p:cNvSpPr/>
+            <p:nvPr/>
+          </p:nvSpPr>
+          <p:spPr>
+            <a:xfrm>
+              <a:off x="6093413" y="1886006"/>
+              <a:ext cx="1402080" cy="2834640"/>
+            </a:xfrm>
+            <a:prstGeom prst="rightBrace">
+              <a:avLst>
+                <a:gd name="adj1" fmla="val 43297"/>
+                <a:gd name="adj2" fmla="val 50000"/>
+              </a:avLst>
+            </a:prstGeom>
+            <a:ln w="76200">
+              <a:solidFill>
+                <a:srgbClr val="D9D9D9"/>
+              </a:solidFill>
+            </a:ln>
+          </p:spPr>
+          <p:style>
+            <a:lnRef idx="1">
+              <a:schemeClr val="accent1"/>
+            </a:lnRef>
+            <a:fillRef idx="0">
+              <a:schemeClr val="accent1"/>
+            </a:fillRef>
+            <a:effectRef idx="0">
+              <a:schemeClr val="accent1"/>
+            </a:effectRef>
+            <a:fontRef idx="minor">
+              <a:schemeClr val="tx1"/>
+            </a:fontRef>
+          </p:style>
+          <p:txBody>
+            <a:bodyPr rtlCol="0" anchor="ctr"/>
+            <a:lstStyle/>
+            <a:p>
+              <a:pPr algn="ctr"/>
+              <a:endParaRPr lang="en-US"/>
+            </a:p>
+          </p:txBody>
+        </p:sp>
+        <p:sp>
+          <p:nvSpPr>
+            <p:cNvPr id="7" name="Rectangle 6">
+              <a:extLst>
+                <a:ext uri="{FF2B5EF4-FFF2-40B4-BE49-F238E27FC236}">
+                  <a16:creationId xmlns:a16="http://schemas.microsoft.com/office/drawing/2014/main" id="{37A5B257-8525-4787-88C3-8ACB800CAA06}"/>
+                </a:ext>
+              </a:extLst>
+            </p:cNvPr>
+            <p:cNvSpPr/>
+            <p:nvPr/>
+          </p:nvSpPr>
+          <p:spPr>
+            <a:xfrm>
+              <a:off x="9522708" y="4480444"/>
+              <a:ext cx="394468" cy="326446"/>
+            </a:xfrm>
+            <a:prstGeom prst="rect">
+              <a:avLst/>
+            </a:prstGeom>
+            <a:noFill/>
+            <a:ln>
+              <a:noFill/>
+            </a:ln>
+          </p:spPr>
+          <p:style>
+            <a:lnRef idx="2">
+              <a:schemeClr val="accent1">
+                <a:shade val="50000"/>
+              </a:schemeClr>
+            </a:lnRef>
+            <a:fillRef idx="1">
+              <a:schemeClr val="accent1"/>
+            </a:fillRef>
+            <a:effectRef idx="0">
+              <a:schemeClr val="accent1"/>
+            </a:effectRef>
+            <a:fontRef idx="minor">
+              <a:schemeClr val="lt1"/>
+            </a:fontRef>
+          </p:style>
+          <p:txBody>
+            <a:bodyPr rtlCol="0" anchor="ctr"/>
+            <a:lstStyle/>
+            <a:p>
+              <a:pPr algn="ctr"/>
+              <a:endParaRPr lang="en-US"/>
+            </a:p>
+          </p:txBody>
+        </p:sp>
+        <p:sp>
+          <p:nvSpPr>
+            <p:cNvPr id="21" name="Rectangle 20">
+              <a:extLst>
+                <a:ext uri="{FF2B5EF4-FFF2-40B4-BE49-F238E27FC236}">
+                  <a16:creationId xmlns:a16="http://schemas.microsoft.com/office/drawing/2014/main" id="{5227EE72-404F-4199-AE26-CFBEF2363564}"/>
+                </a:ext>
+              </a:extLst>
+            </p:cNvPr>
+            <p:cNvSpPr/>
+            <p:nvPr/>
+          </p:nvSpPr>
+          <p:spPr>
+            <a:xfrm>
+              <a:off x="3309796" y="1835459"/>
+              <a:ext cx="394468" cy="326446"/>
+            </a:xfrm>
+            <a:prstGeom prst="rect">
+              <a:avLst/>
+            </a:prstGeom>
+            <a:noFill/>
+            <a:ln>
+              <a:noFill/>
+            </a:ln>
+          </p:spPr>
+          <p:style>
+            <a:lnRef idx="2">
+              <a:schemeClr val="accent1">
+                <a:shade val="50000"/>
+              </a:schemeClr>
+            </a:lnRef>
+            <a:fillRef idx="1">
+              <a:schemeClr val="accent1"/>
+            </a:fillRef>
+            <a:effectRef idx="0">
+              <a:schemeClr val="accent1"/>
+            </a:effectRef>
+            <a:fontRef idx="minor">
+              <a:schemeClr val="lt1"/>
+            </a:fontRef>
+          </p:style>
+          <p:txBody>
+            <a:bodyPr rtlCol="0" anchor="ctr"/>
+            <a:lstStyle/>
+            <a:p>
+              <a:pPr algn="ctr"/>
+              <a:endParaRPr lang="en-US"/>
+            </a:p>
+          </p:txBody>
+        </p:sp>
+      </p:grpSp>
+    </p:spTree>
+    <p:extLst>
+      <p:ext uri="{BB962C8B-B14F-4D97-AF65-F5344CB8AC3E}">
+        <p14:creationId xmlns:p14="http://schemas.microsoft.com/office/powerpoint/2010/main" val="2778268346"/>
+      </p:ext>
+    </p:extLst>
+  </p:cSld>
+  <p:clrMapOvr>
+    <a:masterClrMapping/>
+  </p:clrMapOvr>
+</p:sld>
+</file>
+
+<file path=ppt/slides/slide8.xml><?xml version="1.0" encoding="utf-8"?>
+<p:sld xmlns:a="http://schemas.openxmlformats.org/drawingml/2006/main" xmlns:r="http://schemas.openxmlformats.org/officeDocument/2006/relationships" xmlns:p="http://schemas.openxmlformats.org/presentationml/2006/main">
+  <p:cSld>
+    <p:spTree>
+      <p:nvGrpSpPr>
+        <p:cNvPr id="1" name=""/>
+        <p:cNvGrpSpPr/>
+        <p:nvPr/>
+      </p:nvGrpSpPr>
+      <p:grpSpPr>
+        <a:xfrm>
+          <a:off x="0" y="0"/>
+          <a:ext cx="0" cy="0"/>
+          <a:chOff x="0" y="0"/>
+          <a:chExt cx="0" cy="0"/>
+        </a:xfrm>
+      </p:grpSpPr>
+      <p:sp>
+        <p:nvSpPr>
           <p:cNvPr id="4" name="Rectangle 3">
             <a:extLst>
               <a:ext uri="{FF2B5EF4-FFF2-40B4-BE49-F238E27FC236}">
@@ -25602,7 +28952,7 @@
 </p:sld>
 </file>
 
-<file path=ppt/slides/slide8.xml><?xml version="1.0" encoding="utf-8"?>
+<file path=ppt/slides/slide9.xml><?xml version="1.0" encoding="utf-8"?>
 <p:sld xmlns:a="http://schemas.openxmlformats.org/drawingml/2006/main" xmlns:r="http://schemas.openxmlformats.org/officeDocument/2006/relationships" xmlns:p="http://schemas.openxmlformats.org/presentationml/2006/main">
   <p:cSld>
     <p:spTree>
@@ -26600,212 +29950,6 @@
 </p:sld>
 </file>
 
-<file path=ppt/slides/slide9.xml><?xml version="1.0" encoding="utf-8"?>
-<p:sld xmlns:a="http://schemas.openxmlformats.org/drawingml/2006/main" xmlns:r="http://schemas.openxmlformats.org/officeDocument/2006/relationships" xmlns:p="http://schemas.openxmlformats.org/presentationml/2006/main">
-  <p:cSld>
-    <p:spTree>
-      <p:nvGrpSpPr>
-        <p:cNvPr id="1" name=""/>
-        <p:cNvGrpSpPr/>
-        <p:nvPr/>
-      </p:nvGrpSpPr>
-      <p:grpSpPr>
-        <a:xfrm>
-          <a:off x="0" y="0"/>
-          <a:ext cx="0" cy="0"/>
-          <a:chOff x="0" y="0"/>
-          <a:chExt cx="0" cy="0"/>
-        </a:xfrm>
-      </p:grpSpPr>
-      <p:pic>
-        <p:nvPicPr>
-          <p:cNvPr id="4" name="Afbeelding 3">
-            <a:extLst>
-              <a:ext uri="{FF2B5EF4-FFF2-40B4-BE49-F238E27FC236}">
-                <a16:creationId xmlns:a16="http://schemas.microsoft.com/office/drawing/2014/main" id="{5D3A40C2-5DFF-4E25-BE95-C39C40B031BD}"/>
-              </a:ext>
-            </a:extLst>
-          </p:cNvPr>
-          <p:cNvPicPr>
-            <a:picLocks noChangeAspect="1"/>
-          </p:cNvPicPr>
-          <p:nvPr/>
-        </p:nvPicPr>
-        <p:blipFill>
-          <a:blip r:embed="rId2">
-            <a:extLst>
-              <a:ext uri="{28A0092B-C50C-407E-A947-70E740481C1C}">
-                <a14:useLocalDpi xmlns:a14="http://schemas.microsoft.com/office/drawing/2010/main" val="0"/>
-              </a:ext>
-            </a:extLst>
-          </a:blip>
-          <a:stretch>
-            <a:fillRect/>
-          </a:stretch>
-        </p:blipFill>
-        <p:spPr>
-          <a:xfrm>
-            <a:off x="3660986" y="1086120"/>
-            <a:ext cx="4762500" cy="2571750"/>
-          </a:xfrm>
-          <a:prstGeom prst="rect">
-            <a:avLst/>
-          </a:prstGeom>
-        </p:spPr>
-      </p:pic>
-      <p:sp>
-        <p:nvSpPr>
-          <p:cNvPr id="5" name="Tekstballon: rechthoek met afgeronde hoeken 4">
-            <a:extLst>
-              <a:ext uri="{FF2B5EF4-FFF2-40B4-BE49-F238E27FC236}">
-                <a16:creationId xmlns:a16="http://schemas.microsoft.com/office/drawing/2014/main" id="{C3840F02-3BF8-43B5-BCC9-0ECDBD32A843}"/>
-              </a:ext>
-            </a:extLst>
-          </p:cNvPr>
-          <p:cNvSpPr/>
-          <p:nvPr/>
-        </p:nvSpPr>
-        <p:spPr>
-          <a:xfrm>
-            <a:off x="3149823" y="4295475"/>
-            <a:ext cx="2794015" cy="870978"/>
-          </a:xfrm>
-          <a:prstGeom prst="wedgeRoundRectCallout">
-            <a:avLst>
-              <a:gd name="adj1" fmla="val -27257"/>
-              <a:gd name="adj2" fmla="val 3548"/>
-              <a:gd name="adj3" fmla="val 16667"/>
-            </a:avLst>
-          </a:prstGeom>
-          <a:solidFill>
-            <a:schemeClr val="bg1">
-              <a:lumMod val="85000"/>
-            </a:schemeClr>
-          </a:solidFill>
-          <a:ln>
-            <a:noFill/>
-          </a:ln>
-        </p:spPr>
-        <p:style>
-          <a:lnRef idx="0">
-            <a:scrgbClr r="0" g="0" b="0"/>
-          </a:lnRef>
-          <a:fillRef idx="0">
-            <a:scrgbClr r="0" g="0" b="0"/>
-          </a:fillRef>
-          <a:effectRef idx="0">
-            <a:scrgbClr r="0" g="0" b="0"/>
-          </a:effectRef>
-          <a:fontRef idx="minor">
-            <a:schemeClr val="dk1"/>
-          </a:fontRef>
-        </p:style>
-        <p:txBody>
-          <a:bodyPr rtlCol="0" anchor="ctr"/>
-          <a:lstStyle/>
-          <a:p>
-            <a:pPr algn="ctr"/>
-            <a:r>
-              <a:rPr lang="en-US" dirty="0">
-                <a:latin typeface="Myriad Pro" panose="020B0503030403020204" pitchFamily="34" charset="0"/>
-              </a:rPr>
-              <a:t>OOP</a:t>
-            </a:r>
-          </a:p>
-          <a:p>
-            <a:pPr algn="ctr"/>
-            <a:r>
-              <a:rPr lang="en-US" dirty="0">
-                <a:latin typeface="Myriad Pro" panose="020B0503030403020204" pitchFamily="34" charset="0"/>
-              </a:rPr>
-              <a:t>Inheritance and encapsulation</a:t>
-            </a:r>
-          </a:p>
-        </p:txBody>
-      </p:sp>
-      <p:sp>
-        <p:nvSpPr>
-          <p:cNvPr id="6" name="Tekstballon: rechthoek met afgeronde hoeken 5">
-            <a:extLst>
-              <a:ext uri="{FF2B5EF4-FFF2-40B4-BE49-F238E27FC236}">
-                <a16:creationId xmlns:a16="http://schemas.microsoft.com/office/drawing/2014/main" id="{7649A52F-2D75-4561-8468-91F047F49D60}"/>
-              </a:ext>
-            </a:extLst>
-          </p:cNvPr>
-          <p:cNvSpPr/>
-          <p:nvPr/>
-        </p:nvSpPr>
-        <p:spPr>
-          <a:xfrm>
-            <a:off x="6118090" y="4295475"/>
-            <a:ext cx="2794015" cy="870978"/>
-          </a:xfrm>
-          <a:prstGeom prst="wedgeRoundRectCallout">
-            <a:avLst>
-              <a:gd name="adj1" fmla="val -27257"/>
-              <a:gd name="adj2" fmla="val 3548"/>
-              <a:gd name="adj3" fmla="val 16667"/>
-            </a:avLst>
-          </a:prstGeom>
-          <a:solidFill>
-            <a:schemeClr val="bg1">
-              <a:lumMod val="85000"/>
-            </a:schemeClr>
-          </a:solidFill>
-          <a:ln>
-            <a:noFill/>
-          </a:ln>
-        </p:spPr>
-        <p:style>
-          <a:lnRef idx="0">
-            <a:scrgbClr r="0" g="0" b="0"/>
-          </a:lnRef>
-          <a:fillRef idx="0">
-            <a:scrgbClr r="0" g="0" b="0"/>
-          </a:fillRef>
-          <a:effectRef idx="0">
-            <a:scrgbClr r="0" g="0" b="0"/>
-          </a:effectRef>
-          <a:fontRef idx="minor">
-            <a:schemeClr val="dk1"/>
-          </a:fontRef>
-        </p:style>
-        <p:txBody>
-          <a:bodyPr rtlCol="0" anchor="ctr"/>
-          <a:lstStyle/>
-          <a:p>
-            <a:pPr algn="ctr"/>
-            <a:r>
-              <a:rPr lang="en-US" dirty="0">
-                <a:latin typeface="Myriad Pro" panose="020B0503030403020204" pitchFamily="34" charset="0"/>
-              </a:rPr>
-              <a:t>FP</a:t>
-            </a:r>
-          </a:p>
-          <a:p>
-            <a:pPr algn="ctr"/>
-            <a:r>
-              <a:rPr lang="en-US" dirty="0">
-                <a:latin typeface="Myriad Pro" panose="020B0503030403020204" pitchFamily="34" charset="0"/>
-              </a:rPr>
-              <a:t>Separation of data and functions and high level of abstraction</a:t>
-            </a:r>
-          </a:p>
-        </p:txBody>
-      </p:sp>
-    </p:spTree>
-    <p:extLst>
-      <p:ext uri="{BB962C8B-B14F-4D97-AF65-F5344CB8AC3E}">
-        <p14:creationId xmlns:p14="http://schemas.microsoft.com/office/powerpoint/2010/main" val="953885131"/>
-      </p:ext>
-    </p:extLst>
-  </p:cSld>
-  <p:clrMapOvr>
-    <a:masterClrMapping/>
-  </p:clrMapOvr>
-</p:sld>
-</file>
-
 <file path=ppt/theme/theme1.xml><?xml version="1.0" encoding="utf-8"?>
 <a:theme xmlns:a="http://schemas.openxmlformats.org/drawingml/2006/main" name="Kantoorthema">
   <a:themeElements>

</xml_diff>

<commit_message>
updated images, div for MRE
</commit_message>
<xml_diff>
--- a/support/support_eflows.pptx
+++ b/support/support_eflows.pptx
@@ -172,7 +172,7 @@
 <file path=ppt/revisionInfo.xml><?xml version="1.0" encoding="utf-8"?>
 <p1510:revInfo xmlns:a="http://schemas.openxmlformats.org/drawingml/2006/main" xmlns:r="http://schemas.openxmlformats.org/officeDocument/2006/relationships" xmlns:p1510="http://schemas.microsoft.com/office/powerpoint/2015/10/main">
   <p1510:revLst>
-    <p1510:client id="{BEA97D3E-2050-4A75-A34E-E58E22EBA529}" v="24" dt="2018-12-22T12:50:19.071"/>
+    <p1510:client id="{BEA97D3E-2050-4A75-A34E-E58E22EBA529}" v="68" dt="2018-12-22T20:52:20.602"/>
   </p1510:revLst>
 </p1510:revInfo>
 </file>
@@ -182,38 +182,147 @@
   <pc:docChgLst>
     <pc:chgData name="Carlos Varela Martín" userId="f36e150ee4317515" providerId="LiveId" clId="{BEA97D3E-2050-4A75-A34E-E58E22EBA529}"/>
     <pc:docChg chg="undo custSel addSld modSld sldOrd">
-      <pc:chgData name="Carlos Varela Martín" userId="f36e150ee4317515" providerId="LiveId" clId="{BEA97D3E-2050-4A75-A34E-E58E22EBA529}" dt="2018-12-22T12:50:24.230" v="364" actId="478"/>
+      <pc:chgData name="Carlos Varela Martín" userId="f36e150ee4317515" providerId="LiveId" clId="{BEA97D3E-2050-4A75-A34E-E58E22EBA529}" dt="2018-12-22T20:52:46.629" v="616" actId="14100"/>
       <pc:docMkLst>
         <pc:docMk/>
       </pc:docMkLst>
+      <pc:sldChg chg="addSp modSp">
+        <pc:chgData name="Carlos Varela Martín" userId="f36e150ee4317515" providerId="LiveId" clId="{BEA97D3E-2050-4A75-A34E-E58E22EBA529}" dt="2018-12-22T20:48:52.850" v="601" actId="1076"/>
+        <pc:sldMkLst>
+          <pc:docMk/>
+          <pc:sldMk cId="150758435" sldId="265"/>
+        </pc:sldMkLst>
+        <pc:spChg chg="add mod">
+          <ac:chgData name="Carlos Varela Martín" userId="f36e150ee4317515" providerId="LiveId" clId="{BEA97D3E-2050-4A75-A34E-E58E22EBA529}" dt="2018-12-22T20:48:52.850" v="601" actId="1076"/>
+          <ac:spMkLst>
+            <pc:docMk/>
+            <pc:sldMk cId="150758435" sldId="265"/>
+            <ac:spMk id="26" creationId="{7397454B-55D3-4206-A671-F393D6009B90}"/>
+          </ac:spMkLst>
+        </pc:spChg>
+      </pc:sldChg>
+      <pc:sldChg chg="addSp modSp">
+        <pc:chgData name="Carlos Varela Martín" userId="f36e150ee4317515" providerId="LiveId" clId="{BEA97D3E-2050-4A75-A34E-E58E22EBA529}" dt="2018-12-22T20:48:19.507" v="596" actId="14100"/>
+        <pc:sldMkLst>
+          <pc:docMk/>
+          <pc:sldMk cId="1773702408" sldId="266"/>
+        </pc:sldMkLst>
+        <pc:spChg chg="add mod">
+          <ac:chgData name="Carlos Varela Martín" userId="f36e150ee4317515" providerId="LiveId" clId="{BEA97D3E-2050-4A75-A34E-E58E22EBA529}" dt="2018-12-22T20:48:19.507" v="596" actId="14100"/>
+          <ac:spMkLst>
+            <pc:docMk/>
+            <pc:sldMk cId="1773702408" sldId="266"/>
+            <ac:spMk id="23" creationId="{D309E4AE-6A05-47BE-B276-80A1915DE8B1}"/>
+          </ac:spMkLst>
+        </pc:spChg>
+      </pc:sldChg>
+      <pc:sldChg chg="addSp delSp modSp">
+        <pc:chgData name="Carlos Varela Martín" userId="f36e150ee4317515" providerId="LiveId" clId="{BEA97D3E-2050-4A75-A34E-E58E22EBA529}" dt="2018-12-22T20:39:26.914" v="370" actId="1076"/>
+        <pc:sldMkLst>
+          <pc:docMk/>
+          <pc:sldMk cId="1377119444" sldId="271"/>
+        </pc:sldMkLst>
+        <pc:spChg chg="mod">
+          <ac:chgData name="Carlos Varela Martín" userId="f36e150ee4317515" providerId="LiveId" clId="{BEA97D3E-2050-4A75-A34E-E58E22EBA529}" dt="2018-12-22T20:39:26.914" v="370" actId="1076"/>
+          <ac:spMkLst>
+            <pc:docMk/>
+            <pc:sldMk cId="1377119444" sldId="271"/>
+            <ac:spMk id="14" creationId="{62581B74-83DE-4A50-82F4-E5F5E067DCF1}"/>
+          </ac:spMkLst>
+        </pc:spChg>
+        <pc:picChg chg="add del mod">
+          <ac:chgData name="Carlos Varela Martín" userId="f36e150ee4317515" providerId="LiveId" clId="{BEA97D3E-2050-4A75-A34E-E58E22EBA529}" dt="2018-12-22T20:39:24.773" v="369" actId="27803"/>
+          <ac:picMkLst>
+            <pc:docMk/>
+            <pc:sldMk cId="1377119444" sldId="271"/>
+            <ac:picMk id="13" creationId="{62581B74-83DE-4A50-82F4-E5F5E067DCF1}"/>
+          </ac:picMkLst>
+        </pc:picChg>
+      </pc:sldChg>
       <pc:sldChg chg="addSp delSp modSp add">
-        <pc:chgData name="Carlos Varela Martín" userId="f36e150ee4317515" providerId="LiveId" clId="{BEA97D3E-2050-4A75-A34E-E58E22EBA529}" dt="2018-12-22T12:38:17.728" v="232" actId="1036"/>
+        <pc:chgData name="Carlos Varela Martín" userId="f36e150ee4317515" providerId="LiveId" clId="{BEA97D3E-2050-4A75-A34E-E58E22EBA529}" dt="2018-12-22T20:52:46.629" v="616" actId="14100"/>
         <pc:sldMkLst>
           <pc:docMk/>
           <pc:sldMk cId="2778268346" sldId="275"/>
         </pc:sldMkLst>
-        <pc:spChg chg="add mod">
-          <ac:chgData name="Carlos Varela Martín" userId="f36e150ee4317515" providerId="LiveId" clId="{BEA97D3E-2050-4A75-A34E-E58E22EBA529}" dt="2018-12-22T12:38:05.750" v="212" actId="164"/>
+        <pc:spChg chg="add del mod topLvl">
+          <ac:chgData name="Carlos Varela Martín" userId="f36e150ee4317515" providerId="LiveId" clId="{BEA97D3E-2050-4A75-A34E-E58E22EBA529}" dt="2018-12-22T20:42:55.679" v="435" actId="478"/>
           <ac:spMkLst>
             <pc:docMk/>
             <pc:sldMk cId="2778268346" sldId="275"/>
             <ac:spMk id="6" creationId="{B47AC452-C788-4CB5-BE0D-0ED321BDEC0A}"/>
           </ac:spMkLst>
         </pc:spChg>
-        <pc:spChg chg="add mod">
-          <ac:chgData name="Carlos Varela Martín" userId="f36e150ee4317515" providerId="LiveId" clId="{BEA97D3E-2050-4A75-A34E-E58E22EBA529}" dt="2018-12-22T12:38:05.750" v="212" actId="164"/>
+        <pc:spChg chg="add mod topLvl">
+          <ac:chgData name="Carlos Varela Martín" userId="f36e150ee4317515" providerId="LiveId" clId="{BEA97D3E-2050-4A75-A34E-E58E22EBA529}" dt="2018-12-22T20:40:00.201" v="381" actId="165"/>
           <ac:spMkLst>
             <pc:docMk/>
             <pc:sldMk cId="2778268346" sldId="275"/>
             <ac:spMk id="7" creationId="{37A5B257-8525-4787-88C3-8ACB800CAA06}"/>
           </ac:spMkLst>
         </pc:spChg>
-        <pc:spChg chg="add mod">
-          <ac:chgData name="Carlos Varela Martín" userId="f36e150ee4317515" providerId="LiveId" clId="{BEA97D3E-2050-4A75-A34E-E58E22EBA529}" dt="2018-12-22T12:38:17.728" v="232" actId="1036"/>
+        <pc:spChg chg="add mod ord">
+          <ac:chgData name="Carlos Varela Martín" userId="f36e150ee4317515" providerId="LiveId" clId="{BEA97D3E-2050-4A75-A34E-E58E22EBA529}" dt="2018-12-22T20:47:16.286" v="592" actId="164"/>
+          <ac:spMkLst>
+            <pc:docMk/>
+            <pc:sldMk cId="2778268346" sldId="275"/>
+            <ac:spMk id="9" creationId="{986330F6-ACF6-458B-B07A-9A048E68BEE6}"/>
+          </ac:spMkLst>
+        </pc:spChg>
+        <pc:spChg chg="add mod topLvl">
+          <ac:chgData name="Carlos Varela Martín" userId="f36e150ee4317515" providerId="LiveId" clId="{BEA97D3E-2050-4A75-A34E-E58E22EBA529}" dt="2018-12-22T20:47:16.286" v="592" actId="164"/>
           <ac:spMkLst>
             <pc:docMk/>
             <pc:sldMk cId="2778268346" sldId="275"/>
             <ac:spMk id="21" creationId="{5227EE72-404F-4199-AE26-CFBEF2363564}"/>
+          </ac:spMkLst>
+        </pc:spChg>
+        <pc:spChg chg="add del mod">
+          <ac:chgData name="Carlos Varela Martín" userId="f36e150ee4317515" providerId="LiveId" clId="{BEA97D3E-2050-4A75-A34E-E58E22EBA529}" dt="2018-12-22T20:40:22.496" v="393"/>
+          <ac:spMkLst>
+            <pc:docMk/>
+            <pc:sldMk cId="2778268346" sldId="275"/>
+            <ac:spMk id="22" creationId="{B5462B17-FFE7-4C78-86AD-255683E9CEB3}"/>
+          </ac:spMkLst>
+        </pc:spChg>
+        <pc:spChg chg="mod topLvl">
+          <ac:chgData name="Carlos Varela Martín" userId="f36e150ee4317515" providerId="LiveId" clId="{BEA97D3E-2050-4A75-A34E-E58E22EBA529}" dt="2018-12-22T20:41:26.799" v="421" actId="164"/>
+          <ac:spMkLst>
+            <pc:docMk/>
+            <pc:sldMk cId="2778268346" sldId="275"/>
+            <ac:spMk id="25" creationId="{743B369B-94F4-4F9A-AE60-0E8356697AC3}"/>
+          </ac:spMkLst>
+        </pc:spChg>
+        <pc:spChg chg="add mod">
+          <ac:chgData name="Carlos Varela Martín" userId="f36e150ee4317515" providerId="LiveId" clId="{BEA97D3E-2050-4A75-A34E-E58E22EBA529}" dt="2018-12-22T20:41:26.799" v="421" actId="164"/>
+          <ac:spMkLst>
+            <pc:docMk/>
+            <pc:sldMk cId="2778268346" sldId="275"/>
+            <ac:spMk id="26" creationId="{8E422108-8249-41BC-A6E0-2454016E2798}"/>
+          </ac:spMkLst>
+        </pc:spChg>
+        <pc:spChg chg="add mod">
+          <ac:chgData name="Carlos Varela Martín" userId="f36e150ee4317515" providerId="LiveId" clId="{BEA97D3E-2050-4A75-A34E-E58E22EBA529}" dt="2018-12-22T20:52:46.629" v="616" actId="14100"/>
+          <ac:spMkLst>
+            <pc:docMk/>
+            <pc:sldMk cId="2778268346" sldId="275"/>
+            <ac:spMk id="30" creationId="{59C6C887-9A73-407A-8441-154A6078AFC2}"/>
+          </ac:spMkLst>
+        </pc:spChg>
+        <pc:spChg chg="add mod">
+          <ac:chgData name="Carlos Varela Martín" userId="f36e150ee4317515" providerId="LiveId" clId="{BEA97D3E-2050-4A75-A34E-E58E22EBA529}" dt="2018-12-22T20:52:46.629" v="616" actId="14100"/>
+          <ac:spMkLst>
+            <pc:docMk/>
+            <pc:sldMk cId="2778268346" sldId="275"/>
+            <ac:spMk id="31" creationId="{4BA3F957-99A9-4470-A93A-8A7BEBC48490}"/>
+          </ac:spMkLst>
+        </pc:spChg>
+        <pc:spChg chg="add mod">
+          <ac:chgData name="Carlos Varela Martín" userId="f36e150ee4317515" providerId="LiveId" clId="{BEA97D3E-2050-4A75-A34E-E58E22EBA529}" dt="2018-12-22T20:52:46.629" v="616" actId="14100"/>
+          <ac:spMkLst>
+            <pc:docMk/>
+            <pc:sldMk cId="2778268346" sldId="275"/>
+            <ac:spMk id="32" creationId="{51120FE5-C2B6-400E-8DD9-5F0A119E0EBD}"/>
           </ac:spMkLst>
         </pc:spChg>
         <pc:spChg chg="del mod topLvl">
@@ -224,8 +333,8 @@
             <ac:spMk id="60" creationId="{61E54199-3884-4C03-81CB-FE59C33C12B9}"/>
           </ac:spMkLst>
         </pc:spChg>
-        <pc:spChg chg="mod topLvl">
-          <ac:chgData name="Carlos Varela Martín" userId="f36e150ee4317515" providerId="LiveId" clId="{BEA97D3E-2050-4A75-A34E-E58E22EBA529}" dt="2018-12-22T12:34:10.061" v="62" actId="1076"/>
+        <pc:spChg chg="del mod topLvl">
+          <ac:chgData name="Carlos Varela Martín" userId="f36e150ee4317515" providerId="LiveId" clId="{BEA97D3E-2050-4A75-A34E-E58E22EBA529}" dt="2018-12-22T20:39:43.017" v="374" actId="478"/>
           <ac:spMkLst>
             <pc:docMk/>
             <pc:sldMk cId="2778268346" sldId="275"/>
@@ -233,7 +342,7 @@
           </ac:spMkLst>
         </pc:spChg>
         <pc:spChg chg="mod">
-          <ac:chgData name="Carlos Varela Martín" userId="f36e150ee4317515" providerId="LiveId" clId="{BEA97D3E-2050-4A75-A34E-E58E22EBA529}" dt="2018-12-22T12:33:15.927" v="45" actId="1035"/>
+          <ac:chgData name="Carlos Varela Martín" userId="f36e150ee4317515" providerId="LiveId" clId="{BEA97D3E-2050-4A75-A34E-E58E22EBA529}" dt="2018-12-22T20:39:45.754" v="380" actId="20577"/>
           <ac:spMkLst>
             <pc:docMk/>
             <pc:sldMk cId="2778268346" sldId="275"/>
@@ -249,15 +358,15 @@
           </ac:spMkLst>
         </pc:spChg>
         <pc:spChg chg="mod">
-          <ac:chgData name="Carlos Varela Martín" userId="f36e150ee4317515" providerId="LiveId" clId="{BEA97D3E-2050-4A75-A34E-E58E22EBA529}" dt="2018-12-22T12:33:32.539" v="49" actId="14100"/>
+          <ac:chgData name="Carlos Varela Martín" userId="f36e150ee4317515" providerId="LiveId" clId="{BEA97D3E-2050-4A75-A34E-E58E22EBA529}" dt="2018-12-22T20:40:10.239" v="384" actId="14100"/>
           <ac:spMkLst>
             <pc:docMk/>
             <pc:sldMk cId="2778268346" sldId="275"/>
             <ac:spMk id="69" creationId="{226A4F65-A7D8-4C31-8845-8669AC68F824}"/>
           </ac:spMkLst>
         </pc:spChg>
-        <pc:spChg chg="mod topLvl">
-          <ac:chgData name="Carlos Varela Martín" userId="f36e150ee4317515" providerId="LiveId" clId="{BEA97D3E-2050-4A75-A34E-E58E22EBA529}" dt="2018-12-22T12:36:33.835" v="150" actId="1076"/>
+        <pc:spChg chg="del mod topLvl">
+          <ac:chgData name="Carlos Varela Martín" userId="f36e150ee4317515" providerId="LiveId" clId="{BEA97D3E-2050-4A75-A34E-E58E22EBA529}" dt="2018-12-22T20:39:42.285" v="373" actId="478"/>
           <ac:spMkLst>
             <pc:docMk/>
             <pc:sldMk cId="2778268346" sldId="275"/>
@@ -265,7 +374,7 @@
           </ac:spMkLst>
         </pc:spChg>
         <pc:spChg chg="mod topLvl">
-          <ac:chgData name="Carlos Varela Martín" userId="f36e150ee4317515" providerId="LiveId" clId="{BEA97D3E-2050-4A75-A34E-E58E22EBA529}" dt="2018-12-22T12:38:05.750" v="212" actId="164"/>
+          <ac:chgData name="Carlos Varela Martín" userId="f36e150ee4317515" providerId="LiveId" clId="{BEA97D3E-2050-4A75-A34E-E58E22EBA529}" dt="2018-12-22T20:44:28.052" v="542" actId="164"/>
           <ac:spMkLst>
             <pc:docMk/>
             <pc:sldMk cId="2778268346" sldId="275"/>
@@ -273,7 +382,7 @@
           </ac:spMkLst>
         </pc:spChg>
         <pc:grpChg chg="mod topLvl">
-          <ac:chgData name="Carlos Varela Martín" userId="f36e150ee4317515" providerId="LiveId" clId="{BEA97D3E-2050-4A75-A34E-E58E22EBA529}" dt="2018-12-22T12:38:05.750" v="212" actId="164"/>
+          <ac:chgData name="Carlos Varela Martín" userId="f36e150ee4317515" providerId="LiveId" clId="{BEA97D3E-2050-4A75-A34E-E58E22EBA529}" dt="2018-12-22T20:47:16.286" v="592" actId="164"/>
           <ac:grpSpMkLst>
             <pc:docMk/>
             <pc:sldMk cId="2778268346" sldId="275"/>
@@ -281,7 +390,7 @@
           </ac:grpSpMkLst>
         </pc:grpChg>
         <pc:grpChg chg="mod topLvl">
-          <ac:chgData name="Carlos Varela Martín" userId="f36e150ee4317515" providerId="LiveId" clId="{BEA97D3E-2050-4A75-A34E-E58E22EBA529}" dt="2018-12-22T12:38:05.750" v="212" actId="164"/>
+          <ac:chgData name="Carlos Varela Martín" userId="f36e150ee4317515" providerId="LiveId" clId="{BEA97D3E-2050-4A75-A34E-E58E22EBA529}" dt="2018-12-22T20:47:16.286" v="592" actId="164"/>
           <ac:grpSpMkLst>
             <pc:docMk/>
             <pc:sldMk cId="2778268346" sldId="275"/>
@@ -289,11 +398,19 @@
           </ac:grpSpMkLst>
         </pc:grpChg>
         <pc:grpChg chg="mod topLvl">
-          <ac:chgData name="Carlos Varela Martín" userId="f36e150ee4317515" providerId="LiveId" clId="{BEA97D3E-2050-4A75-A34E-E58E22EBA529}" dt="2018-12-22T12:38:05.750" v="212" actId="164"/>
+          <ac:chgData name="Carlos Varela Martín" userId="f36e150ee4317515" providerId="LiveId" clId="{BEA97D3E-2050-4A75-A34E-E58E22EBA529}" dt="2018-12-22T20:47:16.286" v="592" actId="164"/>
           <ac:grpSpMkLst>
             <pc:docMk/>
             <pc:sldMk cId="2778268346" sldId="275"/>
             <ac:grpSpMk id="4" creationId="{98C49389-5EF9-4742-9E45-3914AD3CAA1E}"/>
+          </ac:grpSpMkLst>
+        </pc:grpChg>
+        <pc:grpChg chg="add mod">
+          <ac:chgData name="Carlos Varela Martín" userId="f36e150ee4317515" providerId="LiveId" clId="{BEA97D3E-2050-4A75-A34E-E58E22EBA529}" dt="2018-12-22T20:47:16.286" v="592" actId="164"/>
+          <ac:grpSpMkLst>
+            <pc:docMk/>
+            <pc:sldMk cId="2778268346" sldId="275"/>
+            <ac:grpSpMk id="5" creationId="{BC4FFBF1-3E2D-4C6C-B57A-E367272FB67C}"/>
           </ac:grpSpMkLst>
         </pc:grpChg>
         <pc:grpChg chg="del">
@@ -304,16 +421,48 @@
             <ac:grpSpMk id="5" creationId="{C359F4B9-6DA2-418F-A46F-1785291A4610}"/>
           </ac:grpSpMkLst>
         </pc:grpChg>
-        <pc:grpChg chg="add mod">
-          <ac:chgData name="Carlos Varela Martín" userId="f36e150ee4317515" providerId="LiveId" clId="{BEA97D3E-2050-4A75-A34E-E58E22EBA529}" dt="2018-12-22T12:38:05.750" v="212" actId="164"/>
+        <pc:grpChg chg="add del mod">
+          <ac:chgData name="Carlos Varela Martín" userId="f36e150ee4317515" providerId="LiveId" clId="{BEA97D3E-2050-4A75-A34E-E58E22EBA529}" dt="2018-12-22T20:40:00.201" v="381" actId="165"/>
           <ac:grpSpMkLst>
             <pc:docMk/>
             <pc:sldMk cId="2778268346" sldId="275"/>
             <ac:grpSpMk id="8" creationId="{D5ED4C82-3D57-411C-AE57-644077A3E7A0}"/>
           </ac:grpSpMkLst>
         </pc:grpChg>
+        <pc:grpChg chg="add mod">
+          <ac:chgData name="Carlos Varela Martín" userId="f36e150ee4317515" providerId="LiveId" clId="{BEA97D3E-2050-4A75-A34E-E58E22EBA529}" dt="2018-12-22T20:47:16.286" v="592" actId="164"/>
+          <ac:grpSpMkLst>
+            <pc:docMk/>
+            <pc:sldMk cId="2778268346" sldId="275"/>
+            <ac:grpSpMk id="10" creationId="{EF158C6C-E124-4983-9172-2FE6D47E4908}"/>
+          </ac:grpSpMkLst>
+        </pc:grpChg>
+        <pc:grpChg chg="add mod">
+          <ac:chgData name="Carlos Varela Martín" userId="f36e150ee4317515" providerId="LiveId" clId="{BEA97D3E-2050-4A75-A34E-E58E22EBA529}" dt="2018-12-22T20:47:16.286" v="592" actId="164"/>
+          <ac:grpSpMkLst>
+            <pc:docMk/>
+            <pc:sldMk cId="2778268346" sldId="275"/>
+            <ac:grpSpMk id="11" creationId="{36D9230A-F429-41D3-9B9D-70831C5B893B}"/>
+          </ac:grpSpMkLst>
+        </pc:grpChg>
+        <pc:grpChg chg="add del mod">
+          <ac:chgData name="Carlos Varela Martín" userId="f36e150ee4317515" providerId="LiveId" clId="{BEA97D3E-2050-4A75-A34E-E58E22EBA529}" dt="2018-12-22T20:40:30.687" v="395" actId="165"/>
+          <ac:grpSpMkLst>
+            <pc:docMk/>
+            <pc:sldMk cId="2778268346" sldId="275"/>
+            <ac:grpSpMk id="23" creationId="{4584B538-1CB6-4CF6-9CCF-D6553F9BF4C8}"/>
+          </ac:grpSpMkLst>
+        </pc:grpChg>
+        <pc:picChg chg="del mod topLvl">
+          <ac:chgData name="Carlos Varela Martín" userId="f36e150ee4317515" providerId="LiveId" clId="{BEA97D3E-2050-4A75-A34E-E58E22EBA529}" dt="2018-12-22T20:40:32.720" v="396" actId="478"/>
+          <ac:picMkLst>
+            <pc:docMk/>
+            <pc:sldMk cId="2778268346" sldId="275"/>
+            <ac:picMk id="24" creationId="{3A8CCA7C-F66F-47B4-8789-F8942653582E}"/>
+          </ac:picMkLst>
+        </pc:picChg>
         <pc:picChg chg="mod topLvl">
-          <ac:chgData name="Carlos Varela Martín" userId="f36e150ee4317515" providerId="LiveId" clId="{BEA97D3E-2050-4A75-A34E-E58E22EBA529}" dt="2018-12-22T12:38:05.750" v="212" actId="164"/>
+          <ac:chgData name="Carlos Varela Martín" userId="f36e150ee4317515" providerId="LiveId" clId="{BEA97D3E-2050-4A75-A34E-E58E22EBA529}" dt="2018-12-22T20:44:28.052" v="542" actId="164"/>
           <ac:picMkLst>
             <pc:docMk/>
             <pc:sldMk cId="2778268346" sldId="275"/>
@@ -329,7 +478,7 @@
           </ac:picMkLst>
         </pc:picChg>
         <pc:picChg chg="mod">
-          <ac:chgData name="Carlos Varela Martín" userId="f36e150ee4317515" providerId="LiveId" clId="{BEA97D3E-2050-4A75-A34E-E58E22EBA529}" dt="2018-12-22T12:35:16.342" v="130" actId="1035"/>
+          <ac:chgData name="Carlos Varela Martín" userId="f36e150ee4317515" providerId="LiveId" clId="{BEA97D3E-2050-4A75-A34E-E58E22EBA529}" dt="2018-12-22T20:43:29.193" v="460" actId="1035"/>
           <ac:picMkLst>
             <pc:docMk/>
             <pc:sldMk cId="2778268346" sldId="275"/>
@@ -346,7 +495,7 @@
         </pc:picChg>
       </pc:sldChg>
       <pc:sldChg chg="addSp delSp modSp add ord">
-        <pc:chgData name="Carlos Varela Martín" userId="f36e150ee4317515" providerId="LiveId" clId="{BEA97D3E-2050-4A75-A34E-E58E22EBA529}" dt="2018-12-22T12:50:24.230" v="364" actId="478"/>
+        <pc:chgData name="Carlos Varela Martín" userId="f36e150ee4317515" providerId="LiveId" clId="{BEA97D3E-2050-4A75-A34E-E58E22EBA529}" dt="2018-12-22T20:49:35.375" v="605" actId="14100"/>
         <pc:sldMkLst>
           <pc:docMk/>
           <pc:sldMk cId="4217298631" sldId="276"/>
@@ -368,7 +517,7 @@
           </ac:spMkLst>
         </pc:spChg>
         <pc:spChg chg="mod">
-          <ac:chgData name="Carlos Varela Martín" userId="f36e150ee4317515" providerId="LiveId" clId="{BEA97D3E-2050-4A75-A34E-E58E22EBA529}" dt="2018-12-22T12:45:48.973" v="305" actId="14100"/>
+          <ac:chgData name="Carlos Varela Martín" userId="f36e150ee4317515" providerId="LiveId" clId="{BEA97D3E-2050-4A75-A34E-E58E22EBA529}" dt="2018-12-22T20:49:35.375" v="605" actId="14100"/>
           <ac:spMkLst>
             <pc:docMk/>
             <pc:sldMk cId="4217298631" sldId="276"/>
@@ -389,6 +538,14 @@
             <pc:docMk/>
             <pc:sldMk cId="4217298631" sldId="276"/>
             <ac:spMk id="46" creationId="{95B105D7-FE4D-41F1-B0F7-12FD2A8E64F6}"/>
+          </ac:spMkLst>
+        </pc:spChg>
+        <pc:spChg chg="add mod">
+          <ac:chgData name="Carlos Varela Martín" userId="f36e150ee4317515" providerId="LiveId" clId="{BEA97D3E-2050-4A75-A34E-E58E22EBA529}" dt="2018-12-22T20:49:01.051" v="602" actId="1076"/>
+          <ac:spMkLst>
+            <pc:docMk/>
+            <pc:sldMk cId="4217298631" sldId="276"/>
+            <ac:spMk id="46" creationId="{9A6870E1-F3D7-4E74-AF71-7B8D829B7DE5}"/>
           </ac:spMkLst>
         </pc:spChg>
         <pc:spChg chg="mod topLvl">
@@ -431,8 +588,8 @@
             <ac:spMk id="52" creationId="{32789738-BCEC-45CE-A629-2D2640616A94}"/>
           </ac:spMkLst>
         </pc:spChg>
-        <pc:spChg chg="add mod topLvl">
-          <ac:chgData name="Carlos Varela Martín" userId="f36e150ee4317515" providerId="LiveId" clId="{BEA97D3E-2050-4A75-A34E-E58E22EBA529}" dt="2018-12-22T12:50:10.379" v="361" actId="165"/>
+        <pc:spChg chg="add del mod topLvl">
+          <ac:chgData name="Carlos Varela Martín" userId="f36e150ee4317515" providerId="LiveId" clId="{BEA97D3E-2050-4A75-A34E-E58E22EBA529}" dt="2018-12-22T20:49:19.947" v="603" actId="478"/>
           <ac:spMkLst>
             <pc:docMk/>
             <pc:sldMk cId="4217298631" sldId="276"/>
@@ -8478,10 +8635,10 @@
         </p:nvGrpSpPr>
         <p:grpSpPr>
           <a:xfrm>
-            <a:off x="1129226" y="1527880"/>
-            <a:ext cx="9183174" cy="5218761"/>
-            <a:chOff x="1129226" y="845708"/>
-            <a:chExt cx="9183174" cy="5218761"/>
+            <a:off x="709759" y="1527880"/>
+            <a:ext cx="9602641" cy="5218761"/>
+            <a:chOff x="709759" y="845708"/>
+            <a:chExt cx="9602641" cy="5218761"/>
           </a:xfrm>
         </p:grpSpPr>
         <p:grpSp>
@@ -8498,10 +8655,10 @@
           </p:nvGrpSpPr>
           <p:grpSpPr>
             <a:xfrm>
-              <a:off x="1129226" y="1306525"/>
-              <a:ext cx="7129586" cy="4757944"/>
-              <a:chOff x="1129226" y="1306525"/>
-              <a:chExt cx="7129586" cy="4757944"/>
+              <a:off x="709759" y="1306525"/>
+              <a:ext cx="7549053" cy="4757944"/>
+              <a:chOff x="709759" y="1306525"/>
+              <a:chExt cx="7549053" cy="4757944"/>
             </a:xfrm>
           </p:grpSpPr>
           <p:grpSp>
@@ -9088,8 +9245,8 @@
             </p:nvSpPr>
             <p:spPr>
               <a:xfrm rot="18411430">
-                <a:off x="3846614" y="767485"/>
-                <a:ext cx="765585" cy="6200361"/>
+                <a:off x="3660167" y="394694"/>
+                <a:ext cx="765585" cy="6666401"/>
               </a:xfrm>
               <a:prstGeom prst="downArrow">
                 <a:avLst/>
@@ -10207,10 +10364,10 @@
       </p:sp>
       <p:sp>
         <p:nvSpPr>
-          <p:cNvPr id="53" name="Tekstballon: rechthoek met afgeronde hoeken 27">
+          <p:cNvPr id="46" name="Rechthoek 20">
             <a:extLst>
               <a:ext uri="{FF2B5EF4-FFF2-40B4-BE49-F238E27FC236}">
-                <a16:creationId xmlns:a16="http://schemas.microsoft.com/office/drawing/2014/main" id="{7C19119D-EEA4-4296-A981-C92AB1AAD05B}"/>
+                <a16:creationId xmlns:a16="http://schemas.microsoft.com/office/drawing/2014/main" id="{9A6870E1-F3D7-4E74-AF71-7B8D829B7DE5}"/>
               </a:ext>
             </a:extLst>
           </p:cNvPr>
@@ -10219,37 +10376,27 @@
         </p:nvSpPr>
         <p:spPr>
           <a:xfrm>
-            <a:off x="2012144" y="5704383"/>
-            <a:ext cx="2211399" cy="761521"/>
+            <a:off x="615779" y="891466"/>
+            <a:ext cx="10797346" cy="148853"/>
           </a:xfrm>
-          <a:prstGeom prst="wedgeRoundRectCallout">
-            <a:avLst>
-              <a:gd name="adj1" fmla="val -21307"/>
-              <a:gd name="adj2" fmla="val 18819"/>
-              <a:gd name="adj3" fmla="val 16667"/>
-            </a:avLst>
+          <a:prstGeom prst="rect">
+            <a:avLst/>
           </a:prstGeom>
-          <a:solidFill>
-            <a:schemeClr val="bg1">
-              <a:lumMod val="85000"/>
-            </a:schemeClr>
-          </a:solidFill>
-          <a:ln>
-            <a:noFill/>
-          </a:ln>
         </p:spPr>
         <p:style>
-          <a:lnRef idx="0">
-            <a:scrgbClr r="0" g="0" b="0"/>
+          <a:lnRef idx="2">
+            <a:schemeClr val="accent1">
+              <a:shade val="50000"/>
+            </a:schemeClr>
           </a:lnRef>
-          <a:fillRef idx="0">
-            <a:scrgbClr r="0" g="0" b="0"/>
+          <a:fillRef idx="1">
+            <a:schemeClr val="accent1"/>
           </a:fillRef>
           <a:effectRef idx="0">
-            <a:scrgbClr r="0" g="0" b="0"/>
+            <a:schemeClr val="accent1"/>
           </a:effectRef>
           <a:fontRef idx="minor">
-            <a:schemeClr val="dk1"/>
+            <a:schemeClr val="lt1"/>
           </a:fontRef>
         </p:style>
         <p:txBody>
@@ -10257,27 +10404,7 @@
           <a:lstStyle/>
           <a:p>
             <a:pPr algn="ctr"/>
-            <a:r>
-              <a:rPr lang="en-US" sz="1600" dirty="0">
-                <a:latin typeface="Consolas" panose="020B0609020204030204" pitchFamily="49" charset="0"/>
-              </a:rPr>
-              <a:t>flex_1</a:t>
-            </a:r>
-            <a:r>
-              <a:rPr lang="en-US" sz="1600" dirty="0">
-                <a:latin typeface="Source Sans Pro" panose="020B0503030403020204" pitchFamily="34" charset="0"/>
-              </a:rPr>
-              <a:t> behaves as </a:t>
-            </a:r>
-            <a:r>
-              <a:rPr lang="en-US" sz="1600" dirty="0" err="1">
-                <a:latin typeface="Consolas" panose="020B0609020204030204" pitchFamily="49" charset="0"/>
-              </a:rPr>
-              <a:t>fixed_demand</a:t>
-            </a:r>
-            <a:endParaRPr lang="en-US" sz="1600" dirty="0">
-              <a:latin typeface="Consolas" panose="020B0609020204030204" pitchFamily="49" charset="0"/>
-            </a:endParaRPr>
+            <a:endParaRPr lang="es-ES"/>
           </a:p>
         </p:txBody>
       </p:sp>
@@ -15055,6 +15182,159 @@
           </a:prstGeom>
         </p:spPr>
       </p:pic>
+      <p:sp>
+        <p:nvSpPr>
+          <p:cNvPr id="14" name="Graphic 12">
+            <a:extLst>
+              <a:ext uri="{FF2B5EF4-FFF2-40B4-BE49-F238E27FC236}">
+                <a16:creationId xmlns:a16="http://schemas.microsoft.com/office/drawing/2014/main" id="{62581B74-83DE-4A50-82F4-E5F5E067DCF1}"/>
+              </a:ext>
+            </a:extLst>
+          </p:cNvPr>
+          <p:cNvSpPr/>
+          <p:nvPr/>
+        </p:nvSpPr>
+        <p:spPr>
+          <a:xfrm>
+            <a:off x="4433164" y="4261552"/>
+            <a:ext cx="838200" cy="944880"/>
+          </a:xfrm>
+          <a:custGeom>
+            <a:avLst/>
+            <a:gdLst>
+              <a:gd name="connsiteX0" fmla="*/ 636584 w 838200"/>
+              <a:gd name="connsiteY0" fmla="*/ 529904 h 944880"/>
+              <a:gd name="connsiteX1" fmla="*/ 478088 w 838200"/>
+              <a:gd name="connsiteY1" fmla="*/ 529904 h 944880"/>
+              <a:gd name="connsiteX2" fmla="*/ 478088 w 838200"/>
+              <a:gd name="connsiteY2" fmla="*/ 7172 h 944880"/>
+              <a:gd name="connsiteX3" fmla="*/ 372932 w 838200"/>
+              <a:gd name="connsiteY3" fmla="*/ 7172 h 944880"/>
+              <a:gd name="connsiteX4" fmla="*/ 372932 w 838200"/>
+              <a:gd name="connsiteY4" fmla="*/ 531428 h 944880"/>
+              <a:gd name="connsiteX5" fmla="*/ 217484 w 838200"/>
+              <a:gd name="connsiteY5" fmla="*/ 531428 h 944880"/>
+              <a:gd name="connsiteX6" fmla="*/ 426272 w 838200"/>
+              <a:gd name="connsiteY6" fmla="*/ 740216 h 944880"/>
+              <a:gd name="connsiteX7" fmla="*/ 636584 w 838200"/>
+              <a:gd name="connsiteY7" fmla="*/ 529904 h 944880"/>
+              <a:gd name="connsiteX8" fmla="*/ 7172 w 838200"/>
+              <a:gd name="connsiteY8" fmla="*/ 845372 h 944880"/>
+              <a:gd name="connsiteX9" fmla="*/ 7172 w 838200"/>
+              <a:gd name="connsiteY9" fmla="*/ 950528 h 944880"/>
+              <a:gd name="connsiteX10" fmla="*/ 845372 w 838200"/>
+              <a:gd name="connsiteY10" fmla="*/ 950528 h 944880"/>
+              <a:gd name="connsiteX11" fmla="*/ 845372 w 838200"/>
+              <a:gd name="connsiteY11" fmla="*/ 845372 h 944880"/>
+              <a:gd name="connsiteX12" fmla="*/ 7172 w 838200"/>
+              <a:gd name="connsiteY12" fmla="*/ 845372 h 944880"/>
+            </a:gdLst>
+            <a:ahLst/>
+            <a:cxnLst>
+              <a:cxn ang="0">
+                <a:pos x="connsiteX0" y="connsiteY0"/>
+              </a:cxn>
+              <a:cxn ang="0">
+                <a:pos x="connsiteX1" y="connsiteY1"/>
+              </a:cxn>
+              <a:cxn ang="0">
+                <a:pos x="connsiteX2" y="connsiteY2"/>
+              </a:cxn>
+              <a:cxn ang="0">
+                <a:pos x="connsiteX3" y="connsiteY3"/>
+              </a:cxn>
+              <a:cxn ang="0">
+                <a:pos x="connsiteX4" y="connsiteY4"/>
+              </a:cxn>
+              <a:cxn ang="0">
+                <a:pos x="connsiteX5" y="connsiteY5"/>
+              </a:cxn>
+              <a:cxn ang="0">
+                <a:pos x="connsiteX6" y="connsiteY6"/>
+              </a:cxn>
+              <a:cxn ang="0">
+                <a:pos x="connsiteX7" y="connsiteY7"/>
+              </a:cxn>
+              <a:cxn ang="0">
+                <a:pos x="connsiteX8" y="connsiteY8"/>
+              </a:cxn>
+              <a:cxn ang="0">
+                <a:pos x="connsiteX9" y="connsiteY9"/>
+              </a:cxn>
+              <a:cxn ang="0">
+                <a:pos x="connsiteX10" y="connsiteY10"/>
+              </a:cxn>
+              <a:cxn ang="0">
+                <a:pos x="connsiteX11" y="connsiteY11"/>
+              </a:cxn>
+              <a:cxn ang="0">
+                <a:pos x="connsiteX12" y="connsiteY12"/>
+              </a:cxn>
+            </a:cxnLst>
+            <a:rect l="l" t="t" r="r" b="b"/>
+            <a:pathLst>
+              <a:path w="838200" h="944880">
+                <a:moveTo>
+                  <a:pt x="636584" y="529904"/>
+                </a:moveTo>
+                <a:lnTo>
+                  <a:pt x="478088" y="529904"/>
+                </a:lnTo>
+                <a:lnTo>
+                  <a:pt x="478088" y="7172"/>
+                </a:lnTo>
+                <a:lnTo>
+                  <a:pt x="372932" y="7172"/>
+                </a:lnTo>
+                <a:lnTo>
+                  <a:pt x="372932" y="531428"/>
+                </a:lnTo>
+                <a:lnTo>
+                  <a:pt x="217484" y="531428"/>
+                </a:lnTo>
+                <a:lnTo>
+                  <a:pt x="426272" y="740216"/>
+                </a:lnTo>
+                <a:lnTo>
+                  <a:pt x="636584" y="529904"/>
+                </a:lnTo>
+                <a:close/>
+                <a:moveTo>
+                  <a:pt x="7172" y="845372"/>
+                </a:moveTo>
+                <a:lnTo>
+                  <a:pt x="7172" y="950528"/>
+                </a:lnTo>
+                <a:lnTo>
+                  <a:pt x="845372" y="950528"/>
+                </a:lnTo>
+                <a:lnTo>
+                  <a:pt x="845372" y="845372"/>
+                </a:lnTo>
+                <a:lnTo>
+                  <a:pt x="7172" y="845372"/>
+                </a:lnTo>
+                <a:close/>
+              </a:path>
+            </a:pathLst>
+          </a:custGeom>
+          <a:solidFill>
+            <a:srgbClr val="767171"/>
+          </a:solidFill>
+          <a:ln w="5976" cap="flat">
+            <a:noFill/>
+            <a:prstDash val="solid"/>
+            <a:miter/>
+          </a:ln>
+        </p:spPr>
+        <p:txBody>
+          <a:bodyPr rtlCol="0" anchor="ctr"/>
+          <a:lstStyle/>
+          <a:p>
+            <a:endParaRPr lang="en-US"/>
+          </a:p>
+        </p:txBody>
+      </p:sp>
     </p:spTree>
     <p:extLst>
       <p:ext uri="{BB962C8B-B14F-4D97-AF65-F5344CB8AC3E}">
@@ -26092,6 +26372,52 @@
           </a:prstGeom>
         </p:spPr>
       </p:pic>
+      <p:sp>
+        <p:nvSpPr>
+          <p:cNvPr id="26" name="Rechthoek 20">
+            <a:extLst>
+              <a:ext uri="{FF2B5EF4-FFF2-40B4-BE49-F238E27FC236}">
+                <a16:creationId xmlns:a16="http://schemas.microsoft.com/office/drawing/2014/main" id="{7397454B-55D3-4206-A671-F393D6009B90}"/>
+              </a:ext>
+            </a:extLst>
+          </p:cNvPr>
+          <p:cNvSpPr/>
+          <p:nvPr/>
+        </p:nvSpPr>
+        <p:spPr>
+          <a:xfrm>
+            <a:off x="239076" y="5546959"/>
+            <a:ext cx="10797346" cy="148853"/>
+          </a:xfrm>
+          <a:prstGeom prst="rect">
+            <a:avLst/>
+          </a:prstGeom>
+        </p:spPr>
+        <p:style>
+          <a:lnRef idx="2">
+            <a:schemeClr val="accent1">
+              <a:shade val="50000"/>
+            </a:schemeClr>
+          </a:lnRef>
+          <a:fillRef idx="1">
+            <a:schemeClr val="accent1"/>
+          </a:fillRef>
+          <a:effectRef idx="0">
+            <a:schemeClr val="accent1"/>
+          </a:effectRef>
+          <a:fontRef idx="minor">
+            <a:schemeClr val="lt1"/>
+          </a:fontRef>
+        </p:style>
+        <p:txBody>
+          <a:bodyPr rtlCol="0" anchor="ctr"/>
+          <a:lstStyle/>
+          <a:p>
+            <a:pPr algn="ctr"/>
+            <a:endParaRPr lang="es-ES"/>
+          </a:p>
+        </p:txBody>
+      </p:sp>
     </p:spTree>
     <p:extLst>
       <p:ext uri="{BB962C8B-B14F-4D97-AF65-F5344CB8AC3E}">
@@ -26992,10 +27318,10 @@
       </p:sp>
       <p:sp>
         <p:nvSpPr>
-          <p:cNvPr id="61" name="Pijl: gebogen 60">
+          <p:cNvPr id="7" name="Rectangle 6">
             <a:extLst>
               <a:ext uri="{FF2B5EF4-FFF2-40B4-BE49-F238E27FC236}">
-                <a16:creationId xmlns:a16="http://schemas.microsoft.com/office/drawing/2014/main" id="{08BB6C7D-4076-4E77-8AD7-1A03523C6DD5}"/>
+                <a16:creationId xmlns:a16="http://schemas.microsoft.com/office/drawing/2014/main" id="{37A5B257-8525-4787-88C3-8ACB800CAA06}"/>
               </a:ext>
             </a:extLst>
           </p:cNvPr>
@@ -27003,39 +27329,32 @@
           <p:nvPr/>
         </p:nvSpPr>
         <p:spPr>
-          <a:xfrm rot="16200000" flipH="1" flipV="1">
-            <a:off x="-355332" y="1731403"/>
-            <a:ext cx="1471823" cy="1220964"/>
+          <a:xfrm>
+            <a:off x="9522708" y="4480444"/>
+            <a:ext cx="394468" cy="326446"/>
           </a:xfrm>
-          <a:prstGeom prst="bentArrow">
-            <a:avLst>
-              <a:gd name="adj1" fmla="val 19544"/>
-              <a:gd name="adj2" fmla="val 18003"/>
-              <a:gd name="adj3" fmla="val 23091"/>
-              <a:gd name="adj4" fmla="val 45841"/>
-            </a:avLst>
+          <a:prstGeom prst="rect">
+            <a:avLst/>
           </a:prstGeom>
-          <a:solidFill>
-            <a:schemeClr val="bg1">
-              <a:lumMod val="85000"/>
-            </a:schemeClr>
-          </a:solidFill>
+          <a:noFill/>
           <a:ln>
             <a:noFill/>
           </a:ln>
         </p:spPr>
         <p:style>
-          <a:lnRef idx="0">
-            <a:scrgbClr r="0" g="0" b="0"/>
+          <a:lnRef idx="2">
+            <a:schemeClr val="accent1">
+              <a:shade val="50000"/>
+            </a:schemeClr>
           </a:lnRef>
-          <a:fillRef idx="0">
-            <a:scrgbClr r="0" g="0" b="0"/>
+          <a:fillRef idx="1">
+            <a:schemeClr val="accent1"/>
           </a:fillRef>
           <a:effectRef idx="0">
-            <a:scrgbClr r="0" g="0" b="0"/>
+            <a:schemeClr val="accent1"/>
           </a:effectRef>
           <a:fontRef idx="minor">
-            <a:schemeClr val="dk1"/>
+            <a:schemeClr val="lt1"/>
           </a:fontRef>
         </p:style>
         <p:txBody>
@@ -27043,83 +27362,16 @@
           <a:lstStyle/>
           <a:p>
             <a:pPr algn="ctr"/>
-            <a:endParaRPr lang="es-ES">
-              <a:solidFill>
-                <a:schemeClr val="dk1"/>
-              </a:solidFill>
-              <a:latin typeface="Myriad Pro" panose="020B0503030403020204" pitchFamily="34" charset="0"/>
-            </a:endParaRPr>
-          </a:p>
-        </p:txBody>
-      </p:sp>
-      <p:sp>
-        <p:nvSpPr>
-          <p:cNvPr id="70" name="Pijl: gebogen 69">
-            <a:extLst>
-              <a:ext uri="{FF2B5EF4-FFF2-40B4-BE49-F238E27FC236}">
-                <a16:creationId xmlns:a16="http://schemas.microsoft.com/office/drawing/2014/main" id="{851D5282-4385-4A98-BA9E-A379A9E0F812}"/>
-              </a:ext>
-            </a:extLst>
-          </p:cNvPr>
-          <p:cNvSpPr/>
-          <p:nvPr/>
-        </p:nvSpPr>
-        <p:spPr>
-          <a:xfrm rot="5400000" flipV="1">
-            <a:off x="918736" y="1802525"/>
-            <a:ext cx="1471823" cy="1220964"/>
-          </a:xfrm>
-          <a:prstGeom prst="bentArrow">
-            <a:avLst>
-              <a:gd name="adj1" fmla="val 19544"/>
-              <a:gd name="adj2" fmla="val 18003"/>
-              <a:gd name="adj3" fmla="val 23091"/>
-              <a:gd name="adj4" fmla="val 45841"/>
-            </a:avLst>
-          </a:prstGeom>
-          <a:solidFill>
-            <a:schemeClr val="bg1">
-              <a:lumMod val="85000"/>
-            </a:schemeClr>
-          </a:solidFill>
-          <a:ln>
-            <a:noFill/>
-          </a:ln>
-        </p:spPr>
-        <p:style>
-          <a:lnRef idx="0">
-            <a:scrgbClr r="0" g="0" b="0"/>
-          </a:lnRef>
-          <a:fillRef idx="0">
-            <a:scrgbClr r="0" g="0" b="0"/>
-          </a:fillRef>
-          <a:effectRef idx="0">
-            <a:scrgbClr r="0" g="0" b="0"/>
-          </a:effectRef>
-          <a:fontRef idx="minor">
-            <a:schemeClr val="dk1"/>
-          </a:fontRef>
-        </p:style>
-        <p:txBody>
-          <a:bodyPr rtlCol="0" anchor="ctr"/>
-          <a:lstStyle/>
-          <a:p>
-            <a:pPr algn="ctr"/>
-            <a:endParaRPr lang="es-ES">
-              <a:solidFill>
-                <a:schemeClr val="dk1"/>
-              </a:solidFill>
-              <a:latin typeface="Myriad Pro" panose="020B0503030403020204" pitchFamily="34" charset="0"/>
-            </a:endParaRPr>
+            <a:endParaRPr lang="en-US"/>
           </a:p>
         </p:txBody>
       </p:sp>
       <p:grpSp>
         <p:nvGrpSpPr>
-          <p:cNvPr id="8" name="Group 7">
+          <p:cNvPr id="11" name="Group 10">
             <a:extLst>
               <a:ext uri="{FF2B5EF4-FFF2-40B4-BE49-F238E27FC236}">
-                <a16:creationId xmlns:a16="http://schemas.microsoft.com/office/drawing/2014/main" id="{D5ED4C82-3D57-411C-AE57-644077A3E7A0}"/>
+                <a16:creationId xmlns:a16="http://schemas.microsoft.com/office/drawing/2014/main" id="{36D9230A-F429-41D3-9B9D-70831C5B893B}"/>
               </a:ext>
             </a:extLst>
           </p:cNvPr>
@@ -27128,48 +27380,67 @@
         </p:nvGrpSpPr>
         <p:grpSpPr>
           <a:xfrm>
-            <a:off x="3309796" y="1788044"/>
-            <a:ext cx="6607380" cy="3072418"/>
-            <a:chOff x="3309796" y="1788044"/>
-            <a:chExt cx="6607380" cy="3072418"/>
+            <a:off x="3327400" y="1825298"/>
+            <a:ext cx="6589776" cy="2609541"/>
+            <a:chOff x="3327400" y="1825298"/>
+            <a:chExt cx="6589776" cy="2609541"/>
           </a:xfrm>
         </p:grpSpPr>
-        <p:pic>
-          <p:nvPicPr>
-            <p:cNvPr id="55" name="Graphic 54">
+        <p:sp>
+          <p:nvSpPr>
+            <p:cNvPr id="9" name="Arrow: Right 8">
               <a:extLst>
                 <a:ext uri="{FF2B5EF4-FFF2-40B4-BE49-F238E27FC236}">
-                  <a16:creationId xmlns:a16="http://schemas.microsoft.com/office/drawing/2014/main" id="{D09FC886-26D6-48E1-ACA9-B4F980E3BE3D}"/>
+                  <a16:creationId xmlns:a16="http://schemas.microsoft.com/office/drawing/2014/main" id="{986330F6-ACF6-458B-B07A-9A048E68BEE6}"/>
                 </a:ext>
               </a:extLst>
             </p:cNvPr>
-            <p:cNvPicPr>
-              <a:picLocks noChangeAspect="1"/>
-            </p:cNvPicPr>
+            <p:cNvSpPr/>
             <p:nvPr/>
-          </p:nvPicPr>
-          <p:blipFill>
-            <a:blip r:embed="rId2">
-              <a:extLst>
-                <a:ext uri="{96DAC541-7B7A-43D3-8B79-37D633B846F1}">
-                  <asvg:svgBlip xmlns:asvg="http://schemas.microsoft.com/office/drawing/2016/SVG/main" r:embed="rId3"/>
-                </a:ext>
-              </a:extLst>
-            </a:blip>
-            <a:stretch>
-              <a:fillRect/>
-            </a:stretch>
-          </p:blipFill>
+          </p:nvSpPr>
           <p:spPr>
             <a:xfrm>
-              <a:off x="8092068" y="2782602"/>
-              <a:ext cx="1220964" cy="1032156"/>
+              <a:off x="3327400" y="1825298"/>
+              <a:ext cx="4973320" cy="2609541"/>
             </a:xfrm>
-            <a:prstGeom prst="rect">
-              <a:avLst/>
+            <a:prstGeom prst="rightArrow">
+              <a:avLst>
+                <a:gd name="adj1" fmla="val 100000"/>
+                <a:gd name="adj2" fmla="val 54677"/>
+              </a:avLst>
             </a:prstGeom>
+            <a:solidFill>
+              <a:srgbClr val="D9D9D9"/>
+            </a:solidFill>
+            <a:ln>
+              <a:noFill/>
+            </a:ln>
           </p:spPr>
-        </p:pic>
+          <p:style>
+            <a:lnRef idx="2">
+              <a:schemeClr val="accent1">
+                <a:shade val="50000"/>
+              </a:schemeClr>
+            </a:lnRef>
+            <a:fillRef idx="1">
+              <a:schemeClr val="accent1"/>
+            </a:fillRef>
+            <a:effectRef idx="0">
+              <a:schemeClr val="accent1"/>
+            </a:effectRef>
+            <a:fontRef idx="minor">
+              <a:schemeClr val="lt1"/>
+            </a:fontRef>
+          </p:style>
+          <p:txBody>
+            <a:bodyPr rtlCol="0" anchor="ctr"/>
+            <a:lstStyle/>
+            <a:p>
+              <a:pPr algn="ctr"/>
+              <a:endParaRPr lang="en-US"/>
+            </a:p>
+          </p:txBody>
+        </p:sp>
         <p:grpSp>
           <p:nvGrpSpPr>
             <p:cNvPr id="2" name="Groep 1">
@@ -27184,7 +27455,7 @@
           </p:nvGrpSpPr>
           <p:grpSpPr>
             <a:xfrm>
-              <a:off x="4407625" y="1788044"/>
+              <a:off x="3599068" y="2005844"/>
               <a:ext cx="1343562" cy="994557"/>
               <a:chOff x="2941269" y="1960176"/>
               <a:chExt cx="1374591" cy="1017531"/>
@@ -27205,10 +27476,10 @@
               <p:nvPr/>
             </p:nvPicPr>
             <p:blipFill>
-              <a:blip r:embed="rId4">
+              <a:blip r:embed="rId2">
                 <a:extLst>
                   <a:ext uri="{96DAC541-7B7A-43D3-8B79-37D633B846F1}">
-                    <asvg:svgBlip xmlns:asvg="http://schemas.microsoft.com/office/drawing/2016/SVG/main" r:embed="rId5"/>
+                    <asvg:svgBlip xmlns:asvg="http://schemas.microsoft.com/office/drawing/2016/SVG/main" r:embed="rId3"/>
                   </a:ext>
                 </a:extLst>
               </a:blip>
@@ -27278,7 +27549,7 @@
                   <a:rPr lang="en-US" sz="1600" dirty="0">
                     <a:latin typeface="Source Sans Pro" panose="020B0503030403020204" pitchFamily="34" charset="0"/>
                   </a:rPr>
-                  <a:t>consumption</a:t>
+                  <a:t>demand</a:t>
                 </a:r>
               </a:p>
             </p:txBody>
@@ -27298,7 +27569,7 @@
           </p:nvGrpSpPr>
           <p:grpSpPr>
             <a:xfrm>
-              <a:off x="4407625" y="2925102"/>
+              <a:off x="5257148" y="2072576"/>
               <a:ext cx="1343562" cy="929843"/>
               <a:chOff x="5886952" y="2179206"/>
               <a:chExt cx="1374591" cy="951322"/>
@@ -27319,10 +27590,10 @@
               <p:nvPr/>
             </p:nvPicPr>
             <p:blipFill>
-              <a:blip r:embed="rId6">
+              <a:blip r:embed="rId4">
                 <a:extLst>
                   <a:ext uri="{96DAC541-7B7A-43D3-8B79-37D633B846F1}">
-                    <asvg:svgBlip xmlns:asvg="http://schemas.microsoft.com/office/drawing/2016/SVG/main" r:embed="rId7"/>
+                    <asvg:svgBlip xmlns:asvg="http://schemas.microsoft.com/office/drawing/2016/SVG/main" r:embed="rId5"/>
                   </a:ext>
                 </a:extLst>
               </a:blip>
@@ -27412,10 +27683,10 @@
           </p:nvGrpSpPr>
           <p:grpSpPr>
             <a:xfrm>
-              <a:off x="4448145" y="4062265"/>
-              <a:ext cx="1343558" cy="798197"/>
-              <a:chOff x="9130516" y="2690844"/>
-              <a:chExt cx="1374587" cy="816635"/>
+              <a:off x="3599068" y="3363614"/>
+              <a:ext cx="1343564" cy="859157"/>
+              <a:chOff x="9089058" y="2628479"/>
+              <a:chExt cx="1374593" cy="879000"/>
             </a:xfrm>
           </p:grpSpPr>
           <p:pic>
@@ -27433,10 +27704,10 @@
               <p:nvPr/>
             </p:nvPicPr>
             <p:blipFill>
-              <a:blip r:embed="rId8">
+              <a:blip r:embed="rId6">
                 <a:extLst>
                   <a:ext uri="{96DAC541-7B7A-43D3-8B79-37D633B846F1}">
-                    <asvg:svgBlip xmlns:asvg="http://schemas.microsoft.com/office/drawing/2016/SVG/main" r:embed="rId9"/>
+                    <asvg:svgBlip xmlns:asvg="http://schemas.microsoft.com/office/drawing/2016/SVG/main" r:embed="rId7"/>
                   </a:ext>
                 </a:extLst>
               </a:blip>
@@ -27446,7 +27717,7 @@
             </p:blipFill>
             <p:spPr>
               <a:xfrm>
-                <a:off x="9443457" y="2690844"/>
+                <a:off x="9417470" y="2628479"/>
                 <a:ext cx="760740" cy="506699"/>
               </a:xfrm>
               <a:prstGeom prst="rect">
@@ -27468,8 +27739,8 @@
             </p:nvSpPr>
             <p:spPr>
               <a:xfrm>
-                <a:off x="9130516" y="3221388"/>
-                <a:ext cx="1374587" cy="286091"/>
+                <a:off x="9089058" y="3221388"/>
+                <a:ext cx="1374593" cy="286091"/>
               </a:xfrm>
               <a:prstGeom prst="roundRect">
                 <a:avLst/>
@@ -27512,12 +27783,126 @@
             </p:txBody>
           </p:sp>
         </p:grpSp>
+        <p:grpSp>
+          <p:nvGrpSpPr>
+            <p:cNvPr id="10" name="Group 9">
+              <a:extLst>
+                <a:ext uri="{FF2B5EF4-FFF2-40B4-BE49-F238E27FC236}">
+                  <a16:creationId xmlns:a16="http://schemas.microsoft.com/office/drawing/2014/main" id="{EF158C6C-E124-4983-9172-2FE6D47E4908}"/>
+                </a:ext>
+              </a:extLst>
+            </p:cNvPr>
+            <p:cNvGrpSpPr/>
+            <p:nvPr/>
+          </p:nvGrpSpPr>
+          <p:grpSpPr>
+            <a:xfrm>
+              <a:off x="8458797" y="2512994"/>
+              <a:ext cx="1458379" cy="1345881"/>
+              <a:chOff x="8499620" y="2487962"/>
+              <a:chExt cx="1458379" cy="1345881"/>
+            </a:xfrm>
+          </p:grpSpPr>
+          <p:pic>
+            <p:nvPicPr>
+              <p:cNvPr id="55" name="Graphic 54">
+                <a:extLst>
+                  <a:ext uri="{FF2B5EF4-FFF2-40B4-BE49-F238E27FC236}">
+                    <a16:creationId xmlns:a16="http://schemas.microsoft.com/office/drawing/2014/main" id="{D09FC886-26D6-48E1-ACA9-B4F980E3BE3D}"/>
+                  </a:ext>
+                </a:extLst>
+              </p:cNvPr>
+              <p:cNvPicPr>
+                <a:picLocks noChangeAspect="1"/>
+              </p:cNvPicPr>
+              <p:nvPr/>
+            </p:nvPicPr>
+            <p:blipFill>
+              <a:blip r:embed="rId8">
+                <a:extLst>
+                  <a:ext uri="{96DAC541-7B7A-43D3-8B79-37D633B846F1}">
+                    <asvg:svgBlip xmlns:asvg="http://schemas.microsoft.com/office/drawing/2016/SVG/main" r:embed="rId9"/>
+                  </a:ext>
+                </a:extLst>
+              </a:blip>
+              <a:stretch>
+                <a:fillRect/>
+              </a:stretch>
+            </p:blipFill>
+            <p:spPr>
+              <a:xfrm>
+                <a:off x="8666108" y="2487962"/>
+                <a:ext cx="1220964" cy="1032156"/>
+              </a:xfrm>
+              <a:prstGeom prst="rect">
+                <a:avLst/>
+              </a:prstGeom>
+            </p:spPr>
+          </p:pic>
+          <p:sp>
+            <p:nvSpPr>
+              <p:cNvPr id="71" name="Rechthoek: afgeronde hoeken 70">
+                <a:extLst>
+                  <a:ext uri="{FF2B5EF4-FFF2-40B4-BE49-F238E27FC236}">
+                    <a16:creationId xmlns:a16="http://schemas.microsoft.com/office/drawing/2014/main" id="{6BF2A7C1-27D4-43B4-AB0E-5B1AC3142BBD}"/>
+                  </a:ext>
+                </a:extLst>
+              </p:cNvPr>
+              <p:cNvSpPr/>
+              <p:nvPr/>
+            </p:nvSpPr>
+            <p:spPr>
+              <a:xfrm>
+                <a:off x="8499620" y="3577370"/>
+                <a:ext cx="1458379" cy="256473"/>
+              </a:xfrm>
+              <a:prstGeom prst="roundRect">
+                <a:avLst/>
+              </a:prstGeom>
+              <a:solidFill>
+                <a:srgbClr val="767171"/>
+              </a:solidFill>
+              <a:ln>
+                <a:noFill/>
+              </a:ln>
+            </p:spPr>
+            <p:style>
+              <a:lnRef idx="2">
+                <a:schemeClr val="accent1">
+                  <a:shade val="50000"/>
+                </a:schemeClr>
+              </a:lnRef>
+              <a:fillRef idx="1">
+                <a:schemeClr val="accent1"/>
+              </a:fillRef>
+              <a:effectRef idx="0">
+                <a:schemeClr val="accent1"/>
+              </a:effectRef>
+              <a:fontRef idx="minor">
+                <a:schemeClr val="lt1"/>
+              </a:fontRef>
+            </p:style>
+            <p:txBody>
+              <a:bodyPr rtlCol="0" anchor="ctr"/>
+              <a:lstStyle/>
+              <a:p>
+                <a:pPr algn="ctr"/>
+                <a:r>
+                  <a:rPr lang="en-US" sz="1600" dirty="0">
+                    <a:latin typeface="Source Sans Pro" panose="020B0503030403020204" pitchFamily="34" charset="0"/>
+                  </a:rPr>
+                  <a:t>fitting formula  </a:t>
+                </a:r>
+              </a:p>
+            </p:txBody>
+          </p:sp>
+        </p:grpSp>
         <p:sp>
           <p:nvSpPr>
-            <p:cNvPr id="71" name="Rechthoek: afgeronde hoeken 70">
+            <p:cNvPr id="21" name="Rectangle 20">
               <a:extLst>
                 <a:ext uri="{FF2B5EF4-FFF2-40B4-BE49-F238E27FC236}">
-                  <a16:creationId xmlns:a16="http://schemas.microsoft.com/office/drawing/2014/main" id="{6BF2A7C1-27D4-43B4-AB0E-5B1AC3142BBD}"/>
+                  <a16:creationId xmlns:a16="http://schemas.microsoft.com/office/drawing/2014/main" id="{5227EE72-404F-4199-AE26-CFBEF2363564}"/>
                 </a:ext>
               </a:extLst>
             </p:cNvPr>
@@ -27526,116 +27911,7 @@
           </p:nvSpPr>
           <p:spPr>
             <a:xfrm>
-              <a:off x="7925580" y="3872010"/>
-              <a:ext cx="1458379" cy="256473"/>
-            </a:xfrm>
-            <a:prstGeom prst="roundRect">
-              <a:avLst/>
-            </a:prstGeom>
-            <a:solidFill>
-              <a:srgbClr val="767171"/>
-            </a:solidFill>
-            <a:ln>
-              <a:noFill/>
-            </a:ln>
-          </p:spPr>
-          <p:style>
-            <a:lnRef idx="2">
-              <a:schemeClr val="accent1">
-                <a:shade val="50000"/>
-              </a:schemeClr>
-            </a:lnRef>
-            <a:fillRef idx="1">
-              <a:schemeClr val="accent1"/>
-            </a:fillRef>
-            <a:effectRef idx="0">
-              <a:schemeClr val="accent1"/>
-            </a:effectRef>
-            <a:fontRef idx="minor">
-              <a:schemeClr val="lt1"/>
-            </a:fontRef>
-          </p:style>
-          <p:txBody>
-            <a:bodyPr rtlCol="0" anchor="ctr"/>
-            <a:lstStyle/>
-            <a:p>
-              <a:pPr algn="ctr"/>
-              <a:r>
-                <a:rPr lang="en-US" sz="1600" dirty="0">
-                  <a:latin typeface="Source Sans Pro" panose="020B0503030403020204" pitchFamily="34" charset="0"/>
-                </a:rPr>
-                <a:t>fitting formula  </a:t>
-              </a:r>
-            </a:p>
-          </p:txBody>
-        </p:sp>
-        <p:sp>
-          <p:nvSpPr>
-            <p:cNvPr id="6" name="Right Brace 5">
-              <a:extLst>
-                <a:ext uri="{FF2B5EF4-FFF2-40B4-BE49-F238E27FC236}">
-                  <a16:creationId xmlns:a16="http://schemas.microsoft.com/office/drawing/2014/main" id="{B47AC452-C788-4CB5-BE0D-0ED321BDEC0A}"/>
-                </a:ext>
-              </a:extLst>
-            </p:cNvPr>
-            <p:cNvSpPr/>
-            <p:nvPr/>
-          </p:nvSpPr>
-          <p:spPr>
-            <a:xfrm>
-              <a:off x="6093413" y="1886006"/>
-              <a:ext cx="1402080" cy="2834640"/>
-            </a:xfrm>
-            <a:prstGeom prst="rightBrace">
-              <a:avLst>
-                <a:gd name="adj1" fmla="val 43297"/>
-                <a:gd name="adj2" fmla="val 50000"/>
-              </a:avLst>
-            </a:prstGeom>
-            <a:ln w="76200">
-              <a:solidFill>
-                <a:srgbClr val="D9D9D9"/>
-              </a:solidFill>
-            </a:ln>
-          </p:spPr>
-          <p:style>
-            <a:lnRef idx="1">
-              <a:schemeClr val="accent1"/>
-            </a:lnRef>
-            <a:fillRef idx="0">
-              <a:schemeClr val="accent1"/>
-            </a:fillRef>
-            <a:effectRef idx="0">
-              <a:schemeClr val="accent1"/>
-            </a:effectRef>
-            <a:fontRef idx="minor">
-              <a:schemeClr val="tx1"/>
-            </a:fontRef>
-          </p:style>
-          <p:txBody>
-            <a:bodyPr rtlCol="0" anchor="ctr"/>
-            <a:lstStyle/>
-            <a:p>
-              <a:pPr algn="ctr"/>
-              <a:endParaRPr lang="en-US"/>
-            </a:p>
-          </p:txBody>
-        </p:sp>
-        <p:sp>
-          <p:nvSpPr>
-            <p:cNvPr id="7" name="Rectangle 6">
-              <a:extLst>
-                <a:ext uri="{FF2B5EF4-FFF2-40B4-BE49-F238E27FC236}">
-                  <a16:creationId xmlns:a16="http://schemas.microsoft.com/office/drawing/2014/main" id="{37A5B257-8525-4787-88C3-8ACB800CAA06}"/>
-                </a:ext>
-              </a:extLst>
-            </p:cNvPr>
-            <p:cNvSpPr/>
-            <p:nvPr/>
-          </p:nvSpPr>
-          <p:spPr>
-            <a:xfrm>
-              <a:off x="9522708" y="4480444"/>
+              <a:off x="3883836" y="1825299"/>
               <a:ext cx="394468" cy="326446"/>
             </a:xfrm>
             <a:prstGeom prst="rect">
@@ -27671,57 +27947,394 @@
             </a:p>
           </p:txBody>
         </p:sp>
-        <p:sp>
-          <p:nvSpPr>
-            <p:cNvPr id="21" name="Rectangle 20">
+        <p:grpSp>
+          <p:nvGrpSpPr>
+            <p:cNvPr id="5" name="Group 4">
               <a:extLst>
                 <a:ext uri="{FF2B5EF4-FFF2-40B4-BE49-F238E27FC236}">
-                  <a16:creationId xmlns:a16="http://schemas.microsoft.com/office/drawing/2014/main" id="{5227EE72-404F-4199-AE26-CFBEF2363564}"/>
+                  <a16:creationId xmlns:a16="http://schemas.microsoft.com/office/drawing/2014/main" id="{BC4FFBF1-3E2D-4C6C-B57A-E367272FB67C}"/>
                 </a:ext>
               </a:extLst>
             </p:cNvPr>
-            <p:cNvSpPr/>
+            <p:cNvGrpSpPr/>
             <p:nvPr/>
-          </p:nvSpPr>
-          <p:spPr>
+          </p:nvGrpSpPr>
+          <p:grpSpPr>
             <a:xfrm>
-              <a:off x="3309796" y="1835459"/>
-              <a:ext cx="394468" cy="326446"/>
+              <a:off x="5251202" y="3213526"/>
+              <a:ext cx="1343564" cy="1009236"/>
+              <a:chOff x="4615220" y="5002479"/>
+              <a:chExt cx="1343564" cy="1009236"/>
             </a:xfrm>
-            <a:prstGeom prst="rect">
-              <a:avLst/>
-            </a:prstGeom>
+          </p:grpSpPr>
+          <p:sp>
+            <p:nvSpPr>
+              <p:cNvPr id="25" name="Rechthoek: afgeronde hoeken 68">
+                <a:extLst>
+                  <a:ext uri="{FF2B5EF4-FFF2-40B4-BE49-F238E27FC236}">
+                    <a16:creationId xmlns:a16="http://schemas.microsoft.com/office/drawing/2014/main" id="{743B369B-94F4-4F9A-AE60-0E8356697AC3}"/>
+                  </a:ext>
+                </a:extLst>
+              </p:cNvPr>
+              <p:cNvSpPr/>
+              <p:nvPr/>
+            </p:nvSpPr>
+            <p:spPr>
+              <a:xfrm>
+                <a:off x="4615220" y="5732083"/>
+                <a:ext cx="1343564" cy="279632"/>
+              </a:xfrm>
+              <a:prstGeom prst="roundRect">
+                <a:avLst/>
+              </a:prstGeom>
+              <a:solidFill>
+                <a:srgbClr val="767171"/>
+              </a:solidFill>
+              <a:ln>
+                <a:noFill/>
+              </a:ln>
+            </p:spPr>
+            <p:style>
+              <a:lnRef idx="2">
+                <a:schemeClr val="accent1">
+                  <a:shade val="50000"/>
+                </a:schemeClr>
+              </a:lnRef>
+              <a:fillRef idx="1">
+                <a:schemeClr val="accent1"/>
+              </a:fillRef>
+              <a:effectRef idx="0">
+                <a:schemeClr val="accent1"/>
+              </a:effectRef>
+              <a:fontRef idx="minor">
+                <a:schemeClr val="lt1"/>
+              </a:fontRef>
+            </p:style>
+            <p:txBody>
+              <a:bodyPr rtlCol="0" anchor="ctr"/>
+              <a:lstStyle/>
+              <a:p>
+                <a:pPr algn="ctr"/>
+                <a:r>
+                  <a:rPr lang="en-US" sz="1600" dirty="0">
+                    <a:latin typeface="Source Sans Pro" panose="020B0503030403020204" pitchFamily="34" charset="0"/>
+                  </a:rPr>
+                  <a:t>grid capacity</a:t>
+                </a:r>
+              </a:p>
+            </p:txBody>
+          </p:sp>
+          <p:sp>
+            <p:nvSpPr>
+              <p:cNvPr id="26" name="Graphic 12">
+                <a:extLst>
+                  <a:ext uri="{FF2B5EF4-FFF2-40B4-BE49-F238E27FC236}">
+                    <a16:creationId xmlns:a16="http://schemas.microsoft.com/office/drawing/2014/main" id="{8E422108-8249-41BC-A6E0-2454016E2798}"/>
+                  </a:ext>
+                </a:extLst>
+              </p:cNvPr>
+              <p:cNvSpPr/>
+              <p:nvPr/>
+            </p:nvSpPr>
+            <p:spPr>
+              <a:xfrm rot="10800000">
+                <a:off x="5006080" y="5002479"/>
+                <a:ext cx="561844" cy="663830"/>
+              </a:xfrm>
+              <a:custGeom>
+                <a:avLst/>
+                <a:gdLst>
+                  <a:gd name="connsiteX0" fmla="*/ 636584 w 838200"/>
+                  <a:gd name="connsiteY0" fmla="*/ 529904 h 944880"/>
+                  <a:gd name="connsiteX1" fmla="*/ 478088 w 838200"/>
+                  <a:gd name="connsiteY1" fmla="*/ 529904 h 944880"/>
+                  <a:gd name="connsiteX2" fmla="*/ 478088 w 838200"/>
+                  <a:gd name="connsiteY2" fmla="*/ 7172 h 944880"/>
+                  <a:gd name="connsiteX3" fmla="*/ 372932 w 838200"/>
+                  <a:gd name="connsiteY3" fmla="*/ 7172 h 944880"/>
+                  <a:gd name="connsiteX4" fmla="*/ 372932 w 838200"/>
+                  <a:gd name="connsiteY4" fmla="*/ 531428 h 944880"/>
+                  <a:gd name="connsiteX5" fmla="*/ 217484 w 838200"/>
+                  <a:gd name="connsiteY5" fmla="*/ 531428 h 944880"/>
+                  <a:gd name="connsiteX6" fmla="*/ 426272 w 838200"/>
+                  <a:gd name="connsiteY6" fmla="*/ 740216 h 944880"/>
+                  <a:gd name="connsiteX7" fmla="*/ 636584 w 838200"/>
+                  <a:gd name="connsiteY7" fmla="*/ 529904 h 944880"/>
+                  <a:gd name="connsiteX8" fmla="*/ 7172 w 838200"/>
+                  <a:gd name="connsiteY8" fmla="*/ 845372 h 944880"/>
+                  <a:gd name="connsiteX9" fmla="*/ 7172 w 838200"/>
+                  <a:gd name="connsiteY9" fmla="*/ 950528 h 944880"/>
+                  <a:gd name="connsiteX10" fmla="*/ 845372 w 838200"/>
+                  <a:gd name="connsiteY10" fmla="*/ 950528 h 944880"/>
+                  <a:gd name="connsiteX11" fmla="*/ 845372 w 838200"/>
+                  <a:gd name="connsiteY11" fmla="*/ 845372 h 944880"/>
+                  <a:gd name="connsiteX12" fmla="*/ 7172 w 838200"/>
+                  <a:gd name="connsiteY12" fmla="*/ 845372 h 944880"/>
+                </a:gdLst>
+                <a:ahLst/>
+                <a:cxnLst>
+                  <a:cxn ang="0">
+                    <a:pos x="connsiteX0" y="connsiteY0"/>
+                  </a:cxn>
+                  <a:cxn ang="0">
+                    <a:pos x="connsiteX1" y="connsiteY1"/>
+                  </a:cxn>
+                  <a:cxn ang="0">
+                    <a:pos x="connsiteX2" y="connsiteY2"/>
+                  </a:cxn>
+                  <a:cxn ang="0">
+                    <a:pos x="connsiteX3" y="connsiteY3"/>
+                  </a:cxn>
+                  <a:cxn ang="0">
+                    <a:pos x="connsiteX4" y="connsiteY4"/>
+                  </a:cxn>
+                  <a:cxn ang="0">
+                    <a:pos x="connsiteX5" y="connsiteY5"/>
+                  </a:cxn>
+                  <a:cxn ang="0">
+                    <a:pos x="connsiteX6" y="connsiteY6"/>
+                  </a:cxn>
+                  <a:cxn ang="0">
+                    <a:pos x="connsiteX7" y="connsiteY7"/>
+                  </a:cxn>
+                  <a:cxn ang="0">
+                    <a:pos x="connsiteX8" y="connsiteY8"/>
+                  </a:cxn>
+                  <a:cxn ang="0">
+                    <a:pos x="connsiteX9" y="connsiteY9"/>
+                  </a:cxn>
+                  <a:cxn ang="0">
+                    <a:pos x="connsiteX10" y="connsiteY10"/>
+                  </a:cxn>
+                  <a:cxn ang="0">
+                    <a:pos x="connsiteX11" y="connsiteY11"/>
+                  </a:cxn>
+                  <a:cxn ang="0">
+                    <a:pos x="connsiteX12" y="connsiteY12"/>
+                  </a:cxn>
+                </a:cxnLst>
+                <a:rect l="l" t="t" r="r" b="b"/>
+                <a:pathLst>
+                  <a:path w="838200" h="944880">
+                    <a:moveTo>
+                      <a:pt x="636584" y="529904"/>
+                    </a:moveTo>
+                    <a:lnTo>
+                      <a:pt x="478088" y="529904"/>
+                    </a:lnTo>
+                    <a:lnTo>
+                      <a:pt x="478088" y="7172"/>
+                    </a:lnTo>
+                    <a:lnTo>
+                      <a:pt x="372932" y="7172"/>
+                    </a:lnTo>
+                    <a:lnTo>
+                      <a:pt x="372932" y="531428"/>
+                    </a:lnTo>
+                    <a:lnTo>
+                      <a:pt x="217484" y="531428"/>
+                    </a:lnTo>
+                    <a:lnTo>
+                      <a:pt x="426272" y="740216"/>
+                    </a:lnTo>
+                    <a:lnTo>
+                      <a:pt x="636584" y="529904"/>
+                    </a:lnTo>
+                    <a:close/>
+                    <a:moveTo>
+                      <a:pt x="7172" y="845372"/>
+                    </a:moveTo>
+                    <a:lnTo>
+                      <a:pt x="7172" y="950528"/>
+                    </a:lnTo>
+                    <a:lnTo>
+                      <a:pt x="845372" y="950528"/>
+                    </a:lnTo>
+                    <a:lnTo>
+                      <a:pt x="845372" y="845372"/>
+                    </a:lnTo>
+                    <a:lnTo>
+                      <a:pt x="7172" y="845372"/>
+                    </a:lnTo>
+                    <a:close/>
+                  </a:path>
+                </a:pathLst>
+              </a:custGeom>
+              <a:solidFill>
+                <a:srgbClr val="767171"/>
+              </a:solidFill>
+              <a:ln w="5976" cap="flat">
+                <a:noFill/>
+                <a:prstDash val="solid"/>
+                <a:miter/>
+              </a:ln>
+            </p:spPr>
+            <p:txBody>
+              <a:bodyPr rtlCol="0" anchor="ctr"/>
+              <a:lstStyle/>
+              <a:p>
+                <a:endParaRPr lang="en-US"/>
+              </a:p>
+            </p:txBody>
+          </p:sp>
+        </p:grpSp>
+      </p:grpSp>
+      <p:sp>
+        <p:nvSpPr>
+          <p:cNvPr id="30" name="Ovaal 48">
+            <a:extLst>
+              <a:ext uri="{FF2B5EF4-FFF2-40B4-BE49-F238E27FC236}">
+                <a16:creationId xmlns:a16="http://schemas.microsoft.com/office/drawing/2014/main" id="{59C6C887-9A73-407A-8441-154A6078AFC2}"/>
+              </a:ext>
+            </a:extLst>
+          </p:cNvPr>
+          <p:cNvSpPr/>
+          <p:nvPr/>
+        </p:nvSpPr>
+        <p:spPr>
+          <a:xfrm>
+            <a:off x="7710048" y="3078686"/>
+            <a:ext cx="142012" cy="142012"/>
+          </a:xfrm>
+          <a:prstGeom prst="ellipse">
+            <a:avLst/>
+          </a:prstGeom>
+          <a:solidFill>
+            <a:srgbClr val="767171"/>
+          </a:solidFill>
+          <a:ln>
             <a:noFill/>
-            <a:ln>
-              <a:noFill/>
-            </a:ln>
-          </p:spPr>
-          <p:style>
-            <a:lnRef idx="2">
-              <a:schemeClr val="accent1">
-                <a:shade val="50000"/>
-              </a:schemeClr>
-            </a:lnRef>
-            <a:fillRef idx="1">
-              <a:schemeClr val="accent1"/>
-            </a:fillRef>
-            <a:effectRef idx="0">
-              <a:schemeClr val="accent1"/>
-            </a:effectRef>
-            <a:fontRef idx="minor">
-              <a:schemeClr val="lt1"/>
-            </a:fontRef>
-          </p:style>
-          <p:txBody>
-            <a:bodyPr rtlCol="0" anchor="ctr"/>
-            <a:lstStyle/>
-            <a:p>
-              <a:pPr algn="ctr"/>
-              <a:endParaRPr lang="en-US"/>
-            </a:p>
-          </p:txBody>
-        </p:sp>
-      </p:grpSp>
+          </a:ln>
+        </p:spPr>
+        <p:style>
+          <a:lnRef idx="2">
+            <a:schemeClr val="accent1">
+              <a:shade val="50000"/>
+            </a:schemeClr>
+          </a:lnRef>
+          <a:fillRef idx="1">
+            <a:schemeClr val="accent1"/>
+          </a:fillRef>
+          <a:effectRef idx="0">
+            <a:schemeClr val="accent1"/>
+          </a:effectRef>
+          <a:fontRef idx="minor">
+            <a:schemeClr val="lt1"/>
+          </a:fontRef>
+        </p:style>
+        <p:txBody>
+          <a:bodyPr rtlCol="0" anchor="ctr"/>
+          <a:lstStyle/>
+          <a:p>
+            <a:pPr algn="ctr"/>
+            <a:endParaRPr lang="es-ES"/>
+          </a:p>
+        </p:txBody>
+      </p:sp>
+      <p:sp>
+        <p:nvSpPr>
+          <p:cNvPr id="31" name="Ovaal 48">
+            <a:extLst>
+              <a:ext uri="{FF2B5EF4-FFF2-40B4-BE49-F238E27FC236}">
+                <a16:creationId xmlns:a16="http://schemas.microsoft.com/office/drawing/2014/main" id="{4BA3F957-99A9-4470-A93A-8A7BEBC48490}"/>
+              </a:ext>
+            </a:extLst>
+          </p:cNvPr>
+          <p:cNvSpPr/>
+          <p:nvPr/>
+        </p:nvSpPr>
+        <p:spPr>
+          <a:xfrm>
+            <a:off x="7110301" y="3068320"/>
+            <a:ext cx="142012" cy="142012"/>
+          </a:xfrm>
+          <a:prstGeom prst="ellipse">
+            <a:avLst/>
+          </a:prstGeom>
+          <a:solidFill>
+            <a:srgbClr val="767171"/>
+          </a:solidFill>
+          <a:ln>
+            <a:noFill/>
+          </a:ln>
+        </p:spPr>
+        <p:style>
+          <a:lnRef idx="2">
+            <a:schemeClr val="accent1">
+              <a:shade val="50000"/>
+            </a:schemeClr>
+          </a:lnRef>
+          <a:fillRef idx="1">
+            <a:schemeClr val="accent1"/>
+          </a:fillRef>
+          <a:effectRef idx="0">
+            <a:schemeClr val="accent1"/>
+          </a:effectRef>
+          <a:fontRef idx="minor">
+            <a:schemeClr val="lt1"/>
+          </a:fontRef>
+        </p:style>
+        <p:txBody>
+          <a:bodyPr rtlCol="0" anchor="ctr"/>
+          <a:lstStyle/>
+          <a:p>
+            <a:pPr algn="ctr"/>
+            <a:endParaRPr lang="es-ES"/>
+          </a:p>
+        </p:txBody>
+      </p:sp>
+      <p:sp>
+        <p:nvSpPr>
+          <p:cNvPr id="32" name="Ovaal 48">
+            <a:extLst>
+              <a:ext uri="{FF2B5EF4-FFF2-40B4-BE49-F238E27FC236}">
+                <a16:creationId xmlns:a16="http://schemas.microsoft.com/office/drawing/2014/main" id="{51120FE5-C2B6-400E-8DD9-5F0A119E0EBD}"/>
+              </a:ext>
+            </a:extLst>
+          </p:cNvPr>
+          <p:cNvSpPr/>
+          <p:nvPr/>
+        </p:nvSpPr>
+        <p:spPr>
+          <a:xfrm>
+            <a:off x="7413788" y="3071513"/>
+            <a:ext cx="142012" cy="142012"/>
+          </a:xfrm>
+          <a:prstGeom prst="ellipse">
+            <a:avLst/>
+          </a:prstGeom>
+          <a:solidFill>
+            <a:srgbClr val="767171"/>
+          </a:solidFill>
+          <a:ln>
+            <a:noFill/>
+          </a:ln>
+        </p:spPr>
+        <p:style>
+          <a:lnRef idx="2">
+            <a:schemeClr val="accent1">
+              <a:shade val="50000"/>
+            </a:schemeClr>
+          </a:lnRef>
+          <a:fillRef idx="1">
+            <a:schemeClr val="accent1"/>
+          </a:fillRef>
+          <a:effectRef idx="0">
+            <a:schemeClr val="accent1"/>
+          </a:effectRef>
+          <a:fontRef idx="minor">
+            <a:schemeClr val="lt1"/>
+          </a:fontRef>
+        </p:style>
+        <p:txBody>
+          <a:bodyPr rtlCol="0" anchor="ctr"/>
+          <a:lstStyle/>
+          <a:p>
+            <a:pPr algn="ctr"/>
+            <a:endParaRPr lang="es-ES"/>
+          </a:p>
+        </p:txBody>
+      </p:sp>
     </p:spTree>
     <p:extLst>
       <p:ext uri="{BB962C8B-B14F-4D97-AF65-F5344CB8AC3E}">
@@ -28909,6 +29522,52 @@
           <a:xfrm>
             <a:off x="2537072" y="1262744"/>
             <a:ext cx="6607380" cy="161398"/>
+          </a:xfrm>
+          <a:prstGeom prst="rect">
+            <a:avLst/>
+          </a:prstGeom>
+        </p:spPr>
+        <p:style>
+          <a:lnRef idx="2">
+            <a:schemeClr val="accent1">
+              <a:shade val="50000"/>
+            </a:schemeClr>
+          </a:lnRef>
+          <a:fillRef idx="1">
+            <a:schemeClr val="accent1"/>
+          </a:fillRef>
+          <a:effectRef idx="0">
+            <a:schemeClr val="accent1"/>
+          </a:effectRef>
+          <a:fontRef idx="minor">
+            <a:schemeClr val="lt1"/>
+          </a:fontRef>
+        </p:style>
+        <p:txBody>
+          <a:bodyPr rtlCol="0" anchor="ctr"/>
+          <a:lstStyle/>
+          <a:p>
+            <a:pPr algn="ctr"/>
+            <a:endParaRPr lang="es-ES"/>
+          </a:p>
+        </p:txBody>
+      </p:sp>
+      <p:sp>
+        <p:nvSpPr>
+          <p:cNvPr id="23" name="Rechthoek 20">
+            <a:extLst>
+              <a:ext uri="{FF2B5EF4-FFF2-40B4-BE49-F238E27FC236}">
+                <a16:creationId xmlns:a16="http://schemas.microsoft.com/office/drawing/2014/main" id="{D309E4AE-6A05-47BE-B276-80A1915DE8B1}"/>
+              </a:ext>
+            </a:extLst>
+          </p:cNvPr>
+          <p:cNvSpPr/>
+          <p:nvPr/>
+        </p:nvSpPr>
+        <p:spPr>
+          <a:xfrm>
+            <a:off x="325083" y="1634427"/>
+            <a:ext cx="10797346" cy="148853"/>
           </a:xfrm>
           <a:prstGeom prst="rect">
             <a:avLst/>

</xml_diff>